<commit_message>
Mostly updates to figures
</commit_message>
<xml_diff>
--- a/Aim2/figures/figure_arrangement.pptx
+++ b/Aim2/figures/figure_arrangement.pptx
@@ -126,6 +126,129 @@
 </p:presentation>
 </file>
 
+<file path=ppt/revisionInfo.xml><?xml version="1.0" encoding="utf-8"?>
+<p1510:revInfo xmlns:a="http://schemas.openxmlformats.org/drawingml/2006/main" xmlns:r="http://schemas.openxmlformats.org/officeDocument/2006/relationships" xmlns:p1510="http://schemas.microsoft.com/office/powerpoint/2015/10/main">
+  <p1510:revLst>
+    <p1510:client id="{BCBC0136-5FDE-594F-9CAA-94B144D64D8A}" v="17" dt="2024-12-07T02:59:41.343"/>
+  </p1510:revLst>
+</p1510:revInfo>
+</file>
+
+<file path=ppt/changesInfos/changesInfo1.xml><?xml version="1.0" encoding="utf-8"?>
+<pc:chgInfo xmlns:a="http://schemas.openxmlformats.org/drawingml/2006/main" xmlns:r="http://schemas.openxmlformats.org/officeDocument/2006/relationships" xmlns:ac="http://schemas.microsoft.com/office/drawing/2013/main/command" xmlns:pc="http://schemas.microsoft.com/office/powerpoint/2013/main/command">
+  <pc:docChgLst>
+    <pc:chgData name="Maxwell Cook" userId="6270a8f4b8f62cae" providerId="LiveId" clId="{BCBC0136-5FDE-594F-9CAA-94B144D64D8A}"/>
+    <pc:docChg chg="undo custSel modSld">
+      <pc:chgData name="Maxwell Cook" userId="6270a8f4b8f62cae" providerId="LiveId" clId="{BCBC0136-5FDE-594F-9CAA-94B144D64D8A}" dt="2024-12-07T03:00:23.908" v="74" actId="14100"/>
+      <pc:docMkLst>
+        <pc:docMk/>
+      </pc:docMkLst>
+      <pc:sldChg chg="addSp delSp modSp mod">
+        <pc:chgData name="Maxwell Cook" userId="6270a8f4b8f62cae" providerId="LiveId" clId="{BCBC0136-5FDE-594F-9CAA-94B144D64D8A}" dt="2024-12-07T02:21:53.826" v="54" actId="14826"/>
+        <pc:sldMkLst>
+          <pc:docMk/>
+          <pc:sldMk cId="3693775636" sldId="256"/>
+        </pc:sldMkLst>
+        <pc:spChg chg="add del mod">
+          <ac:chgData name="Maxwell Cook" userId="6270a8f4b8f62cae" providerId="LiveId" clId="{BCBC0136-5FDE-594F-9CAA-94B144D64D8A}" dt="2024-12-07T01:47:31.188" v="27" actId="478"/>
+          <ac:spMkLst>
+            <pc:docMk/>
+            <pc:sldMk cId="3693775636" sldId="256"/>
+            <ac:spMk id="2" creationId="{F086688B-261B-AB79-A4EF-E58CE599A5F8}"/>
+          </ac:spMkLst>
+        </pc:spChg>
+        <pc:spChg chg="add del mod">
+          <ac:chgData name="Maxwell Cook" userId="6270a8f4b8f62cae" providerId="LiveId" clId="{BCBC0136-5FDE-594F-9CAA-94B144D64D8A}" dt="2024-12-07T01:47:47.905" v="33" actId="478"/>
+          <ac:spMkLst>
+            <pc:docMk/>
+            <pc:sldMk cId="3693775636" sldId="256"/>
+            <ac:spMk id="3" creationId="{7B242316-D59E-A3F2-E26A-B542B92B1817}"/>
+          </ac:spMkLst>
+        </pc:spChg>
+        <pc:picChg chg="add mod">
+          <ac:chgData name="Maxwell Cook" userId="6270a8f4b8f62cae" providerId="LiveId" clId="{BCBC0136-5FDE-594F-9CAA-94B144D64D8A}" dt="2024-12-07T02:21:53.826" v="54" actId="14826"/>
+          <ac:picMkLst>
+            <pc:docMk/>
+            <pc:sldMk cId="3693775636" sldId="256"/>
+            <ac:picMk id="6" creationId="{EA3BD154-FF54-8B34-43E4-92747AB1AB0E}"/>
+          </ac:picMkLst>
+        </pc:picChg>
+        <pc:picChg chg="add mod">
+          <ac:chgData name="Maxwell Cook" userId="6270a8f4b8f62cae" providerId="LiveId" clId="{BCBC0136-5FDE-594F-9CAA-94B144D64D8A}" dt="2024-12-07T01:48:41.078" v="48" actId="1076"/>
+          <ac:picMkLst>
+            <pc:docMk/>
+            <pc:sldMk cId="3693775636" sldId="256"/>
+            <ac:picMk id="8" creationId="{54D88B57-6429-025D-4D45-BDAD577B3D11}"/>
+          </ac:picMkLst>
+        </pc:picChg>
+        <pc:picChg chg="add mod">
+          <ac:chgData name="Maxwell Cook" userId="6270a8f4b8f62cae" providerId="LiveId" clId="{BCBC0136-5FDE-594F-9CAA-94B144D64D8A}" dt="2024-12-07T01:50:47.273" v="49" actId="14826"/>
+          <ac:picMkLst>
+            <pc:docMk/>
+            <pc:sldMk cId="3693775636" sldId="256"/>
+            <ac:picMk id="10" creationId="{D5F1398E-B953-1F59-F217-7FDD62C30D1D}"/>
+          </ac:picMkLst>
+        </pc:picChg>
+        <pc:picChg chg="add del mod">
+          <ac:chgData name="Maxwell Cook" userId="6270a8f4b8f62cae" providerId="LiveId" clId="{BCBC0136-5FDE-594F-9CAA-94B144D64D8A}" dt="2024-12-07T01:40:34.958" v="18" actId="478"/>
+          <ac:picMkLst>
+            <pc:docMk/>
+            <pc:sldMk cId="3693775636" sldId="256"/>
+            <ac:picMk id="1026" creationId="{5FE5F91C-AF3A-F118-0F3C-1EAEED401644}"/>
+          </ac:picMkLst>
+        </pc:picChg>
+      </pc:sldChg>
+      <pc:sldChg chg="addSp modSp mod">
+        <pc:chgData name="Maxwell Cook" userId="6270a8f4b8f62cae" providerId="LiveId" clId="{BCBC0136-5FDE-594F-9CAA-94B144D64D8A}" dt="2024-12-07T03:00:23.908" v="74" actId="14100"/>
+        <pc:sldMkLst>
+          <pc:docMk/>
+          <pc:sldMk cId="3640804533" sldId="257"/>
+        </pc:sldMkLst>
+        <pc:picChg chg="add mod">
+          <ac:chgData name="Maxwell Cook" userId="6270a8f4b8f62cae" providerId="LiveId" clId="{BCBC0136-5FDE-594F-9CAA-94B144D64D8A}" dt="2024-12-07T03:00:23.908" v="74" actId="14100"/>
+          <ac:picMkLst>
+            <pc:docMk/>
+            <pc:sldMk cId="3640804533" sldId="257"/>
+            <ac:picMk id="3" creationId="{02C48BA2-C609-ABA2-DA4C-6DFC88F217A1}"/>
+          </ac:picMkLst>
+        </pc:picChg>
+        <pc:picChg chg="add mod">
+          <ac:chgData name="Maxwell Cook" userId="6270a8f4b8f62cae" providerId="LiveId" clId="{BCBC0136-5FDE-594F-9CAA-94B144D64D8A}" dt="2024-12-07T03:00:14.636" v="72" actId="14100"/>
+          <ac:picMkLst>
+            <pc:docMk/>
+            <pc:sldMk cId="3640804533" sldId="257"/>
+            <ac:picMk id="5" creationId="{EC063E86-FBF5-7E7F-8B26-45E31F4A56FF}"/>
+          </ac:picMkLst>
+        </pc:picChg>
+      </pc:sldChg>
+      <pc:sldChg chg="addSp modSp mod">
+        <pc:chgData name="Maxwell Cook" userId="6270a8f4b8f62cae" providerId="LiveId" clId="{BCBC0136-5FDE-594F-9CAA-94B144D64D8A}" dt="2024-12-06T19:06:38.062" v="17" actId="14100"/>
+        <pc:sldMkLst>
+          <pc:docMk/>
+          <pc:sldMk cId="1043661401" sldId="259"/>
+        </pc:sldMkLst>
+        <pc:spChg chg="add mod">
+          <ac:chgData name="Maxwell Cook" userId="6270a8f4b8f62cae" providerId="LiveId" clId="{BCBC0136-5FDE-594F-9CAA-94B144D64D8A}" dt="2024-12-06T19:06:38.062" v="17" actId="14100"/>
+          <ac:spMkLst>
+            <pc:docMk/>
+            <pc:sldMk cId="1043661401" sldId="259"/>
+            <ac:spMk id="2" creationId="{4913B578-B9F4-874A-5544-3282EA0B8A21}"/>
+          </ac:spMkLst>
+        </pc:spChg>
+        <pc:picChg chg="add mod">
+          <ac:chgData name="Maxwell Cook" userId="6270a8f4b8f62cae" providerId="LiveId" clId="{BCBC0136-5FDE-594F-9CAA-94B144D64D8A}" dt="2024-12-06T18:34:46.395" v="13" actId="14100"/>
+          <ac:picMkLst>
+            <pc:docMk/>
+            <pc:sldMk cId="1043661401" sldId="259"/>
+            <ac:picMk id="2050" creationId="{D103CF78-23E6-F59A-80B1-587E5EF688BC}"/>
+          </ac:picMkLst>
+        </pc:picChg>
+      </pc:sldChg>
+    </pc:docChg>
+  </pc:docChgLst>
+</pc:chgInfo>
+</file>
+
 <file path=ppt/slideLayouts/slideLayout1.xml><?xml version="1.0" encoding="utf-8"?>
 <p:sldLayout xmlns:a="http://schemas.openxmlformats.org/drawingml/2006/main" xmlns:r="http://schemas.openxmlformats.org/officeDocument/2006/relationships" xmlns:p="http://schemas.openxmlformats.org/presentationml/2006/main" type="title" preserve="1">
   <p:cSld name="Title Slide">
@@ -257,7 +380,7 @@
           <a:p>
             <a:fld id="{3620BDAC-38D5-A048-8F27-0D0639CFFB27}" type="datetimeFigureOut">
               <a:rPr lang="en-US" smtClean="0"/>
-              <a:t>12/5/24</a:t>
+              <a:t>12/6/24</a:t>
             </a:fld>
             <a:endParaRPr lang="en-US"/>
           </a:p>
@@ -427,7 +550,7 @@
           <a:p>
             <a:fld id="{3620BDAC-38D5-A048-8F27-0D0639CFFB27}" type="datetimeFigureOut">
               <a:rPr lang="en-US" smtClean="0"/>
-              <a:t>12/5/24</a:t>
+              <a:t>12/6/24</a:t>
             </a:fld>
             <a:endParaRPr lang="en-US"/>
           </a:p>
@@ -607,7 +730,7 @@
           <a:p>
             <a:fld id="{3620BDAC-38D5-A048-8F27-0D0639CFFB27}" type="datetimeFigureOut">
               <a:rPr lang="en-US" smtClean="0"/>
-              <a:t>12/5/24</a:t>
+              <a:t>12/6/24</a:t>
             </a:fld>
             <a:endParaRPr lang="en-US"/>
           </a:p>
@@ -777,7 +900,7 @@
           <a:p>
             <a:fld id="{3620BDAC-38D5-A048-8F27-0D0639CFFB27}" type="datetimeFigureOut">
               <a:rPr lang="en-US" smtClean="0"/>
-              <a:t>12/5/24</a:t>
+              <a:t>12/6/24</a:t>
             </a:fld>
             <a:endParaRPr lang="en-US"/>
           </a:p>
@@ -1023,7 +1146,7 @@
           <a:p>
             <a:fld id="{3620BDAC-38D5-A048-8F27-0D0639CFFB27}" type="datetimeFigureOut">
               <a:rPr lang="en-US" smtClean="0"/>
-              <a:t>12/5/24</a:t>
+              <a:t>12/6/24</a:t>
             </a:fld>
             <a:endParaRPr lang="en-US"/>
           </a:p>
@@ -1255,7 +1378,7 @@
           <a:p>
             <a:fld id="{3620BDAC-38D5-A048-8F27-0D0639CFFB27}" type="datetimeFigureOut">
               <a:rPr lang="en-US" smtClean="0"/>
-              <a:t>12/5/24</a:t>
+              <a:t>12/6/24</a:t>
             </a:fld>
             <a:endParaRPr lang="en-US"/>
           </a:p>
@@ -1622,7 +1745,7 @@
           <a:p>
             <a:fld id="{3620BDAC-38D5-A048-8F27-0D0639CFFB27}" type="datetimeFigureOut">
               <a:rPr lang="en-US" smtClean="0"/>
-              <a:t>12/5/24</a:t>
+              <a:t>12/6/24</a:t>
             </a:fld>
             <a:endParaRPr lang="en-US"/>
           </a:p>
@@ -1740,7 +1863,7 @@
           <a:p>
             <a:fld id="{3620BDAC-38D5-A048-8F27-0D0639CFFB27}" type="datetimeFigureOut">
               <a:rPr lang="en-US" smtClean="0"/>
-              <a:t>12/5/24</a:t>
+              <a:t>12/6/24</a:t>
             </a:fld>
             <a:endParaRPr lang="en-US"/>
           </a:p>
@@ -1835,7 +1958,7 @@
           <a:p>
             <a:fld id="{3620BDAC-38D5-A048-8F27-0D0639CFFB27}" type="datetimeFigureOut">
               <a:rPr lang="en-US" smtClean="0"/>
-              <a:t>12/5/24</a:t>
+              <a:t>12/6/24</a:t>
             </a:fld>
             <a:endParaRPr lang="en-US"/>
           </a:p>
@@ -2112,7 +2235,7 @@
           <a:p>
             <a:fld id="{3620BDAC-38D5-A048-8F27-0D0639CFFB27}" type="datetimeFigureOut">
               <a:rPr lang="en-US" smtClean="0"/>
-              <a:t>12/5/24</a:t>
+              <a:t>12/6/24</a:t>
             </a:fld>
             <a:endParaRPr lang="en-US"/>
           </a:p>
@@ -2369,7 +2492,7 @@
           <a:p>
             <a:fld id="{3620BDAC-38D5-A048-8F27-0D0639CFFB27}" type="datetimeFigureOut">
               <a:rPr lang="en-US" smtClean="0"/>
-              <a:t>12/5/24</a:t>
+              <a:t>12/6/24</a:t>
             </a:fld>
             <a:endParaRPr lang="en-US"/>
           </a:p>
@@ -2582,7 +2705,7 @@
           <a:p>
             <a:fld id="{3620BDAC-38D5-A048-8F27-0D0639CFFB27}" type="datetimeFigureOut">
               <a:rPr lang="en-US" smtClean="0"/>
-              <a:t>12/5/24</a:t>
+              <a:t>12/6/24</a:t>
             </a:fld>
             <a:endParaRPr lang="en-US"/>
           </a:p>
@@ -3026,6 +3149,94 @@
           </a:p>
         </p:txBody>
       </p:sp>
+      <p:pic>
+        <p:nvPicPr>
+          <p:cNvPr id="6" name="Picture 5">
+            <a:extLst>
+              <a:ext uri="{FF2B5EF4-FFF2-40B4-BE49-F238E27FC236}">
+                <a16:creationId xmlns:a16="http://schemas.microsoft.com/office/drawing/2014/main" id="{EA3BD154-FF54-8B34-43E4-92747AB1AB0E}"/>
+              </a:ext>
+            </a:extLst>
+          </p:cNvPr>
+          <p:cNvPicPr>
+            <a:picLocks noChangeAspect="1"/>
+          </p:cNvPicPr>
+          <p:nvPr/>
+        </p:nvPicPr>
+        <p:blipFill>
+          <a:blip r:embed="rId2"/>
+          <a:srcRect/>
+          <a:stretch/>
+        </p:blipFill>
+        <p:spPr>
+          <a:xfrm>
+            <a:off x="505799" y="933624"/>
+            <a:ext cx="2894533" cy="3566140"/>
+          </a:xfrm>
+          <a:prstGeom prst="rect">
+            <a:avLst/>
+          </a:prstGeom>
+        </p:spPr>
+      </p:pic>
+      <p:pic>
+        <p:nvPicPr>
+          <p:cNvPr id="8" name="Picture 7" descr="A graph of a number of years&#10;&#10;Description automatically generated">
+            <a:extLst>
+              <a:ext uri="{FF2B5EF4-FFF2-40B4-BE49-F238E27FC236}">
+                <a16:creationId xmlns:a16="http://schemas.microsoft.com/office/drawing/2014/main" id="{54D88B57-6429-025D-4D45-BDAD577B3D11}"/>
+              </a:ext>
+            </a:extLst>
+          </p:cNvPr>
+          <p:cNvPicPr>
+            <a:picLocks noChangeAspect="1"/>
+          </p:cNvPicPr>
+          <p:nvPr/>
+        </p:nvPicPr>
+        <p:blipFill>
+          <a:blip r:embed="rId3"/>
+          <a:stretch>
+            <a:fillRect/>
+          </a:stretch>
+        </p:blipFill>
+        <p:spPr>
+          <a:xfrm>
+            <a:off x="3400332" y="914578"/>
+            <a:ext cx="2923201" cy="1802117"/>
+          </a:xfrm>
+          <a:prstGeom prst="rect">
+            <a:avLst/>
+          </a:prstGeom>
+        </p:spPr>
+      </p:pic>
+      <p:pic>
+        <p:nvPicPr>
+          <p:cNvPr id="10" name="Picture 9">
+            <a:extLst>
+              <a:ext uri="{FF2B5EF4-FFF2-40B4-BE49-F238E27FC236}">
+                <a16:creationId xmlns:a16="http://schemas.microsoft.com/office/drawing/2014/main" id="{D5F1398E-B953-1F59-F217-7FDD62C30D1D}"/>
+              </a:ext>
+            </a:extLst>
+          </p:cNvPr>
+          <p:cNvPicPr>
+            <a:picLocks noChangeAspect="1"/>
+          </p:cNvPicPr>
+          <p:nvPr/>
+        </p:nvPicPr>
+        <p:blipFill>
+          <a:blip r:embed="rId4"/>
+          <a:srcRect/>
+          <a:stretch/>
+        </p:blipFill>
+        <p:spPr>
+          <a:xfrm>
+            <a:off x="3534592" y="2716695"/>
+            <a:ext cx="2788941" cy="1709350"/>
+          </a:xfrm>
+          <a:prstGeom prst="rect">
+            <a:avLst/>
+          </a:prstGeom>
+        </p:spPr>
+      </p:pic>
     </p:spTree>
     <p:extLst>
       <p:ext uri="{BB962C8B-B14F-4D97-AF65-F5344CB8AC3E}">
@@ -3176,6 +3387,101 @@
           </a:p>
         </p:txBody>
       </p:sp>
+      <p:pic>
+        <p:nvPicPr>
+          <p:cNvPr id="2050" name="Picture 2">
+            <a:extLst>
+              <a:ext uri="{FF2B5EF4-FFF2-40B4-BE49-F238E27FC236}">
+                <a16:creationId xmlns:a16="http://schemas.microsoft.com/office/drawing/2014/main" id="{D103CF78-23E6-F59A-80B1-587E5EF688BC}"/>
+              </a:ext>
+            </a:extLst>
+          </p:cNvPr>
+          <p:cNvPicPr>
+            <a:picLocks noChangeAspect="1" noChangeArrowheads="1"/>
+          </p:cNvPicPr>
+          <p:nvPr/>
+        </p:nvPicPr>
+        <p:blipFill>
+          <a:blip r:embed="rId2">
+            <a:extLst>
+              <a:ext uri="{28A0092B-C50C-407E-A947-70E740481C1C}">
+                <a14:useLocalDpi xmlns:a14="http://schemas.microsoft.com/office/drawing/2010/main" val="0"/>
+              </a:ext>
+            </a:extLst>
+          </a:blip>
+          <a:srcRect/>
+          <a:stretch>
+            <a:fillRect/>
+          </a:stretch>
+        </p:blipFill>
+        <p:spPr bwMode="auto">
+          <a:xfrm>
+            <a:off x="400206" y="1425989"/>
+            <a:ext cx="3161789" cy="2085837"/>
+          </a:xfrm>
+          <a:prstGeom prst="rect">
+            <a:avLst/>
+          </a:prstGeom>
+          <a:noFill/>
+          <a:extLst>
+            <a:ext uri="{909E8E84-426E-40DD-AFC4-6F175D3DCCD1}">
+              <a14:hiddenFill xmlns:a14="http://schemas.microsoft.com/office/drawing/2010/main">
+                <a:solidFill>
+                  <a:srgbClr val="FFFFFF"/>
+                </a:solidFill>
+              </a14:hiddenFill>
+            </a:ext>
+          </a:extLst>
+        </p:spPr>
+      </p:pic>
+      <p:sp>
+        <p:nvSpPr>
+          <p:cNvPr id="2" name="Rectangle 1">
+            <a:extLst>
+              <a:ext uri="{FF2B5EF4-FFF2-40B4-BE49-F238E27FC236}">
+                <a16:creationId xmlns:a16="http://schemas.microsoft.com/office/drawing/2014/main" id="{4913B578-B9F4-874A-5544-3282EA0B8A21}"/>
+              </a:ext>
+            </a:extLst>
+          </p:cNvPr>
+          <p:cNvSpPr/>
+          <p:nvPr/>
+        </p:nvSpPr>
+        <p:spPr>
+          <a:xfrm>
+            <a:off x="3561995" y="1577008"/>
+            <a:ext cx="2268962" cy="1749287"/>
+          </a:xfrm>
+          <a:prstGeom prst="rect">
+            <a:avLst/>
+          </a:prstGeom>
+          <a:noFill/>
+          <a:ln w="12700"/>
+        </p:spPr>
+        <p:style>
+          <a:lnRef idx="2">
+            <a:schemeClr val="accent1">
+              <a:shade val="15000"/>
+            </a:schemeClr>
+          </a:lnRef>
+          <a:fillRef idx="1">
+            <a:schemeClr val="accent1"/>
+          </a:fillRef>
+          <a:effectRef idx="0">
+            <a:schemeClr val="accent1"/>
+          </a:effectRef>
+          <a:fontRef idx="minor">
+            <a:schemeClr val="lt1"/>
+          </a:fontRef>
+        </p:style>
+        <p:txBody>
+          <a:bodyPr rtlCol="0" anchor="ctr"/>
+          <a:lstStyle/>
+          <a:p>
+            <a:pPr algn="ctr"/>
+            <a:endParaRPr lang="en-US"/>
+          </a:p>
+        </p:txBody>
+      </p:sp>
     </p:spTree>
     <p:extLst>
       <p:ext uri="{BB962C8B-B14F-4D97-AF65-F5344CB8AC3E}">
@@ -3206,6 +3512,66 @@
           <a:chExt cx="0" cy="0"/>
         </a:xfrm>
       </p:grpSpPr>
+      <p:pic>
+        <p:nvPicPr>
+          <p:cNvPr id="3" name="Picture 2" descr="A graph of different colored lines&#10;&#10;Description automatically generated">
+            <a:extLst>
+              <a:ext uri="{FF2B5EF4-FFF2-40B4-BE49-F238E27FC236}">
+                <a16:creationId xmlns:a16="http://schemas.microsoft.com/office/drawing/2014/main" id="{02C48BA2-C609-ABA2-DA4C-6DFC88F217A1}"/>
+              </a:ext>
+            </a:extLst>
+          </p:cNvPr>
+          <p:cNvPicPr>
+            <a:picLocks noChangeAspect="1"/>
+          </p:cNvPicPr>
+          <p:nvPr/>
+        </p:nvPicPr>
+        <p:blipFill>
+          <a:blip r:embed="rId2"/>
+          <a:stretch>
+            <a:fillRect/>
+          </a:stretch>
+        </p:blipFill>
+        <p:spPr>
+          <a:xfrm>
+            <a:off x="3513677" y="355524"/>
+            <a:ext cx="3183685" cy="2163274"/>
+          </a:xfrm>
+          <a:prstGeom prst="rect">
+            <a:avLst/>
+          </a:prstGeom>
+        </p:spPr>
+      </p:pic>
+      <p:pic>
+        <p:nvPicPr>
+          <p:cNvPr id="5" name="Picture 4" descr="A graph of different colored squares&#10;&#10;Description automatically generated">
+            <a:extLst>
+              <a:ext uri="{FF2B5EF4-FFF2-40B4-BE49-F238E27FC236}">
+                <a16:creationId xmlns:a16="http://schemas.microsoft.com/office/drawing/2014/main" id="{EC063E86-FBF5-7E7F-8B26-45E31F4A56FF}"/>
+              </a:ext>
+            </a:extLst>
+          </p:cNvPr>
+          <p:cNvPicPr>
+            <a:picLocks noChangeAspect="1"/>
+          </p:cNvPicPr>
+          <p:nvPr/>
+        </p:nvPicPr>
+        <p:blipFill>
+          <a:blip r:embed="rId3"/>
+          <a:stretch>
+            <a:fillRect/>
+          </a:stretch>
+        </p:blipFill>
+        <p:spPr>
+          <a:xfrm>
+            <a:off x="0" y="218801"/>
+            <a:ext cx="3429000" cy="2272425"/>
+          </a:xfrm>
+          <a:prstGeom prst="rect">
+            <a:avLst/>
+          </a:prstGeom>
+        </p:spPr>
+      </p:pic>
     </p:spTree>
     <p:extLst>
       <p:ext uri="{BB962C8B-B14F-4D97-AF65-F5344CB8AC3E}">

</xml_diff>

<commit_message>
Figure updates and adding GLM of qmd
</commit_message>
<xml_diff>
--- a/Aim2/figures/figure_arrangement.pptx
+++ b/Aim2/figures/figure_arrangement.pptx
@@ -139,7 +139,7 @@
   <pc:docChgLst>
     <pc:chgData name="Maxwell Cook" userId="6270a8f4b8f62cae" providerId="LiveId" clId="{BCBC0136-5FDE-594F-9CAA-94B144D64D8A}"/>
     <pc:docChg chg="undo custSel modSld">
-      <pc:chgData name="Maxwell Cook" userId="6270a8f4b8f62cae" providerId="LiveId" clId="{BCBC0136-5FDE-594F-9CAA-94B144D64D8A}" dt="2024-12-07T03:00:23.908" v="74" actId="14100"/>
+      <pc:chgData name="Maxwell Cook" userId="6270a8f4b8f62cae" providerId="LiveId" clId="{BCBC0136-5FDE-594F-9CAA-94B144D64D8A}" dt="2024-12-07T06:14:56.237" v="75" actId="478"/>
       <pc:docMkLst>
         <pc:docMk/>
       </pc:docMkLst>
@@ -221,14 +221,14 @@
           </ac:picMkLst>
         </pc:picChg>
       </pc:sldChg>
-      <pc:sldChg chg="addSp modSp mod">
-        <pc:chgData name="Maxwell Cook" userId="6270a8f4b8f62cae" providerId="LiveId" clId="{BCBC0136-5FDE-594F-9CAA-94B144D64D8A}" dt="2024-12-06T19:06:38.062" v="17" actId="14100"/>
+      <pc:sldChg chg="addSp delSp modSp mod">
+        <pc:chgData name="Maxwell Cook" userId="6270a8f4b8f62cae" providerId="LiveId" clId="{BCBC0136-5FDE-594F-9CAA-94B144D64D8A}" dt="2024-12-07T06:14:56.237" v="75" actId="478"/>
         <pc:sldMkLst>
           <pc:docMk/>
           <pc:sldMk cId="1043661401" sldId="259"/>
         </pc:sldMkLst>
-        <pc:spChg chg="add mod">
-          <ac:chgData name="Maxwell Cook" userId="6270a8f4b8f62cae" providerId="LiveId" clId="{BCBC0136-5FDE-594F-9CAA-94B144D64D8A}" dt="2024-12-06T19:06:38.062" v="17" actId="14100"/>
+        <pc:spChg chg="add del mod">
+          <ac:chgData name="Maxwell Cook" userId="6270a8f4b8f62cae" providerId="LiveId" clId="{BCBC0136-5FDE-594F-9CAA-94B144D64D8A}" dt="2024-12-07T06:14:56.237" v="75" actId="478"/>
           <ac:spMkLst>
             <pc:docMk/>
             <pc:sldMk cId="1043661401" sldId="259"/>
@@ -3434,54 +3434,6 @@
           </a:extLst>
         </p:spPr>
       </p:pic>
-      <p:sp>
-        <p:nvSpPr>
-          <p:cNvPr id="2" name="Rectangle 1">
-            <a:extLst>
-              <a:ext uri="{FF2B5EF4-FFF2-40B4-BE49-F238E27FC236}">
-                <a16:creationId xmlns:a16="http://schemas.microsoft.com/office/drawing/2014/main" id="{4913B578-B9F4-874A-5544-3282EA0B8A21}"/>
-              </a:ext>
-            </a:extLst>
-          </p:cNvPr>
-          <p:cNvSpPr/>
-          <p:nvPr/>
-        </p:nvSpPr>
-        <p:spPr>
-          <a:xfrm>
-            <a:off x="3561995" y="1577008"/>
-            <a:ext cx="2268962" cy="1749287"/>
-          </a:xfrm>
-          <a:prstGeom prst="rect">
-            <a:avLst/>
-          </a:prstGeom>
-          <a:noFill/>
-          <a:ln w="12700"/>
-        </p:spPr>
-        <p:style>
-          <a:lnRef idx="2">
-            <a:schemeClr val="accent1">
-              <a:shade val="15000"/>
-            </a:schemeClr>
-          </a:lnRef>
-          <a:fillRef idx="1">
-            <a:schemeClr val="accent1"/>
-          </a:fillRef>
-          <a:effectRef idx="0">
-            <a:schemeClr val="accent1"/>
-          </a:effectRef>
-          <a:fontRef idx="minor">
-            <a:schemeClr val="lt1"/>
-          </a:fontRef>
-        </p:style>
-        <p:txBody>
-          <a:bodyPr rtlCol="0" anchor="ctr"/>
-          <a:lstStyle/>
-          <a:p>
-            <a:pPr algn="ctr"/>
-            <a:endParaRPr lang="en-US"/>
-          </a:p>
-        </p:txBody>
-      </p:sp>
     </p:spTree>
     <p:extLst>
       <p:ext uri="{BB962C8B-B14F-4D97-AF65-F5344CB8AC3E}">

</xml_diff>

<commit_message>
Updates to figures, model for co-occurrence
</commit_message>
<xml_diff>
--- a/Aim2/figures/figure_arrangement.pptx
+++ b/Aim2/figures/figure_arrangement.pptx
@@ -7,8 +7,9 @@
   <p:sldIdLst>
     <p:sldId id="256" r:id="rId2"/>
     <p:sldId id="258" r:id="rId3"/>
-    <p:sldId id="259" r:id="rId4"/>
-    <p:sldId id="257" r:id="rId5"/>
+    <p:sldId id="260" r:id="rId4"/>
+    <p:sldId id="259" r:id="rId5"/>
+    <p:sldId id="257" r:id="rId6"/>
   </p:sldIdLst>
   <p:sldSz cx="6858000" cy="8229600"/>
   <p:notesSz cx="6858000" cy="9144000"/>
@@ -129,7 +130,7 @@
 <file path=ppt/revisionInfo.xml><?xml version="1.0" encoding="utf-8"?>
 <p1510:revInfo xmlns:a="http://schemas.openxmlformats.org/drawingml/2006/main" xmlns:r="http://schemas.openxmlformats.org/officeDocument/2006/relationships" xmlns:p1510="http://schemas.microsoft.com/office/powerpoint/2015/10/main">
   <p1510:revLst>
-    <p1510:client id="{BCBC0136-5FDE-594F-9CAA-94B144D64D8A}" v="17" dt="2024-12-07T02:59:41.343"/>
+    <p1510:client id="{BCBC0136-5FDE-594F-9CAA-94B144D64D8A}" v="72" dt="2024-12-09T02:40:59.207"/>
   </p1510:revLst>
 </p1510:revInfo>
 </file>
@@ -138,35 +139,43 @@
 <pc:chgInfo xmlns:a="http://schemas.openxmlformats.org/drawingml/2006/main" xmlns:r="http://schemas.openxmlformats.org/officeDocument/2006/relationships" xmlns:ac="http://schemas.microsoft.com/office/drawing/2013/main/command" xmlns:pc="http://schemas.microsoft.com/office/powerpoint/2013/main/command">
   <pc:docChgLst>
     <pc:chgData name="Maxwell Cook" userId="6270a8f4b8f62cae" providerId="LiveId" clId="{BCBC0136-5FDE-594F-9CAA-94B144D64D8A}"/>
-    <pc:docChg chg="undo custSel modSld">
-      <pc:chgData name="Maxwell Cook" userId="6270a8f4b8f62cae" providerId="LiveId" clId="{BCBC0136-5FDE-594F-9CAA-94B144D64D8A}" dt="2024-12-07T06:14:56.237" v="75" actId="478"/>
+    <pc:docChg chg="undo custSel addSld delSld modSld">
+      <pc:chgData name="Maxwell Cook" userId="6270a8f4b8f62cae" providerId="LiveId" clId="{BCBC0136-5FDE-594F-9CAA-94B144D64D8A}" dt="2024-12-09T02:41:00.488" v="287" actId="1076"/>
       <pc:docMkLst>
         <pc:docMk/>
       </pc:docMkLst>
       <pc:sldChg chg="addSp delSp modSp mod">
-        <pc:chgData name="Maxwell Cook" userId="6270a8f4b8f62cae" providerId="LiveId" clId="{BCBC0136-5FDE-594F-9CAA-94B144D64D8A}" dt="2024-12-07T02:21:53.826" v="54" actId="14826"/>
+        <pc:chgData name="Maxwell Cook" userId="6270a8f4b8f62cae" providerId="LiveId" clId="{BCBC0136-5FDE-594F-9CAA-94B144D64D8A}" dt="2024-12-09T02:15:40.251" v="121" actId="1076"/>
         <pc:sldMkLst>
           <pc:docMk/>
           <pc:sldMk cId="3693775636" sldId="256"/>
         </pc:sldMkLst>
-        <pc:spChg chg="add del mod">
-          <ac:chgData name="Maxwell Cook" userId="6270a8f4b8f62cae" providerId="LiveId" clId="{BCBC0136-5FDE-594F-9CAA-94B144D64D8A}" dt="2024-12-07T01:47:31.188" v="27" actId="478"/>
+        <pc:spChg chg="add mod">
+          <ac:chgData name="Maxwell Cook" userId="6270a8f4b8f62cae" providerId="LiveId" clId="{BCBC0136-5FDE-594F-9CAA-94B144D64D8A}" dt="2024-12-09T02:15:40.251" v="121" actId="1076"/>
           <ac:spMkLst>
             <pc:docMk/>
             <pc:sldMk cId="3693775636" sldId="256"/>
-            <ac:spMk id="2" creationId="{F086688B-261B-AB79-A4EF-E58CE599A5F8}"/>
+            <ac:spMk id="2" creationId="{97DB9CA4-0CDC-E44C-830B-06FB23CF1F21}"/>
           </ac:spMkLst>
         </pc:spChg>
-        <pc:spChg chg="add del mod">
-          <ac:chgData name="Maxwell Cook" userId="6270a8f4b8f62cae" providerId="LiveId" clId="{BCBC0136-5FDE-594F-9CAA-94B144D64D8A}" dt="2024-12-07T01:47:47.905" v="33" actId="478"/>
+        <pc:spChg chg="mod">
+          <ac:chgData name="Maxwell Cook" userId="6270a8f4b8f62cae" providerId="LiveId" clId="{BCBC0136-5FDE-594F-9CAA-94B144D64D8A}" dt="2024-12-09T00:46:16.724" v="97" actId="1076"/>
           <ac:spMkLst>
             <pc:docMk/>
             <pc:sldMk cId="3693775636" sldId="256"/>
-            <ac:spMk id="3" creationId="{7B242316-D59E-A3F2-E26A-B542B92B1817}"/>
+            <ac:spMk id="4" creationId="{8F36A069-3398-2F21-F20D-6DE2C885920E}"/>
           </ac:spMkLst>
         </pc:spChg>
+        <pc:picChg chg="add del mod">
+          <ac:chgData name="Maxwell Cook" userId="6270a8f4b8f62cae" providerId="LiveId" clId="{BCBC0136-5FDE-594F-9CAA-94B144D64D8A}" dt="2024-12-09T02:15:13.673" v="112" actId="478"/>
+          <ac:picMkLst>
+            <pc:docMk/>
+            <pc:sldMk cId="3693775636" sldId="256"/>
+            <ac:picMk id="3" creationId="{5F0B8E92-6FD4-9876-A0BD-3450E2BCE9E4}"/>
+          </ac:picMkLst>
+        </pc:picChg>
         <pc:picChg chg="add mod">
-          <ac:chgData name="Maxwell Cook" userId="6270a8f4b8f62cae" providerId="LiveId" clId="{BCBC0136-5FDE-594F-9CAA-94B144D64D8A}" dt="2024-12-07T02:21:53.826" v="54" actId="14826"/>
+          <ac:chgData name="Maxwell Cook" userId="6270a8f4b8f62cae" providerId="LiveId" clId="{BCBC0136-5FDE-594F-9CAA-94B144D64D8A}" dt="2024-12-09T00:46:16.724" v="97" actId="1076"/>
           <ac:picMkLst>
             <pc:docMk/>
             <pc:sldMk cId="3693775636" sldId="256"/>
@@ -174,7 +183,15 @@
           </ac:picMkLst>
         </pc:picChg>
         <pc:picChg chg="add mod">
-          <ac:chgData name="Maxwell Cook" userId="6270a8f4b8f62cae" providerId="LiveId" clId="{BCBC0136-5FDE-594F-9CAA-94B144D64D8A}" dt="2024-12-07T01:48:41.078" v="48" actId="1076"/>
+          <ac:chgData name="Maxwell Cook" userId="6270a8f4b8f62cae" providerId="LiveId" clId="{BCBC0136-5FDE-594F-9CAA-94B144D64D8A}" dt="2024-12-09T02:15:37.673" v="120" actId="1076"/>
+          <ac:picMkLst>
+            <pc:docMk/>
+            <pc:sldMk cId="3693775636" sldId="256"/>
+            <ac:picMk id="7" creationId="{ED8A69DC-B15E-D82F-FCA4-DCABC91944BD}"/>
+          </ac:picMkLst>
+        </pc:picChg>
+        <pc:picChg chg="add mod">
+          <ac:chgData name="Maxwell Cook" userId="6270a8f4b8f62cae" providerId="LiveId" clId="{BCBC0136-5FDE-594F-9CAA-94B144D64D8A}" dt="2024-12-09T00:46:16.724" v="97" actId="1076"/>
           <ac:picMkLst>
             <pc:docMk/>
             <pc:sldMk cId="3693775636" sldId="256"/>
@@ -182,19 +199,11 @@
           </ac:picMkLst>
         </pc:picChg>
         <pc:picChg chg="add mod">
-          <ac:chgData name="Maxwell Cook" userId="6270a8f4b8f62cae" providerId="LiveId" clId="{BCBC0136-5FDE-594F-9CAA-94B144D64D8A}" dt="2024-12-07T01:50:47.273" v="49" actId="14826"/>
+          <ac:chgData name="Maxwell Cook" userId="6270a8f4b8f62cae" providerId="LiveId" clId="{BCBC0136-5FDE-594F-9CAA-94B144D64D8A}" dt="2024-12-09T00:46:16.724" v="97" actId="1076"/>
           <ac:picMkLst>
             <pc:docMk/>
             <pc:sldMk cId="3693775636" sldId="256"/>
             <ac:picMk id="10" creationId="{D5F1398E-B953-1F59-F217-7FDD62C30D1D}"/>
-          </ac:picMkLst>
-        </pc:picChg>
-        <pc:picChg chg="add del mod">
-          <ac:chgData name="Maxwell Cook" userId="6270a8f4b8f62cae" providerId="LiveId" clId="{BCBC0136-5FDE-594F-9CAA-94B144D64D8A}" dt="2024-12-07T01:40:34.958" v="18" actId="478"/>
-          <ac:picMkLst>
-            <pc:docMk/>
-            <pc:sldMk cId="3693775636" sldId="256"/>
-            <ac:picMk id="1026" creationId="{5FE5F91C-AF3A-F118-0F3C-1EAEED401644}"/>
           </ac:picMkLst>
         </pc:picChg>
       </pc:sldChg>
@@ -222,25 +231,246 @@
         </pc:picChg>
       </pc:sldChg>
       <pc:sldChg chg="addSp delSp modSp mod">
-        <pc:chgData name="Maxwell Cook" userId="6270a8f4b8f62cae" providerId="LiveId" clId="{BCBC0136-5FDE-594F-9CAA-94B144D64D8A}" dt="2024-12-07T06:14:56.237" v="75" actId="478"/>
+        <pc:chgData name="Maxwell Cook" userId="6270a8f4b8f62cae" providerId="LiveId" clId="{BCBC0136-5FDE-594F-9CAA-94B144D64D8A}" dt="2024-12-09T02:40:53.194" v="284" actId="478"/>
+        <pc:sldMkLst>
+          <pc:docMk/>
+          <pc:sldMk cId="3862617950" sldId="258"/>
+        </pc:sldMkLst>
+        <pc:spChg chg="del mod">
+          <ac:chgData name="Maxwell Cook" userId="6270a8f4b8f62cae" providerId="LiveId" clId="{BCBC0136-5FDE-594F-9CAA-94B144D64D8A}" dt="2024-12-09T00:46:21.529" v="98" actId="21"/>
+          <ac:spMkLst>
+            <pc:docMk/>
+            <pc:sldMk cId="3862617950" sldId="258"/>
+            <ac:spMk id="4" creationId="{745E791A-4600-2780-C000-C6662264EB0D}"/>
+          </ac:spMkLst>
+        </pc:spChg>
+        <pc:spChg chg="add mod">
+          <ac:chgData name="Maxwell Cook" userId="6270a8f4b8f62cae" providerId="LiveId" clId="{BCBC0136-5FDE-594F-9CAA-94B144D64D8A}" dt="2024-12-09T02:26:51.308" v="252" actId="14100"/>
+          <ac:spMkLst>
+            <pc:docMk/>
+            <pc:sldMk cId="3862617950" sldId="258"/>
+            <ac:spMk id="5" creationId="{A79C5788-86F8-4CF1-B90E-9D123542E862}"/>
+          </ac:spMkLst>
+        </pc:spChg>
+        <pc:spChg chg="add mod">
+          <ac:chgData name="Maxwell Cook" userId="6270a8f4b8f62cae" providerId="LiveId" clId="{BCBC0136-5FDE-594F-9CAA-94B144D64D8A}" dt="2024-12-09T02:26:40.852" v="249" actId="1076"/>
+          <ac:spMkLst>
+            <pc:docMk/>
+            <pc:sldMk cId="3862617950" sldId="258"/>
+            <ac:spMk id="11" creationId="{7D6D062A-BAFC-7CCC-5709-55901952AA28}"/>
+          </ac:spMkLst>
+        </pc:spChg>
+        <pc:spChg chg="add del mod">
+          <ac:chgData name="Maxwell Cook" userId="6270a8f4b8f62cae" providerId="LiveId" clId="{BCBC0136-5FDE-594F-9CAA-94B144D64D8A}" dt="2024-12-09T02:40:53.194" v="284" actId="478"/>
+          <ac:spMkLst>
+            <pc:docMk/>
+            <pc:sldMk cId="3862617950" sldId="258"/>
+            <ac:spMk id="22" creationId="{2CFA76FF-A607-1208-C6FB-421CF56E2FD8}"/>
+          </ac:spMkLst>
+        </pc:spChg>
+        <pc:picChg chg="add del mod">
+          <ac:chgData name="Maxwell Cook" userId="6270a8f4b8f62cae" providerId="LiveId" clId="{BCBC0136-5FDE-594F-9CAA-94B144D64D8A}" dt="2024-12-09T02:24:34.837" v="227" actId="478"/>
+          <ac:picMkLst>
+            <pc:docMk/>
+            <pc:sldMk cId="3862617950" sldId="258"/>
+            <ac:picMk id="2" creationId="{8008F2CC-28A6-049D-2A5C-A2F1844AF9BC}"/>
+          </ac:picMkLst>
+        </pc:picChg>
+        <pc:picChg chg="add del mod">
+          <ac:chgData name="Maxwell Cook" userId="6270a8f4b8f62cae" providerId="LiveId" clId="{BCBC0136-5FDE-594F-9CAA-94B144D64D8A}" dt="2024-12-09T02:23:19.824" v="204" actId="478"/>
+          <ac:picMkLst>
+            <pc:docMk/>
+            <pc:sldMk cId="3862617950" sldId="258"/>
+            <ac:picMk id="7" creationId="{D1011923-EB48-18AE-3E0E-0DEF2938C04A}"/>
+          </ac:picMkLst>
+        </pc:picChg>
+        <pc:picChg chg="add del mod">
+          <ac:chgData name="Maxwell Cook" userId="6270a8f4b8f62cae" providerId="LiveId" clId="{BCBC0136-5FDE-594F-9CAA-94B144D64D8A}" dt="2024-12-09T02:17:55.843" v="139" actId="478"/>
+          <ac:picMkLst>
+            <pc:docMk/>
+            <pc:sldMk cId="3862617950" sldId="258"/>
+            <ac:picMk id="9" creationId="{DF66933A-1B33-27C0-176E-B6C0F6D04FDE}"/>
+          </ac:picMkLst>
+        </pc:picChg>
+        <pc:picChg chg="add del mod">
+          <ac:chgData name="Maxwell Cook" userId="6270a8f4b8f62cae" providerId="LiveId" clId="{BCBC0136-5FDE-594F-9CAA-94B144D64D8A}" dt="2024-12-09T02:23:49.723" v="218" actId="478"/>
+          <ac:picMkLst>
+            <pc:docMk/>
+            <pc:sldMk cId="3862617950" sldId="258"/>
+            <ac:picMk id="12" creationId="{58839824-ACCC-3336-78D6-19A8BAAC5A94}"/>
+          </ac:picMkLst>
+        </pc:picChg>
+        <pc:picChg chg="add del mod">
+          <ac:chgData name="Maxwell Cook" userId="6270a8f4b8f62cae" providerId="LiveId" clId="{BCBC0136-5FDE-594F-9CAA-94B144D64D8A}" dt="2024-12-09T02:26:09.206" v="239" actId="478"/>
+          <ac:picMkLst>
+            <pc:docMk/>
+            <pc:sldMk cId="3862617950" sldId="258"/>
+            <ac:picMk id="14" creationId="{A60C1283-136A-0EA9-6F5B-001281342B90}"/>
+          </ac:picMkLst>
+        </pc:picChg>
+        <pc:picChg chg="add del mod">
+          <ac:chgData name="Maxwell Cook" userId="6270a8f4b8f62cae" providerId="LiveId" clId="{BCBC0136-5FDE-594F-9CAA-94B144D64D8A}" dt="2024-12-09T02:24:04.508" v="222" actId="478"/>
+          <ac:picMkLst>
+            <pc:docMk/>
+            <pc:sldMk cId="3862617950" sldId="258"/>
+            <ac:picMk id="16" creationId="{83207813-2162-1B01-5C40-3FDB6F243429}"/>
+          </ac:picMkLst>
+        </pc:picChg>
+        <pc:picChg chg="add mod">
+          <ac:chgData name="Maxwell Cook" userId="6270a8f4b8f62cae" providerId="LiveId" clId="{BCBC0136-5FDE-594F-9CAA-94B144D64D8A}" dt="2024-12-09T02:26:33.467" v="247" actId="1076"/>
+          <ac:picMkLst>
+            <pc:docMk/>
+            <pc:sldMk cId="3862617950" sldId="258"/>
+            <ac:picMk id="18" creationId="{165371AD-7AC1-F2A4-6575-D50A91EF561C}"/>
+          </ac:picMkLst>
+        </pc:picChg>
+        <pc:picChg chg="add mod">
+          <ac:chgData name="Maxwell Cook" userId="6270a8f4b8f62cae" providerId="LiveId" clId="{BCBC0136-5FDE-594F-9CAA-94B144D64D8A}" dt="2024-12-09T02:24:42.764" v="231" actId="1076"/>
+          <ac:picMkLst>
+            <pc:docMk/>
+            <pc:sldMk cId="3862617950" sldId="258"/>
+            <ac:picMk id="19" creationId="{E7050BB2-0BE8-51C5-24ED-7C2C917EF486}"/>
+          </ac:picMkLst>
+        </pc:picChg>
+        <pc:picChg chg="add mod">
+          <ac:chgData name="Maxwell Cook" userId="6270a8f4b8f62cae" providerId="LiveId" clId="{BCBC0136-5FDE-594F-9CAA-94B144D64D8A}" dt="2024-12-09T02:26:36.376" v="248" actId="1076"/>
+          <ac:picMkLst>
+            <pc:docMk/>
+            <pc:sldMk cId="3862617950" sldId="258"/>
+            <ac:picMk id="21" creationId="{FA04D684-BD77-9437-795D-DA3C1E2813B7}"/>
+          </ac:picMkLst>
+        </pc:picChg>
+        <pc:picChg chg="add del mod">
+          <ac:chgData name="Maxwell Cook" userId="6270a8f4b8f62cae" providerId="LiveId" clId="{BCBC0136-5FDE-594F-9CAA-94B144D64D8A}" dt="2024-12-09T00:46:21.529" v="98" actId="21"/>
+          <ac:picMkLst>
+            <pc:docMk/>
+            <pc:sldMk cId="3862617950" sldId="258"/>
+            <ac:picMk id="1026" creationId="{529E070E-DFF5-B639-D926-D3CEC939C36A}"/>
+          </ac:picMkLst>
+        </pc:picChg>
+      </pc:sldChg>
+      <pc:sldChg chg="addSp delSp modSp del mod">
+        <pc:chgData name="Maxwell Cook" userId="6270a8f4b8f62cae" providerId="LiveId" clId="{BCBC0136-5FDE-594F-9CAA-94B144D64D8A}" dt="2024-12-09T00:46:06.348" v="96" actId="2696"/>
         <pc:sldMkLst>
           <pc:docMk/>
           <pc:sldMk cId="1043661401" sldId="259"/>
         </pc:sldMkLst>
-        <pc:spChg chg="add del mod">
-          <ac:chgData name="Maxwell Cook" userId="6270a8f4b8f62cae" providerId="LiveId" clId="{BCBC0136-5FDE-594F-9CAA-94B144D64D8A}" dt="2024-12-07T06:14:56.237" v="75" actId="478"/>
+        <pc:spChg chg="mod">
+          <ac:chgData name="Maxwell Cook" userId="6270a8f4b8f62cae" providerId="LiveId" clId="{BCBC0136-5FDE-594F-9CAA-94B144D64D8A}" dt="2024-12-09T00:44:28.268" v="76" actId="1076"/>
           <ac:spMkLst>
             <pc:docMk/>
             <pc:sldMk cId="1043661401" sldId="259"/>
-            <ac:spMk id="2" creationId="{4913B578-B9F4-874A-5544-3282EA0B8A21}"/>
+            <ac:spMk id="4" creationId="{6CC49D13-7743-3607-9FE4-30AD62512434}"/>
           </ac:spMkLst>
         </pc:spChg>
-        <pc:picChg chg="add mod">
-          <ac:chgData name="Maxwell Cook" userId="6270a8f4b8f62cae" providerId="LiveId" clId="{BCBC0136-5FDE-594F-9CAA-94B144D64D8A}" dt="2024-12-06T18:34:46.395" v="13" actId="14100"/>
+      </pc:sldChg>
+      <pc:sldChg chg="addSp delSp modSp add mod">
+        <pc:chgData name="Maxwell Cook" userId="6270a8f4b8f62cae" providerId="LiveId" clId="{BCBC0136-5FDE-594F-9CAA-94B144D64D8A}" dt="2024-12-09T02:21:15.589" v="202" actId="255"/>
+        <pc:sldMkLst>
+          <pc:docMk/>
+          <pc:sldMk cId="3585360381" sldId="259"/>
+        </pc:sldMkLst>
+        <pc:spChg chg="del">
+          <ac:chgData name="Maxwell Cook" userId="6270a8f4b8f62cae" providerId="LiveId" clId="{BCBC0136-5FDE-594F-9CAA-94B144D64D8A}" dt="2024-12-09T02:20:14.509" v="187" actId="478"/>
+          <ac:spMkLst>
+            <pc:docMk/>
+            <pc:sldMk cId="3585360381" sldId="259"/>
+            <ac:spMk id="5" creationId="{DC1064FD-5A3B-14CE-DCE7-F0D11442CD95}"/>
+          </ac:spMkLst>
+        </pc:spChg>
+        <pc:spChg chg="mod">
+          <ac:chgData name="Maxwell Cook" userId="6270a8f4b8f62cae" providerId="LiveId" clId="{BCBC0136-5FDE-594F-9CAA-94B144D64D8A}" dt="2024-12-09T02:21:15.589" v="202" actId="255"/>
+          <ac:spMkLst>
+            <pc:docMk/>
+            <pc:sldMk cId="3585360381" sldId="259"/>
+            <ac:spMk id="11" creationId="{33BCC1AD-FC10-BA1B-0690-2E8547E1D3D6}"/>
+          </ac:spMkLst>
+        </pc:spChg>
+        <pc:picChg chg="del">
+          <ac:chgData name="Maxwell Cook" userId="6270a8f4b8f62cae" providerId="LiveId" clId="{BCBC0136-5FDE-594F-9CAA-94B144D64D8A}" dt="2024-12-09T02:20:11.447" v="186" actId="478"/>
           <ac:picMkLst>
             <pc:docMk/>
-            <pc:sldMk cId="1043661401" sldId="259"/>
-            <ac:picMk id="2050" creationId="{D103CF78-23E6-F59A-80B1-587E5EF688BC}"/>
+            <pc:sldMk cId="3585360381" sldId="259"/>
+            <ac:picMk id="2" creationId="{6F48B963-17C5-84D3-23B7-B291043946B7}"/>
+          </ac:picMkLst>
+        </pc:picChg>
+        <pc:picChg chg="add del mod">
+          <ac:chgData name="Maxwell Cook" userId="6270a8f4b8f62cae" providerId="LiveId" clId="{BCBC0136-5FDE-594F-9CAA-94B144D64D8A}" dt="2024-12-09T02:20:26.009" v="191" actId="478"/>
+          <ac:picMkLst>
+            <pc:docMk/>
+            <pc:sldMk cId="3585360381" sldId="259"/>
+            <ac:picMk id="4" creationId="{26ACD4C9-43E6-D42B-32C7-2C72B842DBF0}"/>
+          </ac:picMkLst>
+        </pc:picChg>
+        <pc:picChg chg="del">
+          <ac:chgData name="Maxwell Cook" userId="6270a8f4b8f62cae" providerId="LiveId" clId="{BCBC0136-5FDE-594F-9CAA-94B144D64D8A}" dt="2024-12-09T02:20:09.715" v="185" actId="478"/>
+          <ac:picMkLst>
+            <pc:docMk/>
+            <pc:sldMk cId="3585360381" sldId="259"/>
+            <ac:picMk id="7" creationId="{0D61F2E8-A407-112A-2A00-EC4E11D82388}"/>
+          </ac:picMkLst>
+        </pc:picChg>
+        <pc:picChg chg="add del mod">
+          <ac:chgData name="Maxwell Cook" userId="6270a8f4b8f62cae" providerId="LiveId" clId="{BCBC0136-5FDE-594F-9CAA-94B144D64D8A}" dt="2024-12-09T02:20:40.836" v="195" actId="478"/>
+          <ac:picMkLst>
+            <pc:docMk/>
+            <pc:sldMk cId="3585360381" sldId="259"/>
+            <ac:picMk id="8" creationId="{46E778B6-7C49-D613-340D-57D08ADFB036}"/>
+          </ac:picMkLst>
+        </pc:picChg>
+        <pc:picChg chg="add mod">
+          <ac:chgData name="Maxwell Cook" userId="6270a8f4b8f62cae" providerId="LiveId" clId="{BCBC0136-5FDE-594F-9CAA-94B144D64D8A}" dt="2024-12-09T02:21:02.232" v="200" actId="1076"/>
+          <ac:picMkLst>
+            <pc:docMk/>
+            <pc:sldMk cId="3585360381" sldId="259"/>
+            <ac:picMk id="10" creationId="{59143A86-DEB9-B3F9-9782-858617354620}"/>
+          </ac:picMkLst>
+        </pc:picChg>
+      </pc:sldChg>
+      <pc:sldChg chg="addSp delSp modSp add mod">
+        <pc:chgData name="Maxwell Cook" userId="6270a8f4b8f62cae" providerId="LiveId" clId="{BCBC0136-5FDE-594F-9CAA-94B144D64D8A}" dt="2024-12-09T02:41:00.488" v="287" actId="1076"/>
+        <pc:sldMkLst>
+          <pc:docMk/>
+          <pc:sldMk cId="91050093" sldId="260"/>
+        </pc:sldMkLst>
+        <pc:spChg chg="del">
+          <ac:chgData name="Maxwell Cook" userId="6270a8f4b8f62cae" providerId="LiveId" clId="{BCBC0136-5FDE-594F-9CAA-94B144D64D8A}" dt="2024-12-09T02:27:21.883" v="276" actId="478"/>
+          <ac:spMkLst>
+            <pc:docMk/>
+            <pc:sldMk cId="91050093" sldId="260"/>
+            <ac:spMk id="5" creationId="{4FD3C88A-2BB1-352A-079D-6FF3EE9528CD}"/>
+          </ac:spMkLst>
+        </pc:spChg>
+        <pc:spChg chg="mod">
+          <ac:chgData name="Maxwell Cook" userId="6270a8f4b8f62cae" providerId="LiveId" clId="{BCBC0136-5FDE-594F-9CAA-94B144D64D8A}" dt="2024-12-09T02:27:38.732" v="281" actId="14100"/>
+          <ac:spMkLst>
+            <pc:docMk/>
+            <pc:sldMk cId="91050093" sldId="260"/>
+            <ac:spMk id="11" creationId="{73036D37-9F75-F97E-40E7-E590C53E436F}"/>
+          </ac:spMkLst>
+        </pc:spChg>
+        <pc:picChg chg="del">
+          <ac:chgData name="Maxwell Cook" userId="6270a8f4b8f62cae" providerId="LiveId" clId="{BCBC0136-5FDE-594F-9CAA-94B144D64D8A}" dt="2024-12-09T02:27:19.781" v="275" actId="478"/>
+          <ac:picMkLst>
+            <pc:docMk/>
+            <pc:sldMk cId="91050093" sldId="260"/>
+            <ac:picMk id="2" creationId="{DCFFE066-C6E3-5CCD-D14E-A63F7F13FCB5}"/>
+          </ac:picMkLst>
+        </pc:picChg>
+        <pc:picChg chg="add mod">
+          <ac:chgData name="Maxwell Cook" userId="6270a8f4b8f62cae" providerId="LiveId" clId="{BCBC0136-5FDE-594F-9CAA-94B144D64D8A}" dt="2024-12-09T02:40:59.207" v="286" actId="571"/>
+          <ac:picMkLst>
+            <pc:docMk/>
+            <pc:sldMk cId="91050093" sldId="260"/>
+            <ac:picMk id="3" creationId="{25B2159B-D18C-73EF-FF72-0A5637525D36}"/>
+          </ac:picMkLst>
+        </pc:picChg>
+        <pc:picChg chg="mod">
+          <ac:chgData name="Maxwell Cook" userId="6270a8f4b8f62cae" providerId="LiveId" clId="{BCBC0136-5FDE-594F-9CAA-94B144D64D8A}" dt="2024-12-09T02:41:00.488" v="287" actId="1076"/>
+          <ac:picMkLst>
+            <pc:docMk/>
+            <pc:sldMk cId="91050093" sldId="260"/>
+            <ac:picMk id="7" creationId="{923CC1A3-0F98-7DF5-4767-A176C060E689}"/>
           </ac:picMkLst>
         </pc:picChg>
       </pc:sldChg>
@@ -380,7 +610,7 @@
           <a:p>
             <a:fld id="{3620BDAC-38D5-A048-8F27-0D0639CFFB27}" type="datetimeFigureOut">
               <a:rPr lang="en-US" smtClean="0"/>
-              <a:t>12/6/24</a:t>
+              <a:t>12/8/24</a:t>
             </a:fld>
             <a:endParaRPr lang="en-US"/>
           </a:p>
@@ -550,7 +780,7 @@
           <a:p>
             <a:fld id="{3620BDAC-38D5-A048-8F27-0D0639CFFB27}" type="datetimeFigureOut">
               <a:rPr lang="en-US" smtClean="0"/>
-              <a:t>12/6/24</a:t>
+              <a:t>12/8/24</a:t>
             </a:fld>
             <a:endParaRPr lang="en-US"/>
           </a:p>
@@ -730,7 +960,7 @@
           <a:p>
             <a:fld id="{3620BDAC-38D5-A048-8F27-0D0639CFFB27}" type="datetimeFigureOut">
               <a:rPr lang="en-US" smtClean="0"/>
-              <a:t>12/6/24</a:t>
+              <a:t>12/8/24</a:t>
             </a:fld>
             <a:endParaRPr lang="en-US"/>
           </a:p>
@@ -900,7 +1130,7 @@
           <a:p>
             <a:fld id="{3620BDAC-38D5-A048-8F27-0D0639CFFB27}" type="datetimeFigureOut">
               <a:rPr lang="en-US" smtClean="0"/>
-              <a:t>12/6/24</a:t>
+              <a:t>12/8/24</a:t>
             </a:fld>
             <a:endParaRPr lang="en-US"/>
           </a:p>
@@ -1146,7 +1376,7 @@
           <a:p>
             <a:fld id="{3620BDAC-38D5-A048-8F27-0D0639CFFB27}" type="datetimeFigureOut">
               <a:rPr lang="en-US" smtClean="0"/>
-              <a:t>12/6/24</a:t>
+              <a:t>12/8/24</a:t>
             </a:fld>
             <a:endParaRPr lang="en-US"/>
           </a:p>
@@ -1378,7 +1608,7 @@
           <a:p>
             <a:fld id="{3620BDAC-38D5-A048-8F27-0D0639CFFB27}" type="datetimeFigureOut">
               <a:rPr lang="en-US" smtClean="0"/>
-              <a:t>12/6/24</a:t>
+              <a:t>12/8/24</a:t>
             </a:fld>
             <a:endParaRPr lang="en-US"/>
           </a:p>
@@ -1745,7 +1975,7 @@
           <a:p>
             <a:fld id="{3620BDAC-38D5-A048-8F27-0D0639CFFB27}" type="datetimeFigureOut">
               <a:rPr lang="en-US" smtClean="0"/>
-              <a:t>12/6/24</a:t>
+              <a:t>12/8/24</a:t>
             </a:fld>
             <a:endParaRPr lang="en-US"/>
           </a:p>
@@ -1863,7 +2093,7 @@
           <a:p>
             <a:fld id="{3620BDAC-38D5-A048-8F27-0D0639CFFB27}" type="datetimeFigureOut">
               <a:rPr lang="en-US" smtClean="0"/>
-              <a:t>12/6/24</a:t>
+              <a:t>12/8/24</a:t>
             </a:fld>
             <a:endParaRPr lang="en-US"/>
           </a:p>
@@ -1958,7 +2188,7 @@
           <a:p>
             <a:fld id="{3620BDAC-38D5-A048-8F27-0D0639CFFB27}" type="datetimeFigureOut">
               <a:rPr lang="en-US" smtClean="0"/>
-              <a:t>12/6/24</a:t>
+              <a:t>12/8/24</a:t>
             </a:fld>
             <a:endParaRPr lang="en-US"/>
           </a:p>
@@ -2235,7 +2465,7 @@
           <a:p>
             <a:fld id="{3620BDAC-38D5-A048-8F27-0D0639CFFB27}" type="datetimeFigureOut">
               <a:rPr lang="en-US" smtClean="0"/>
-              <a:t>12/6/24</a:t>
+              <a:t>12/8/24</a:t>
             </a:fld>
             <a:endParaRPr lang="en-US"/>
           </a:p>
@@ -2492,7 +2722,7 @@
           <a:p>
             <a:fld id="{3620BDAC-38D5-A048-8F27-0D0639CFFB27}" type="datetimeFigureOut">
               <a:rPr lang="en-US" smtClean="0"/>
-              <a:t>12/6/24</a:t>
+              <a:t>12/8/24</a:t>
             </a:fld>
             <a:endParaRPr lang="en-US"/>
           </a:p>
@@ -2705,7 +2935,7 @@
           <a:p>
             <a:fld id="{3620BDAC-38D5-A048-8F27-0D0639CFFB27}" type="datetimeFigureOut">
               <a:rPr lang="en-US" smtClean="0"/>
-              <a:t>12/6/24</a:t>
+              <a:t>12/8/24</a:t>
             </a:fld>
             <a:endParaRPr lang="en-US"/>
           </a:p>
@@ -3124,8 +3354,8 @@
         </p:nvSpPr>
         <p:spPr>
           <a:xfrm>
-            <a:off x="400206" y="6255384"/>
-            <a:ext cx="6057587" cy="938719"/>
+            <a:off x="406945" y="3730079"/>
+            <a:ext cx="5817734" cy="769441"/>
           </a:xfrm>
           <a:prstGeom prst="rect">
             <a:avLst/>
@@ -3139,13 +3369,26 @@
           <a:lstStyle/>
           <a:p>
             <a:r>
-              <a:rPr lang="en-US" sz="1100" b="1" dirty="0"/>
+              <a:rPr lang="en-US" sz="1100" b="1" i="0" u="none" strike="noStrike" dirty="0">
+                <a:solidFill>
+                  <a:srgbClr val="000000"/>
+                </a:solidFill>
+                <a:effectLst/>
+                <a:latin typeface="Times New Roman" panose="02020603050405020304" pitchFamily="18" charset="0"/>
+              </a:rPr>
               <a:t>Figure 1.</a:t>
             </a:r>
             <a:r>
-              <a:rPr lang="en-US" sz="1100" dirty="0"/>
-              <a:t> Study region and wildfire events. (A) Map of the Southern Rockies showing the locations of wildfire events with &gt;1% pre-fire aspen cover. Point size represents the burned area, color scale represents the percentage of aspen forest cover. (B) Fractional area of forest types from the USFS TreeMap (ca. 2016) making up 97% of total burned area across events. (C) Some other fire statistic (?)</a:t>
-            </a:r>
+              <a:rPr lang="en-US" sz="1100" b="0" i="0" u="none" strike="noStrike" dirty="0">
+                <a:solidFill>
+                  <a:srgbClr val="000000"/>
+                </a:solidFill>
+                <a:effectLst/>
+                <a:latin typeface="Times New Roman" panose="02020603050405020304" pitchFamily="18" charset="0"/>
+              </a:rPr>
+              <a:t> Study region and wildfire events. (A) Map of the SRM showing the locations of wildfire events with &gt;1% pre-fire aspen cover. Point size represents the burned area (ha), color scale represents the percentage of aspen forest cover; (B) annual burned area (ha); (C) distribution of fire size (or other statistics ??).</a:t>
+            </a:r>
+            <a:endParaRPr lang="en-US" sz="1100" dirty="0"/>
           </a:p>
         </p:txBody>
       </p:sp>
@@ -3170,7 +3413,7 @@
         </p:blipFill>
         <p:spPr>
           <a:xfrm>
-            <a:off x="505799" y="933624"/>
+            <a:off x="406945" y="89516"/>
             <a:ext cx="2894533" cy="3566140"/>
           </a:xfrm>
           <a:prstGeom prst="rect">
@@ -3200,7 +3443,7 @@
         </p:blipFill>
         <p:spPr>
           <a:xfrm>
-            <a:off x="3400332" y="914578"/>
+            <a:off x="3301478" y="70470"/>
             <a:ext cx="2923201" cy="1802117"/>
           </a:xfrm>
           <a:prstGeom prst="rect">
@@ -3229,8 +3472,90 @@
         </p:blipFill>
         <p:spPr>
           <a:xfrm>
-            <a:off x="3534592" y="2716695"/>
+            <a:off x="3435738" y="1872587"/>
             <a:ext cx="2788941" cy="1709350"/>
+          </a:xfrm>
+          <a:prstGeom prst="rect">
+            <a:avLst/>
+          </a:prstGeom>
+        </p:spPr>
+      </p:pic>
+      <p:sp>
+        <p:nvSpPr>
+          <p:cNvPr id="2" name="TextBox 1">
+            <a:extLst>
+              <a:ext uri="{FF2B5EF4-FFF2-40B4-BE49-F238E27FC236}">
+                <a16:creationId xmlns:a16="http://schemas.microsoft.com/office/drawing/2014/main" id="{97DB9CA4-0CDC-E44C-830B-06FB23CF1F21}"/>
+              </a:ext>
+            </a:extLst>
+          </p:cNvPr>
+          <p:cNvSpPr txBox="1"/>
+          <p:nvPr/>
+        </p:nvSpPr>
+        <p:spPr>
+          <a:xfrm>
+            <a:off x="400206" y="6967655"/>
+            <a:ext cx="6057587" cy="600164"/>
+          </a:xfrm>
+          <a:prstGeom prst="rect">
+            <a:avLst/>
+          </a:prstGeom>
+          <a:noFill/>
+        </p:spPr>
+        <p:txBody>
+          <a:bodyPr wrap="square" rtlCol="0">
+            <a:spAutoFit/>
+          </a:bodyPr>
+          <a:lstStyle/>
+          <a:p>
+            <a:r>
+              <a:rPr lang="en-US" sz="1100" b="1" i="0" u="none" strike="noStrike" dirty="0">
+                <a:solidFill>
+                  <a:srgbClr val="000000"/>
+                </a:solidFill>
+                <a:effectLst/>
+                <a:latin typeface="Times New Roman" panose="02020603050405020304" pitchFamily="18" charset="0"/>
+              </a:rPr>
+              <a:t>Figure 2.</a:t>
+            </a:r>
+            <a:r>
+              <a:rPr lang="en-US" sz="1100" b="0" i="0" u="none" strike="noStrike" dirty="0">
+                <a:solidFill>
+                  <a:srgbClr val="000000"/>
+                </a:solidFill>
+                <a:effectLst/>
+                <a:latin typeface="Times New Roman" panose="02020603050405020304" pitchFamily="18" charset="0"/>
+              </a:rPr>
+              <a:t> Aggregation of VIIRS FRP retrievals onto a regular grid. (A) Pixel centers of AFD from both satellites (S-NPP and JPSS-1); (B) Pixel ground area based on swath position (relative nadir position); (C) Cumulative FRP based on fractional assignment.</a:t>
+            </a:r>
+            <a:endParaRPr lang="en-US" sz="1100" dirty="0"/>
+          </a:p>
+        </p:txBody>
+      </p:sp>
+      <p:pic>
+        <p:nvPicPr>
+          <p:cNvPr id="7" name="Picture 6" descr="A map of the united states&#10;&#10;Description automatically generated">
+            <a:extLst>
+              <a:ext uri="{FF2B5EF4-FFF2-40B4-BE49-F238E27FC236}">
+                <a16:creationId xmlns:a16="http://schemas.microsoft.com/office/drawing/2014/main" id="{ED8A69DC-B15E-D82F-FCA4-DCABC91944BD}"/>
+              </a:ext>
+            </a:extLst>
+          </p:cNvPr>
+          <p:cNvPicPr>
+            <a:picLocks noChangeAspect="1"/>
+          </p:cNvPicPr>
+          <p:nvPr/>
+        </p:nvPicPr>
+        <p:blipFill>
+          <a:blip r:embed="rId5"/>
+          <a:stretch>
+            <a:fillRect/>
+          </a:stretch>
+        </p:blipFill>
+        <p:spPr>
+          <a:xfrm>
+            <a:off x="266940" y="4940886"/>
+            <a:ext cx="6337595" cy="1967441"/>
           </a:xfrm>
           <a:prstGeom prst="rect">
             <a:avLst/>
@@ -3275,10 +3600,10 @@
       </p:grpSpPr>
       <p:sp>
         <p:nvSpPr>
-          <p:cNvPr id="4" name="TextBox 3">
+          <p:cNvPr id="5" name="TextBox 4">
             <a:extLst>
               <a:ext uri="{FF2B5EF4-FFF2-40B4-BE49-F238E27FC236}">
-                <a16:creationId xmlns:a16="http://schemas.microsoft.com/office/drawing/2014/main" id="{745E791A-4600-2780-C000-C6662264EB0D}"/>
+                <a16:creationId xmlns:a16="http://schemas.microsoft.com/office/drawing/2014/main" id="{A79C5788-86F8-4CF1-B90E-9D123542E862}"/>
               </a:ext>
             </a:extLst>
           </p:cNvPr>
@@ -3287,8 +3612,8 @@
         </p:nvSpPr>
         <p:spPr>
           <a:xfrm>
-            <a:off x="400206" y="6255384"/>
-            <a:ext cx="6057587" cy="600164"/>
+            <a:off x="984010" y="3464346"/>
+            <a:ext cx="4650949" cy="430887"/>
           </a:xfrm>
           <a:prstGeom prst="rect">
             <a:avLst/>
@@ -3296,22 +3621,197 @@
           <a:noFill/>
         </p:spPr>
         <p:txBody>
-          <a:bodyPr wrap="square" rtlCol="0">
+          <a:bodyPr wrap="square">
             <a:spAutoFit/>
           </a:bodyPr>
           <a:lstStyle/>
           <a:p>
             <a:r>
-              <a:rPr lang="en-US" sz="1100" b="1" dirty="0"/>
-              <a:t>Figure 2.</a:t>
-            </a:r>
-            <a:r>
-              <a:rPr lang="en-US" sz="1100" dirty="0"/>
-              <a:t> Example of VIIRS fire radiative power allocations and summary statistics. (A-B) Allocation procedure onto regular grid (cumulative and maximum). (C) Total radiative power released by fire events in the study by forest type.</a:t>
-            </a:r>
-          </a:p>
-        </p:txBody>
-      </p:sp>
+              <a:rPr lang="en-US" sz="1100" b="1" i="0" u="none" strike="noStrike" dirty="0">
+                <a:solidFill>
+                  <a:srgbClr val="000000"/>
+                </a:solidFill>
+                <a:effectLst/>
+                <a:latin typeface="Times New Roman" panose="02020603050405020304" pitchFamily="18" charset="0"/>
+              </a:rPr>
+              <a:t>Figure 3.</a:t>
+            </a:r>
+            <a:r>
+              <a:rPr lang="en-US" sz="1100" b="0" i="0" u="none" strike="noStrike" dirty="0">
+                <a:solidFill>
+                  <a:srgbClr val="000000"/>
+                </a:solidFill>
+                <a:effectLst/>
+                <a:latin typeface="Times New Roman" panose="02020603050405020304" pitchFamily="18" charset="0"/>
+              </a:rPr>
+              <a:t> Landscape proportion of forest types making up 97% of the burned area within the aggregated FRP grids.</a:t>
+            </a:r>
+            <a:endParaRPr lang="en-US" sz="1100" dirty="0"/>
+          </a:p>
+        </p:txBody>
+      </p:sp>
+      <p:sp>
+        <p:nvSpPr>
+          <p:cNvPr id="11" name="TextBox 10">
+            <a:extLst>
+              <a:ext uri="{FF2B5EF4-FFF2-40B4-BE49-F238E27FC236}">
+                <a16:creationId xmlns:a16="http://schemas.microsoft.com/office/drawing/2014/main" id="{7D6D062A-BAFC-7CCC-5709-55901952AA28}"/>
+              </a:ext>
+            </a:extLst>
+          </p:cNvPr>
+          <p:cNvSpPr txBox="1"/>
+          <p:nvPr/>
+        </p:nvSpPr>
+        <p:spPr>
+          <a:xfrm>
+            <a:off x="212460" y="7101341"/>
+            <a:ext cx="6433079" cy="430887"/>
+          </a:xfrm>
+          <a:prstGeom prst="rect">
+            <a:avLst/>
+          </a:prstGeom>
+          <a:noFill/>
+        </p:spPr>
+        <p:txBody>
+          <a:bodyPr wrap="square">
+            <a:spAutoFit/>
+          </a:bodyPr>
+          <a:lstStyle/>
+          <a:p>
+            <a:r>
+              <a:rPr lang="en-US" sz="1100" b="1" i="0" u="none" strike="noStrike" dirty="0">
+                <a:solidFill>
+                  <a:srgbClr val="000000"/>
+                </a:solidFill>
+                <a:effectLst/>
+                <a:latin typeface="Times New Roman" panose="02020603050405020304" pitchFamily="18" charset="0"/>
+              </a:rPr>
+              <a:t>Figure 4. </a:t>
+            </a:r>
+            <a:r>
+              <a:rPr lang="en-US" sz="1100" b="0" i="0" u="none" strike="noStrike" dirty="0">
+                <a:solidFill>
+                  <a:srgbClr val="000000"/>
+                </a:solidFill>
+                <a:effectLst/>
+                <a:latin typeface="Times New Roman" panose="02020603050405020304" pitchFamily="18" charset="0"/>
+              </a:rPr>
+              <a:t>Maximum FRP (log-scaled) within dominant forest types. Dominance was determined based on the percent cover for each </a:t>
+            </a:r>
+            <a:r>
+              <a:rPr lang="en-US" sz="1100" b="0" i="0" u="none" strike="noStrike" dirty="0" err="1">
+                <a:solidFill>
+                  <a:srgbClr val="000000"/>
+                </a:solidFill>
+                <a:effectLst/>
+                <a:latin typeface="Times New Roman" panose="02020603050405020304" pitchFamily="18" charset="0"/>
+              </a:rPr>
+              <a:t>gridcell</a:t>
+            </a:r>
+            <a:r>
+              <a:rPr lang="en-US" sz="1100" b="0" i="0" u="none" strike="noStrike" dirty="0">
+                <a:solidFill>
+                  <a:srgbClr val="000000"/>
+                </a:solidFill>
+                <a:effectLst/>
+                <a:latin typeface="Times New Roman" panose="02020603050405020304" pitchFamily="18" charset="0"/>
+              </a:rPr>
+              <a:t> where one species made up &gt;80% of the total forested area.</a:t>
+            </a:r>
+            <a:endParaRPr lang="en-US" sz="1100" dirty="0"/>
+          </a:p>
+        </p:txBody>
+      </p:sp>
+      <p:pic>
+        <p:nvPicPr>
+          <p:cNvPr id="18" name="Picture 17" descr="A graph of different species&#10;&#10;Description automatically generated">
+            <a:extLst>
+              <a:ext uri="{FF2B5EF4-FFF2-40B4-BE49-F238E27FC236}">
+                <a16:creationId xmlns:a16="http://schemas.microsoft.com/office/drawing/2014/main" id="{165371AD-7AC1-F2A4-6575-D50A91EF561C}"/>
+              </a:ext>
+            </a:extLst>
+          </p:cNvPr>
+          <p:cNvPicPr>
+            <a:picLocks noChangeAspect="1"/>
+          </p:cNvPicPr>
+          <p:nvPr/>
+        </p:nvPicPr>
+        <p:blipFill>
+          <a:blip r:embed="rId2"/>
+          <a:stretch>
+            <a:fillRect/>
+          </a:stretch>
+        </p:blipFill>
+        <p:spPr>
+          <a:xfrm>
+            <a:off x="212459" y="4770929"/>
+            <a:ext cx="3068712" cy="2026508"/>
+          </a:xfrm>
+          <a:prstGeom prst="rect">
+            <a:avLst/>
+          </a:prstGeom>
+        </p:spPr>
+      </p:pic>
+      <p:pic>
+        <p:nvPicPr>
+          <p:cNvPr id="19" name="Picture 18" descr="A graph of different species&#10;&#10;Description automatically generated">
+            <a:extLst>
+              <a:ext uri="{FF2B5EF4-FFF2-40B4-BE49-F238E27FC236}">
+                <a16:creationId xmlns:a16="http://schemas.microsoft.com/office/drawing/2014/main" id="{E7050BB2-0BE8-51C5-24ED-7C2C917EF486}"/>
+              </a:ext>
+            </a:extLst>
+          </p:cNvPr>
+          <p:cNvPicPr>
+            <a:picLocks noChangeAspect="1"/>
+          </p:cNvPicPr>
+          <p:nvPr/>
+        </p:nvPicPr>
+        <p:blipFill>
+          <a:blip r:embed="rId2"/>
+          <a:stretch>
+            <a:fillRect/>
+          </a:stretch>
+        </p:blipFill>
+        <p:spPr>
+          <a:xfrm>
+            <a:off x="984011" y="266520"/>
+            <a:ext cx="4650948" cy="3071381"/>
+          </a:xfrm>
+          <a:prstGeom prst="rect">
+            <a:avLst/>
+          </a:prstGeom>
+        </p:spPr>
+      </p:pic>
+      <p:pic>
+        <p:nvPicPr>
+          <p:cNvPr id="21" name="Picture 20" descr="A chart with different colored boxes&#10;&#10;Description automatically generated">
+            <a:extLst>
+              <a:ext uri="{FF2B5EF4-FFF2-40B4-BE49-F238E27FC236}">
+                <a16:creationId xmlns:a16="http://schemas.microsoft.com/office/drawing/2014/main" id="{FA04D684-BD77-9437-795D-DA3C1E2813B7}"/>
+              </a:ext>
+            </a:extLst>
+          </p:cNvPr>
+          <p:cNvPicPr>
+            <a:picLocks noChangeAspect="1"/>
+          </p:cNvPicPr>
+          <p:nvPr/>
+        </p:nvPicPr>
+        <p:blipFill>
+          <a:blip r:embed="rId3"/>
+          <a:stretch>
+            <a:fillRect/>
+          </a:stretch>
+        </p:blipFill>
+        <p:spPr>
+          <a:xfrm>
+            <a:off x="3576826" y="4770929"/>
+            <a:ext cx="3068712" cy="2026508"/>
+          </a:xfrm>
+          <a:prstGeom prst="rect">
+            <a:avLst/>
+          </a:prstGeom>
+        </p:spPr>
+      </p:pic>
     </p:spTree>
     <p:extLst>
       <p:ext uri="{BB962C8B-B14F-4D97-AF65-F5344CB8AC3E}">
@@ -3333,7 +3833,7 @@
         <p:cNvPr id="1" name="">
           <a:extLst>
             <a:ext uri="{FF2B5EF4-FFF2-40B4-BE49-F238E27FC236}">
-              <a16:creationId xmlns:a16="http://schemas.microsoft.com/office/drawing/2014/main" id="{E3DFB5B9-06B8-9881-507A-66A41FE72C86}"/>
+              <a16:creationId xmlns:a16="http://schemas.microsoft.com/office/drawing/2014/main" id="{104D3E4E-B981-5DC1-AD3C-8A6060EDD435}"/>
             </a:ext>
           </a:extLst>
         </p:cNvPr>
@@ -3348,12 +3848,42 @@
           <a:chExt cx="0" cy="0"/>
         </a:xfrm>
       </p:grpSpPr>
-      <p:sp>
-        <p:nvSpPr>
-          <p:cNvPr id="4" name="TextBox 3">
+      <p:pic>
+        <p:nvPicPr>
+          <p:cNvPr id="7" name="Picture 6" descr="A graph of different colored squares&#10;&#10;Description automatically generated">
             <a:extLst>
               <a:ext uri="{FF2B5EF4-FFF2-40B4-BE49-F238E27FC236}">
-                <a16:creationId xmlns:a16="http://schemas.microsoft.com/office/drawing/2014/main" id="{6CC49D13-7743-3607-9FE4-30AD62512434}"/>
+                <a16:creationId xmlns:a16="http://schemas.microsoft.com/office/drawing/2014/main" id="{923CC1A3-0F98-7DF5-4767-A176C060E689}"/>
+              </a:ext>
+            </a:extLst>
+          </p:cNvPr>
+          <p:cNvPicPr>
+            <a:picLocks noChangeAspect="1"/>
+          </p:cNvPicPr>
+          <p:nvPr/>
+        </p:nvPicPr>
+        <p:blipFill>
+          <a:blip r:embed="rId2"/>
+          <a:stretch>
+            <a:fillRect/>
+          </a:stretch>
+        </p:blipFill>
+        <p:spPr>
+          <a:xfrm>
+            <a:off x="840537" y="194380"/>
+            <a:ext cx="4744996" cy="3088724"/>
+          </a:xfrm>
+          <a:prstGeom prst="rect">
+            <a:avLst/>
+          </a:prstGeom>
+        </p:spPr>
+      </p:pic>
+      <p:sp>
+        <p:nvSpPr>
+          <p:cNvPr id="11" name="TextBox 10">
+            <a:extLst>
+              <a:ext uri="{FF2B5EF4-FFF2-40B4-BE49-F238E27FC236}">
+                <a16:creationId xmlns:a16="http://schemas.microsoft.com/office/drawing/2014/main" id="{73036D37-9F75-F97E-40E7-E590C53E436F}"/>
               </a:ext>
             </a:extLst>
           </p:cNvPr>
@@ -3362,8 +3892,8 @@
         </p:nvSpPr>
         <p:spPr>
           <a:xfrm>
-            <a:off x="400206" y="6255384"/>
-            <a:ext cx="6057587" cy="261610"/>
+            <a:off x="840537" y="3283104"/>
+            <a:ext cx="5350198" cy="600164"/>
           </a:xfrm>
           <a:prstGeom prst="rect">
             <a:avLst/>
@@ -3371,73 +3901,59 @@
           <a:noFill/>
         </p:spPr>
         <p:txBody>
-          <a:bodyPr wrap="square" rtlCol="0">
+          <a:bodyPr wrap="square">
             <a:spAutoFit/>
           </a:bodyPr>
           <a:lstStyle/>
           <a:p>
             <a:r>
-              <a:rPr lang="en-US" sz="1100" b="1" dirty="0"/>
-              <a:t>Figure 3.</a:t>
-            </a:r>
-            <a:r>
-              <a:rPr lang="en-US" sz="1100" dirty="0"/>
-              <a:t> Maximum FRP by dominant (&gt;90% of grid cell area) forest type. </a:t>
-            </a:r>
-          </a:p>
-        </p:txBody>
-      </p:sp>
-      <p:pic>
-        <p:nvPicPr>
-          <p:cNvPr id="2050" name="Picture 2">
-            <a:extLst>
-              <a:ext uri="{FF2B5EF4-FFF2-40B4-BE49-F238E27FC236}">
-                <a16:creationId xmlns:a16="http://schemas.microsoft.com/office/drawing/2014/main" id="{D103CF78-23E6-F59A-80B1-587E5EF688BC}"/>
-              </a:ext>
-            </a:extLst>
-          </p:cNvPr>
-          <p:cNvPicPr>
-            <a:picLocks noChangeAspect="1" noChangeArrowheads="1"/>
-          </p:cNvPicPr>
-          <p:nvPr/>
-        </p:nvPicPr>
-        <p:blipFill>
-          <a:blip r:embed="rId2">
-            <a:extLst>
-              <a:ext uri="{28A0092B-C50C-407E-A947-70E740481C1C}">
-                <a14:useLocalDpi xmlns:a14="http://schemas.microsoft.com/office/drawing/2010/main" val="0"/>
-              </a:ext>
-            </a:extLst>
-          </a:blip>
-          <a:srcRect/>
-          <a:stretch>
-            <a:fillRect/>
-          </a:stretch>
-        </p:blipFill>
-        <p:spPr bwMode="auto">
-          <a:xfrm>
-            <a:off x="400206" y="1425989"/>
-            <a:ext cx="3161789" cy="2085837"/>
-          </a:xfrm>
-          <a:prstGeom prst="rect">
-            <a:avLst/>
-          </a:prstGeom>
-          <a:noFill/>
-          <a:extLst>
-            <a:ext uri="{909E8E84-426E-40DD-AFC4-6F175D3DCCD1}">
-              <a14:hiddenFill xmlns:a14="http://schemas.microsoft.com/office/drawing/2010/main">
+              <a:rPr lang="en-US" sz="1100" b="1" i="0" u="none" strike="noStrike" dirty="0">
                 <a:solidFill>
-                  <a:srgbClr val="FFFFFF"/>
+                  <a:srgbClr val="000000"/>
                 </a:solidFill>
-              </a14:hiddenFill>
-            </a:ext>
-          </a:extLst>
-        </p:spPr>
-      </p:pic>
+                <a:effectLst/>
+                <a:latin typeface="Times New Roman" panose="02020603050405020304" pitchFamily="18" charset="0"/>
+              </a:rPr>
+              <a:t>Figure 4. </a:t>
+            </a:r>
+            <a:r>
+              <a:rPr lang="en-US" sz="1100" b="0" i="0" u="none" strike="noStrike" dirty="0">
+                <a:solidFill>
+                  <a:srgbClr val="000000"/>
+                </a:solidFill>
+                <a:effectLst/>
+                <a:latin typeface="Times New Roman" panose="02020603050405020304" pitchFamily="18" charset="0"/>
+              </a:rPr>
+              <a:t>Maximum FRP (log-scaled) within dominant forest types. Dominance was determined based on the percent cover for each </a:t>
+            </a:r>
+            <a:r>
+              <a:rPr lang="en-US" sz="1100" b="0" i="0" u="none" strike="noStrike" dirty="0" err="1">
+                <a:solidFill>
+                  <a:srgbClr val="000000"/>
+                </a:solidFill>
+                <a:effectLst/>
+                <a:latin typeface="Times New Roman" panose="02020603050405020304" pitchFamily="18" charset="0"/>
+              </a:rPr>
+              <a:t>gridcell</a:t>
+            </a:r>
+            <a:r>
+              <a:rPr lang="en-US" sz="1100" b="0" i="0" u="none" strike="noStrike" dirty="0">
+                <a:solidFill>
+                  <a:srgbClr val="000000"/>
+                </a:solidFill>
+                <a:effectLst/>
+                <a:latin typeface="Times New Roman" panose="02020603050405020304" pitchFamily="18" charset="0"/>
+              </a:rPr>
+              <a:t> where one species made up &gt;80% of the total forested area.</a:t>
+            </a:r>
+            <a:endParaRPr lang="en-US" sz="1100" dirty="0"/>
+          </a:p>
+        </p:txBody>
+      </p:sp>
     </p:spTree>
     <p:extLst>
       <p:ext uri="{BB962C8B-B14F-4D97-AF65-F5344CB8AC3E}">
-        <p14:creationId xmlns:p14="http://schemas.microsoft.com/office/powerpoint/2010/main" val="1043661401"/>
+        <p14:creationId xmlns:p14="http://schemas.microsoft.com/office/powerpoint/2010/main" val="91050093"/>
       </p:ext>
     </p:extLst>
   </p:cSld>
@@ -3448,6 +3964,124 @@
 </file>
 
 <file path=ppt/slides/slide4.xml><?xml version="1.0" encoding="utf-8"?>
+<p:sld xmlns:a="http://schemas.openxmlformats.org/drawingml/2006/main" xmlns:r="http://schemas.openxmlformats.org/officeDocument/2006/relationships" xmlns:p="http://schemas.openxmlformats.org/presentationml/2006/main">
+  <p:cSld>
+    <p:spTree>
+      <p:nvGrpSpPr>
+        <p:cNvPr id="1" name="">
+          <a:extLst>
+            <a:ext uri="{FF2B5EF4-FFF2-40B4-BE49-F238E27FC236}">
+              <a16:creationId xmlns:a16="http://schemas.microsoft.com/office/drawing/2014/main" id="{0942059F-EE54-DD98-75BD-6C06BFBA4A4A}"/>
+            </a:ext>
+          </a:extLst>
+        </p:cNvPr>
+        <p:cNvGrpSpPr/>
+        <p:nvPr/>
+      </p:nvGrpSpPr>
+      <p:grpSpPr>
+        <a:xfrm>
+          <a:off x="0" y="0"/>
+          <a:ext cx="0" cy="0"/>
+          <a:chOff x="0" y="0"/>
+          <a:chExt cx="0" cy="0"/>
+        </a:xfrm>
+      </p:grpSpPr>
+      <p:sp>
+        <p:nvSpPr>
+          <p:cNvPr id="11" name="TextBox 10">
+            <a:extLst>
+              <a:ext uri="{FF2B5EF4-FFF2-40B4-BE49-F238E27FC236}">
+                <a16:creationId xmlns:a16="http://schemas.microsoft.com/office/drawing/2014/main" id="{33BCC1AD-FC10-BA1B-0690-2E8547E1D3D6}"/>
+              </a:ext>
+            </a:extLst>
+          </p:cNvPr>
+          <p:cNvSpPr txBox="1"/>
+          <p:nvPr/>
+        </p:nvSpPr>
+        <p:spPr>
+          <a:xfrm>
+            <a:off x="212459" y="7385547"/>
+            <a:ext cx="6433079" cy="769441"/>
+          </a:xfrm>
+          <a:prstGeom prst="rect">
+            <a:avLst/>
+          </a:prstGeom>
+          <a:noFill/>
+        </p:spPr>
+        <p:txBody>
+          <a:bodyPr wrap="square">
+            <a:spAutoFit/>
+          </a:bodyPr>
+          <a:lstStyle/>
+          <a:p>
+            <a:r>
+              <a:rPr lang="en-US" sz="1100" b="1" i="0" u="none" strike="noStrike" dirty="0">
+                <a:solidFill>
+                  <a:srgbClr val="000000"/>
+                </a:solidFill>
+                <a:effectLst/>
+                <a:latin typeface="Times New Roman" panose="02020603050405020304" pitchFamily="18" charset="0"/>
+              </a:rPr>
+              <a:t>Figure 5. </a:t>
+            </a:r>
+            <a:r>
+              <a:rPr lang="en-US" sz="1100" b="0" i="0" u="none" strike="noStrike" dirty="0">
+                <a:solidFill>
+                  <a:srgbClr val="000000"/>
+                </a:solidFill>
+                <a:effectLst/>
+                <a:latin typeface="Times New Roman" panose="02020603050405020304" pitchFamily="18" charset="0"/>
+              </a:rPr>
+              <a:t>Effects of species co-occurrence on maximum FRP. Column (A) two-way interactions between aspen and co-occurring conifer percent cover where the aspen + co-occurring cover is &gt;50%. Column (B) distribution of aspen and co-occurring species percent cover, again where at least 50% of forested area is made up of those two types.</a:t>
+            </a:r>
+            <a:endParaRPr lang="en-US" sz="1100" dirty="0"/>
+          </a:p>
+        </p:txBody>
+      </p:sp>
+      <p:pic>
+        <p:nvPicPr>
+          <p:cNvPr id="10" name="Picture 9" descr="A screenshot of a graph&#10;&#10;Description automatically generated">
+            <a:extLst>
+              <a:ext uri="{FF2B5EF4-FFF2-40B4-BE49-F238E27FC236}">
+                <a16:creationId xmlns:a16="http://schemas.microsoft.com/office/drawing/2014/main" id="{59143A86-DEB9-B3F9-9782-858617354620}"/>
+              </a:ext>
+            </a:extLst>
+          </p:cNvPr>
+          <p:cNvPicPr>
+            <a:picLocks noChangeAspect="1"/>
+          </p:cNvPicPr>
+          <p:nvPr/>
+        </p:nvPicPr>
+        <p:blipFill>
+          <a:blip r:embed="rId2"/>
+          <a:stretch>
+            <a:fillRect/>
+          </a:stretch>
+        </p:blipFill>
+        <p:spPr>
+          <a:xfrm>
+            <a:off x="940922" y="185351"/>
+            <a:ext cx="4740776" cy="7068065"/>
+          </a:xfrm>
+          <a:prstGeom prst="rect">
+            <a:avLst/>
+          </a:prstGeom>
+        </p:spPr>
+      </p:pic>
+    </p:spTree>
+    <p:extLst>
+      <p:ext uri="{BB962C8B-B14F-4D97-AF65-F5344CB8AC3E}">
+        <p14:creationId xmlns:p14="http://schemas.microsoft.com/office/powerpoint/2010/main" val="3585360381"/>
+      </p:ext>
+    </p:extLst>
+  </p:cSld>
+  <p:clrMapOvr>
+    <a:masterClrMapping/>
+  </p:clrMapOvr>
+</p:sld>
+</file>
+
+<file path=ppt/slides/slide5.xml><?xml version="1.0" encoding="utf-8"?>
 <p:sld xmlns:a="http://schemas.openxmlformats.org/drawingml/2006/main" xmlns:r="http://schemas.openxmlformats.org/officeDocument/2006/relationships" xmlns:p="http://schemas.openxmlformats.org/presentationml/2006/main">
   <p:cSld>
     <p:spTree>

</xml_diff>

<commit_message>
Mostly updates to the TreeMap workflow and integration of climate+topo
</commit_message>
<xml_diff>
--- a/Aim2/figures/figure_arrangement.pptx
+++ b/Aim2/figures/figure_arrangement.pptx
@@ -130,7 +130,7 @@
 <file path=ppt/revisionInfo.xml><?xml version="1.0" encoding="utf-8"?>
 <p1510:revInfo xmlns:a="http://schemas.openxmlformats.org/drawingml/2006/main" xmlns:r="http://schemas.openxmlformats.org/officeDocument/2006/relationships" xmlns:p1510="http://schemas.microsoft.com/office/powerpoint/2015/10/main">
   <p1510:revLst>
-    <p1510:client id="{BCBC0136-5FDE-594F-9CAA-94B144D64D8A}" v="72" dt="2024-12-09T02:40:59.207"/>
+    <p1510:client id="{BCBC0136-5FDE-594F-9CAA-94B144D64D8A}" v="74" dt="2025-01-06T18:50:15.290"/>
   </p1510:revLst>
 </p1510:revInfo>
 </file>
@@ -140,7 +140,7 @@
   <pc:docChgLst>
     <pc:chgData name="Maxwell Cook" userId="6270a8f4b8f62cae" providerId="LiveId" clId="{BCBC0136-5FDE-594F-9CAA-94B144D64D8A}"/>
     <pc:docChg chg="undo custSel addSld delSld modSld">
-      <pc:chgData name="Maxwell Cook" userId="6270a8f4b8f62cae" providerId="LiveId" clId="{BCBC0136-5FDE-594F-9CAA-94B144D64D8A}" dt="2024-12-09T02:41:00.488" v="287" actId="1076"/>
+      <pc:chgData name="Maxwell Cook" userId="6270a8f4b8f62cae" providerId="LiveId" clId="{BCBC0136-5FDE-594F-9CAA-94B144D64D8A}" dt="2025-01-06T18:50:32.055" v="303" actId="1076"/>
       <pc:docMkLst>
         <pc:docMk/>
       </pc:docMkLst>
@@ -166,14 +166,6 @@
             <ac:spMk id="4" creationId="{8F36A069-3398-2F21-F20D-6DE2C885920E}"/>
           </ac:spMkLst>
         </pc:spChg>
-        <pc:picChg chg="add del mod">
-          <ac:chgData name="Maxwell Cook" userId="6270a8f4b8f62cae" providerId="LiveId" clId="{BCBC0136-5FDE-594F-9CAA-94B144D64D8A}" dt="2024-12-09T02:15:13.673" v="112" actId="478"/>
-          <ac:picMkLst>
-            <pc:docMk/>
-            <pc:sldMk cId="3693775636" sldId="256"/>
-            <ac:picMk id="3" creationId="{5F0B8E92-6FD4-9876-A0BD-3450E2BCE9E4}"/>
-          </ac:picMkLst>
-        </pc:picChg>
         <pc:picChg chg="add mod">
           <ac:chgData name="Maxwell Cook" userId="6270a8f4b8f62cae" providerId="LiveId" clId="{BCBC0136-5FDE-594F-9CAA-94B144D64D8A}" dt="2024-12-09T00:46:16.724" v="97" actId="1076"/>
           <ac:picMkLst>
@@ -236,14 +228,6 @@
           <pc:docMk/>
           <pc:sldMk cId="3862617950" sldId="258"/>
         </pc:sldMkLst>
-        <pc:spChg chg="del mod">
-          <ac:chgData name="Maxwell Cook" userId="6270a8f4b8f62cae" providerId="LiveId" clId="{BCBC0136-5FDE-594F-9CAA-94B144D64D8A}" dt="2024-12-09T00:46:21.529" v="98" actId="21"/>
-          <ac:spMkLst>
-            <pc:docMk/>
-            <pc:sldMk cId="3862617950" sldId="258"/>
-            <ac:spMk id="4" creationId="{745E791A-4600-2780-C000-C6662264EB0D}"/>
-          </ac:spMkLst>
-        </pc:spChg>
         <pc:spChg chg="add mod">
           <ac:chgData name="Maxwell Cook" userId="6270a8f4b8f62cae" providerId="LiveId" clId="{BCBC0136-5FDE-594F-9CAA-94B144D64D8A}" dt="2024-12-09T02:26:51.308" v="252" actId="14100"/>
           <ac:spMkLst>
@@ -260,62 +244,6 @@
             <ac:spMk id="11" creationId="{7D6D062A-BAFC-7CCC-5709-55901952AA28}"/>
           </ac:spMkLst>
         </pc:spChg>
-        <pc:spChg chg="add del mod">
-          <ac:chgData name="Maxwell Cook" userId="6270a8f4b8f62cae" providerId="LiveId" clId="{BCBC0136-5FDE-594F-9CAA-94B144D64D8A}" dt="2024-12-09T02:40:53.194" v="284" actId="478"/>
-          <ac:spMkLst>
-            <pc:docMk/>
-            <pc:sldMk cId="3862617950" sldId="258"/>
-            <ac:spMk id="22" creationId="{2CFA76FF-A607-1208-C6FB-421CF56E2FD8}"/>
-          </ac:spMkLst>
-        </pc:spChg>
-        <pc:picChg chg="add del mod">
-          <ac:chgData name="Maxwell Cook" userId="6270a8f4b8f62cae" providerId="LiveId" clId="{BCBC0136-5FDE-594F-9CAA-94B144D64D8A}" dt="2024-12-09T02:24:34.837" v="227" actId="478"/>
-          <ac:picMkLst>
-            <pc:docMk/>
-            <pc:sldMk cId="3862617950" sldId="258"/>
-            <ac:picMk id="2" creationId="{8008F2CC-28A6-049D-2A5C-A2F1844AF9BC}"/>
-          </ac:picMkLst>
-        </pc:picChg>
-        <pc:picChg chg="add del mod">
-          <ac:chgData name="Maxwell Cook" userId="6270a8f4b8f62cae" providerId="LiveId" clId="{BCBC0136-5FDE-594F-9CAA-94B144D64D8A}" dt="2024-12-09T02:23:19.824" v="204" actId="478"/>
-          <ac:picMkLst>
-            <pc:docMk/>
-            <pc:sldMk cId="3862617950" sldId="258"/>
-            <ac:picMk id="7" creationId="{D1011923-EB48-18AE-3E0E-0DEF2938C04A}"/>
-          </ac:picMkLst>
-        </pc:picChg>
-        <pc:picChg chg="add del mod">
-          <ac:chgData name="Maxwell Cook" userId="6270a8f4b8f62cae" providerId="LiveId" clId="{BCBC0136-5FDE-594F-9CAA-94B144D64D8A}" dt="2024-12-09T02:17:55.843" v="139" actId="478"/>
-          <ac:picMkLst>
-            <pc:docMk/>
-            <pc:sldMk cId="3862617950" sldId="258"/>
-            <ac:picMk id="9" creationId="{DF66933A-1B33-27C0-176E-B6C0F6D04FDE}"/>
-          </ac:picMkLst>
-        </pc:picChg>
-        <pc:picChg chg="add del mod">
-          <ac:chgData name="Maxwell Cook" userId="6270a8f4b8f62cae" providerId="LiveId" clId="{BCBC0136-5FDE-594F-9CAA-94B144D64D8A}" dt="2024-12-09T02:23:49.723" v="218" actId="478"/>
-          <ac:picMkLst>
-            <pc:docMk/>
-            <pc:sldMk cId="3862617950" sldId="258"/>
-            <ac:picMk id="12" creationId="{58839824-ACCC-3336-78D6-19A8BAAC5A94}"/>
-          </ac:picMkLst>
-        </pc:picChg>
-        <pc:picChg chg="add del mod">
-          <ac:chgData name="Maxwell Cook" userId="6270a8f4b8f62cae" providerId="LiveId" clId="{BCBC0136-5FDE-594F-9CAA-94B144D64D8A}" dt="2024-12-09T02:26:09.206" v="239" actId="478"/>
-          <ac:picMkLst>
-            <pc:docMk/>
-            <pc:sldMk cId="3862617950" sldId="258"/>
-            <ac:picMk id="14" creationId="{A60C1283-136A-0EA9-6F5B-001281342B90}"/>
-          </ac:picMkLst>
-        </pc:picChg>
-        <pc:picChg chg="add del mod">
-          <ac:chgData name="Maxwell Cook" userId="6270a8f4b8f62cae" providerId="LiveId" clId="{BCBC0136-5FDE-594F-9CAA-94B144D64D8A}" dt="2024-12-09T02:24:04.508" v="222" actId="478"/>
-          <ac:picMkLst>
-            <pc:docMk/>
-            <pc:sldMk cId="3862617950" sldId="258"/>
-            <ac:picMk id="16" creationId="{83207813-2162-1B01-5C40-3FDB6F243429}"/>
-          </ac:picMkLst>
-        </pc:picChg>
         <pc:picChg chg="add mod">
           <ac:chgData name="Maxwell Cook" userId="6270a8f4b8f62cae" providerId="LiveId" clId="{BCBC0136-5FDE-594F-9CAA-94B144D64D8A}" dt="2024-12-09T02:26:33.467" v="247" actId="1076"/>
           <ac:picMkLst>
@@ -340,14 +268,6 @@
             <ac:picMk id="21" creationId="{FA04D684-BD77-9437-795D-DA3C1E2813B7}"/>
           </ac:picMkLst>
         </pc:picChg>
-        <pc:picChg chg="add del mod">
-          <ac:chgData name="Maxwell Cook" userId="6270a8f4b8f62cae" providerId="LiveId" clId="{BCBC0136-5FDE-594F-9CAA-94B144D64D8A}" dt="2024-12-09T00:46:21.529" v="98" actId="21"/>
-          <ac:picMkLst>
-            <pc:docMk/>
-            <pc:sldMk cId="3862617950" sldId="258"/>
-            <ac:picMk id="1026" creationId="{529E070E-DFF5-B639-D926-D3CEC939C36A}"/>
-          </ac:picMkLst>
-        </pc:picChg>
       </pc:sldChg>
       <pc:sldChg chg="addSp delSp modSp del mod">
         <pc:chgData name="Maxwell Cook" userId="6270a8f4b8f62cae" providerId="LiveId" clId="{BCBC0136-5FDE-594F-9CAA-94B144D64D8A}" dt="2024-12-09T00:46:06.348" v="96" actId="2696"/>
@@ -355,14 +275,6 @@
           <pc:docMk/>
           <pc:sldMk cId="1043661401" sldId="259"/>
         </pc:sldMkLst>
-        <pc:spChg chg="mod">
-          <ac:chgData name="Maxwell Cook" userId="6270a8f4b8f62cae" providerId="LiveId" clId="{BCBC0136-5FDE-594F-9CAA-94B144D64D8A}" dt="2024-12-09T00:44:28.268" v="76" actId="1076"/>
-          <ac:spMkLst>
-            <pc:docMk/>
-            <pc:sldMk cId="1043661401" sldId="259"/>
-            <ac:spMk id="4" creationId="{6CC49D13-7743-3607-9FE4-30AD62512434}"/>
-          </ac:spMkLst>
-        </pc:spChg>
       </pc:sldChg>
       <pc:sldChg chg="addSp delSp modSp add mod">
         <pc:chgData name="Maxwell Cook" userId="6270a8f4b8f62cae" providerId="LiveId" clId="{BCBC0136-5FDE-594F-9CAA-94B144D64D8A}" dt="2024-12-09T02:21:15.589" v="202" actId="255"/>
@@ -370,14 +282,6 @@
           <pc:docMk/>
           <pc:sldMk cId="3585360381" sldId="259"/>
         </pc:sldMkLst>
-        <pc:spChg chg="del">
-          <ac:chgData name="Maxwell Cook" userId="6270a8f4b8f62cae" providerId="LiveId" clId="{BCBC0136-5FDE-594F-9CAA-94B144D64D8A}" dt="2024-12-09T02:20:14.509" v="187" actId="478"/>
-          <ac:spMkLst>
-            <pc:docMk/>
-            <pc:sldMk cId="3585360381" sldId="259"/>
-            <ac:spMk id="5" creationId="{DC1064FD-5A3B-14CE-DCE7-F0D11442CD95}"/>
-          </ac:spMkLst>
-        </pc:spChg>
         <pc:spChg chg="mod">
           <ac:chgData name="Maxwell Cook" userId="6270a8f4b8f62cae" providerId="LiveId" clId="{BCBC0136-5FDE-594F-9CAA-94B144D64D8A}" dt="2024-12-09T02:21:15.589" v="202" actId="255"/>
           <ac:spMkLst>
@@ -386,38 +290,6 @@
             <ac:spMk id="11" creationId="{33BCC1AD-FC10-BA1B-0690-2E8547E1D3D6}"/>
           </ac:spMkLst>
         </pc:spChg>
-        <pc:picChg chg="del">
-          <ac:chgData name="Maxwell Cook" userId="6270a8f4b8f62cae" providerId="LiveId" clId="{BCBC0136-5FDE-594F-9CAA-94B144D64D8A}" dt="2024-12-09T02:20:11.447" v="186" actId="478"/>
-          <ac:picMkLst>
-            <pc:docMk/>
-            <pc:sldMk cId="3585360381" sldId="259"/>
-            <ac:picMk id="2" creationId="{6F48B963-17C5-84D3-23B7-B291043946B7}"/>
-          </ac:picMkLst>
-        </pc:picChg>
-        <pc:picChg chg="add del mod">
-          <ac:chgData name="Maxwell Cook" userId="6270a8f4b8f62cae" providerId="LiveId" clId="{BCBC0136-5FDE-594F-9CAA-94B144D64D8A}" dt="2024-12-09T02:20:26.009" v="191" actId="478"/>
-          <ac:picMkLst>
-            <pc:docMk/>
-            <pc:sldMk cId="3585360381" sldId="259"/>
-            <ac:picMk id="4" creationId="{26ACD4C9-43E6-D42B-32C7-2C72B842DBF0}"/>
-          </ac:picMkLst>
-        </pc:picChg>
-        <pc:picChg chg="del">
-          <ac:chgData name="Maxwell Cook" userId="6270a8f4b8f62cae" providerId="LiveId" clId="{BCBC0136-5FDE-594F-9CAA-94B144D64D8A}" dt="2024-12-09T02:20:09.715" v="185" actId="478"/>
-          <ac:picMkLst>
-            <pc:docMk/>
-            <pc:sldMk cId="3585360381" sldId="259"/>
-            <ac:picMk id="7" creationId="{0D61F2E8-A407-112A-2A00-EC4E11D82388}"/>
-          </ac:picMkLst>
-        </pc:picChg>
-        <pc:picChg chg="add del mod">
-          <ac:chgData name="Maxwell Cook" userId="6270a8f4b8f62cae" providerId="LiveId" clId="{BCBC0136-5FDE-594F-9CAA-94B144D64D8A}" dt="2024-12-09T02:20:40.836" v="195" actId="478"/>
-          <ac:picMkLst>
-            <pc:docMk/>
-            <pc:sldMk cId="3585360381" sldId="259"/>
-            <ac:picMk id="8" creationId="{46E778B6-7C49-D613-340D-57D08ADFB036}"/>
-          </ac:picMkLst>
-        </pc:picChg>
         <pc:picChg chg="add mod">
           <ac:chgData name="Maxwell Cook" userId="6270a8f4b8f62cae" providerId="LiveId" clId="{BCBC0136-5FDE-594F-9CAA-94B144D64D8A}" dt="2024-12-09T02:21:02.232" v="200" actId="1076"/>
           <ac:picMkLst>
@@ -428,19 +300,11 @@
         </pc:picChg>
       </pc:sldChg>
       <pc:sldChg chg="addSp delSp modSp add mod">
-        <pc:chgData name="Maxwell Cook" userId="6270a8f4b8f62cae" providerId="LiveId" clId="{BCBC0136-5FDE-594F-9CAA-94B144D64D8A}" dt="2024-12-09T02:41:00.488" v="287" actId="1076"/>
+        <pc:chgData name="Maxwell Cook" userId="6270a8f4b8f62cae" providerId="LiveId" clId="{BCBC0136-5FDE-594F-9CAA-94B144D64D8A}" dt="2025-01-06T18:50:32.055" v="303" actId="1076"/>
         <pc:sldMkLst>
           <pc:docMk/>
           <pc:sldMk cId="91050093" sldId="260"/>
         </pc:sldMkLst>
-        <pc:spChg chg="del">
-          <ac:chgData name="Maxwell Cook" userId="6270a8f4b8f62cae" providerId="LiveId" clId="{BCBC0136-5FDE-594F-9CAA-94B144D64D8A}" dt="2024-12-09T02:27:21.883" v="276" actId="478"/>
-          <ac:spMkLst>
-            <pc:docMk/>
-            <pc:sldMk cId="91050093" sldId="260"/>
-            <ac:spMk id="5" creationId="{4FD3C88A-2BB1-352A-079D-6FF3EE9528CD}"/>
-          </ac:spMkLst>
-        </pc:spChg>
         <pc:spChg chg="mod">
           <ac:chgData name="Maxwell Cook" userId="6270a8f4b8f62cae" providerId="LiveId" clId="{BCBC0136-5FDE-594F-9CAA-94B144D64D8A}" dt="2024-12-09T02:27:38.732" v="281" actId="14100"/>
           <ac:spMkLst>
@@ -449,20 +313,20 @@
             <ac:spMk id="11" creationId="{73036D37-9F75-F97E-40E7-E590C53E436F}"/>
           </ac:spMkLst>
         </pc:spChg>
-        <pc:picChg chg="del">
-          <ac:chgData name="Maxwell Cook" userId="6270a8f4b8f62cae" providerId="LiveId" clId="{BCBC0136-5FDE-594F-9CAA-94B144D64D8A}" dt="2024-12-09T02:27:19.781" v="275" actId="478"/>
+        <pc:picChg chg="add mod">
+          <ac:chgData name="Maxwell Cook" userId="6270a8f4b8f62cae" providerId="LiveId" clId="{BCBC0136-5FDE-594F-9CAA-94B144D64D8A}" dt="2025-01-06T18:50:32.055" v="303" actId="1076"/>
           <ac:picMkLst>
             <pc:docMk/>
             <pc:sldMk cId="91050093" sldId="260"/>
-            <ac:picMk id="2" creationId="{DCFFE066-C6E3-5CCD-D14E-A63F7F13FCB5}"/>
+            <ac:picMk id="3" creationId="{BA2516EA-7A25-CF23-F001-66FCC09B54C8}"/>
           </ac:picMkLst>
         </pc:picChg>
         <pc:picChg chg="add mod">
-          <ac:chgData name="Maxwell Cook" userId="6270a8f4b8f62cae" providerId="LiveId" clId="{BCBC0136-5FDE-594F-9CAA-94B144D64D8A}" dt="2024-12-09T02:40:59.207" v="286" actId="571"/>
+          <ac:chgData name="Maxwell Cook" userId="6270a8f4b8f62cae" providerId="LiveId" clId="{BCBC0136-5FDE-594F-9CAA-94B144D64D8A}" dt="2025-01-06T18:50:28.964" v="302" actId="1076"/>
           <ac:picMkLst>
             <pc:docMk/>
             <pc:sldMk cId="91050093" sldId="260"/>
-            <ac:picMk id="3" creationId="{25B2159B-D18C-73EF-FF72-0A5637525D36}"/>
+            <ac:picMk id="5" creationId="{5497A573-D789-A695-0A63-3B35F8D1917B}"/>
           </ac:picMkLst>
         </pc:picChg>
         <pc:picChg chg="mod">
@@ -610,7 +474,7 @@
           <a:p>
             <a:fld id="{3620BDAC-38D5-A048-8F27-0D0639CFFB27}" type="datetimeFigureOut">
               <a:rPr lang="en-US" smtClean="0"/>
-              <a:t>12/8/24</a:t>
+              <a:t>1/6/25</a:t>
             </a:fld>
             <a:endParaRPr lang="en-US"/>
           </a:p>
@@ -780,7 +644,7 @@
           <a:p>
             <a:fld id="{3620BDAC-38D5-A048-8F27-0D0639CFFB27}" type="datetimeFigureOut">
               <a:rPr lang="en-US" smtClean="0"/>
-              <a:t>12/8/24</a:t>
+              <a:t>1/6/25</a:t>
             </a:fld>
             <a:endParaRPr lang="en-US"/>
           </a:p>
@@ -960,7 +824,7 @@
           <a:p>
             <a:fld id="{3620BDAC-38D5-A048-8F27-0D0639CFFB27}" type="datetimeFigureOut">
               <a:rPr lang="en-US" smtClean="0"/>
-              <a:t>12/8/24</a:t>
+              <a:t>1/6/25</a:t>
             </a:fld>
             <a:endParaRPr lang="en-US"/>
           </a:p>
@@ -1130,7 +994,7 @@
           <a:p>
             <a:fld id="{3620BDAC-38D5-A048-8F27-0D0639CFFB27}" type="datetimeFigureOut">
               <a:rPr lang="en-US" smtClean="0"/>
-              <a:t>12/8/24</a:t>
+              <a:t>1/6/25</a:t>
             </a:fld>
             <a:endParaRPr lang="en-US"/>
           </a:p>
@@ -1376,7 +1240,7 @@
           <a:p>
             <a:fld id="{3620BDAC-38D5-A048-8F27-0D0639CFFB27}" type="datetimeFigureOut">
               <a:rPr lang="en-US" smtClean="0"/>
-              <a:t>12/8/24</a:t>
+              <a:t>1/6/25</a:t>
             </a:fld>
             <a:endParaRPr lang="en-US"/>
           </a:p>
@@ -1608,7 +1472,7 @@
           <a:p>
             <a:fld id="{3620BDAC-38D5-A048-8F27-0D0639CFFB27}" type="datetimeFigureOut">
               <a:rPr lang="en-US" smtClean="0"/>
-              <a:t>12/8/24</a:t>
+              <a:t>1/6/25</a:t>
             </a:fld>
             <a:endParaRPr lang="en-US"/>
           </a:p>
@@ -1975,7 +1839,7 @@
           <a:p>
             <a:fld id="{3620BDAC-38D5-A048-8F27-0D0639CFFB27}" type="datetimeFigureOut">
               <a:rPr lang="en-US" smtClean="0"/>
-              <a:t>12/8/24</a:t>
+              <a:t>1/6/25</a:t>
             </a:fld>
             <a:endParaRPr lang="en-US"/>
           </a:p>
@@ -2093,7 +1957,7 @@
           <a:p>
             <a:fld id="{3620BDAC-38D5-A048-8F27-0D0639CFFB27}" type="datetimeFigureOut">
               <a:rPr lang="en-US" smtClean="0"/>
-              <a:t>12/8/24</a:t>
+              <a:t>1/6/25</a:t>
             </a:fld>
             <a:endParaRPr lang="en-US"/>
           </a:p>
@@ -2188,7 +2052,7 @@
           <a:p>
             <a:fld id="{3620BDAC-38D5-A048-8F27-0D0639CFFB27}" type="datetimeFigureOut">
               <a:rPr lang="en-US" smtClean="0"/>
-              <a:t>12/8/24</a:t>
+              <a:t>1/6/25</a:t>
             </a:fld>
             <a:endParaRPr lang="en-US"/>
           </a:p>
@@ -2465,7 +2329,7 @@
           <a:p>
             <a:fld id="{3620BDAC-38D5-A048-8F27-0D0639CFFB27}" type="datetimeFigureOut">
               <a:rPr lang="en-US" smtClean="0"/>
-              <a:t>12/8/24</a:t>
+              <a:t>1/6/25</a:t>
             </a:fld>
             <a:endParaRPr lang="en-US"/>
           </a:p>
@@ -2722,7 +2586,7 @@
           <a:p>
             <a:fld id="{3620BDAC-38D5-A048-8F27-0D0639CFFB27}" type="datetimeFigureOut">
               <a:rPr lang="en-US" smtClean="0"/>
-              <a:t>12/8/24</a:t>
+              <a:t>1/6/25</a:t>
             </a:fld>
             <a:endParaRPr lang="en-US"/>
           </a:p>
@@ -2935,7 +2799,7 @@
           <a:p>
             <a:fld id="{3620BDAC-38D5-A048-8F27-0D0639CFFB27}" type="datetimeFigureOut">
               <a:rPr lang="en-US" smtClean="0"/>
-              <a:t>12/8/24</a:t>
+              <a:t>1/6/25</a:t>
             </a:fld>
             <a:endParaRPr lang="en-US"/>
           </a:p>
@@ -3950,6 +3814,66 @@
           </a:p>
         </p:txBody>
       </p:sp>
+      <p:pic>
+        <p:nvPicPr>
+          <p:cNvPr id="3" name="Picture 2" descr="A graph of different colored rectangular shapes&#10;&#10;Description automatically generated">
+            <a:extLst>
+              <a:ext uri="{FF2B5EF4-FFF2-40B4-BE49-F238E27FC236}">
+                <a16:creationId xmlns:a16="http://schemas.microsoft.com/office/drawing/2014/main" id="{BA2516EA-7A25-CF23-F001-66FCC09B54C8}"/>
+              </a:ext>
+            </a:extLst>
+          </p:cNvPr>
+          <p:cNvPicPr>
+            <a:picLocks noChangeAspect="1"/>
+          </p:cNvPicPr>
+          <p:nvPr/>
+        </p:nvPicPr>
+        <p:blipFill>
+          <a:blip r:embed="rId3"/>
+          <a:stretch>
+            <a:fillRect/>
+          </a:stretch>
+        </p:blipFill>
+        <p:spPr>
+          <a:xfrm>
+            <a:off x="3515636" y="4194257"/>
+            <a:ext cx="3136047" cy="2063578"/>
+          </a:xfrm>
+          <a:prstGeom prst="rect">
+            <a:avLst/>
+          </a:prstGeom>
+        </p:spPr>
+      </p:pic>
+      <p:pic>
+        <p:nvPicPr>
+          <p:cNvPr id="5" name="Picture 4" descr="A graph of different colored squares&#10;&#10;Description automatically generated">
+            <a:extLst>
+              <a:ext uri="{FF2B5EF4-FFF2-40B4-BE49-F238E27FC236}">
+                <a16:creationId xmlns:a16="http://schemas.microsoft.com/office/drawing/2014/main" id="{5497A573-D789-A695-0A63-3B35F8D1917B}"/>
+              </a:ext>
+            </a:extLst>
+          </p:cNvPr>
+          <p:cNvPicPr>
+            <a:picLocks noChangeAspect="1"/>
+          </p:cNvPicPr>
+          <p:nvPr/>
+        </p:nvPicPr>
+        <p:blipFill>
+          <a:blip r:embed="rId4"/>
+          <a:stretch>
+            <a:fillRect/>
+          </a:stretch>
+        </p:blipFill>
+        <p:spPr>
+          <a:xfrm>
+            <a:off x="84500" y="4194257"/>
+            <a:ext cx="3170134" cy="2063578"/>
+          </a:xfrm>
+          <a:prstGeom prst="rect">
+            <a:avLst/>
+          </a:prstGeom>
+        </p:spPr>
+      </p:pic>
     </p:spTree>
     <p:extLst>
       <p:ext uri="{BB962C8B-B14F-4D97-AF65-F5344CB8AC3E}">

</xml_diff>

<commit_message>
Finalizing baseline model (predominant forest type)
BYM2 spatial model with KNN adjacency structure
</commit_message>
<xml_diff>
--- a/Aim2/figures/figure_arrangement.pptx
+++ b/Aim2/figures/figure_arrangement.pptx
@@ -6,10 +6,11 @@
   </p:sldMasterIdLst>
   <p:sldIdLst>
     <p:sldId id="256" r:id="rId2"/>
-    <p:sldId id="258" r:id="rId3"/>
-    <p:sldId id="260" r:id="rId4"/>
-    <p:sldId id="259" r:id="rId5"/>
-    <p:sldId id="257" r:id="rId6"/>
+    <p:sldId id="261" r:id="rId3"/>
+    <p:sldId id="258" r:id="rId4"/>
+    <p:sldId id="260" r:id="rId5"/>
+    <p:sldId id="259" r:id="rId6"/>
+    <p:sldId id="257" r:id="rId7"/>
   </p:sldIdLst>
   <p:sldSz cx="6858000" cy="8229600"/>
   <p:notesSz cx="6858000" cy="9144000"/>
@@ -140,7 +141,7 @@
   <pc:docChgLst>
     <pc:chgData name="Maxwell Cook" userId="6270a8f4b8f62cae" providerId="LiveId" clId="{BCBC0136-5FDE-594F-9CAA-94B144D64D8A}"/>
     <pc:docChg chg="undo custSel addSld delSld modSld">
-      <pc:chgData name="Maxwell Cook" userId="6270a8f4b8f62cae" providerId="LiveId" clId="{BCBC0136-5FDE-594F-9CAA-94B144D64D8A}" dt="2025-01-06T18:50:32.055" v="303" actId="1076"/>
+      <pc:chgData name="Maxwell Cook" userId="6270a8f4b8f62cae" providerId="LiveId" clId="{BCBC0136-5FDE-594F-9CAA-94B144D64D8A}" dt="2025-01-19T17:07:40.526" v="304" actId="2890"/>
       <pc:docMkLst>
         <pc:docMk/>
       </pc:docMkLst>
@@ -338,6 +339,13 @@
           </ac:picMkLst>
         </pc:picChg>
       </pc:sldChg>
+      <pc:sldChg chg="add">
+        <pc:chgData name="Maxwell Cook" userId="6270a8f4b8f62cae" providerId="LiveId" clId="{BCBC0136-5FDE-594F-9CAA-94B144D64D8A}" dt="2025-01-19T17:07:40.526" v="304" actId="2890"/>
+        <pc:sldMkLst>
+          <pc:docMk/>
+          <pc:sldMk cId="319057114" sldId="261"/>
+        </pc:sldMkLst>
+      </pc:sldChg>
     </pc:docChg>
   </pc:docChgLst>
 </pc:chgInfo>
@@ -474,7 +482,7 @@
           <a:p>
             <a:fld id="{3620BDAC-38D5-A048-8F27-0D0639CFFB27}" type="datetimeFigureOut">
               <a:rPr lang="en-US" smtClean="0"/>
-              <a:t>1/6/25</a:t>
+              <a:t>1/19/25</a:t>
             </a:fld>
             <a:endParaRPr lang="en-US"/>
           </a:p>
@@ -644,7 +652,7 @@
           <a:p>
             <a:fld id="{3620BDAC-38D5-A048-8F27-0D0639CFFB27}" type="datetimeFigureOut">
               <a:rPr lang="en-US" smtClean="0"/>
-              <a:t>1/6/25</a:t>
+              <a:t>1/19/25</a:t>
             </a:fld>
             <a:endParaRPr lang="en-US"/>
           </a:p>
@@ -824,7 +832,7 @@
           <a:p>
             <a:fld id="{3620BDAC-38D5-A048-8F27-0D0639CFFB27}" type="datetimeFigureOut">
               <a:rPr lang="en-US" smtClean="0"/>
-              <a:t>1/6/25</a:t>
+              <a:t>1/19/25</a:t>
             </a:fld>
             <a:endParaRPr lang="en-US"/>
           </a:p>
@@ -994,7 +1002,7 @@
           <a:p>
             <a:fld id="{3620BDAC-38D5-A048-8F27-0D0639CFFB27}" type="datetimeFigureOut">
               <a:rPr lang="en-US" smtClean="0"/>
-              <a:t>1/6/25</a:t>
+              <a:t>1/19/25</a:t>
             </a:fld>
             <a:endParaRPr lang="en-US"/>
           </a:p>
@@ -1240,7 +1248,7 @@
           <a:p>
             <a:fld id="{3620BDAC-38D5-A048-8F27-0D0639CFFB27}" type="datetimeFigureOut">
               <a:rPr lang="en-US" smtClean="0"/>
-              <a:t>1/6/25</a:t>
+              <a:t>1/19/25</a:t>
             </a:fld>
             <a:endParaRPr lang="en-US"/>
           </a:p>
@@ -1472,7 +1480,7 @@
           <a:p>
             <a:fld id="{3620BDAC-38D5-A048-8F27-0D0639CFFB27}" type="datetimeFigureOut">
               <a:rPr lang="en-US" smtClean="0"/>
-              <a:t>1/6/25</a:t>
+              <a:t>1/19/25</a:t>
             </a:fld>
             <a:endParaRPr lang="en-US"/>
           </a:p>
@@ -1839,7 +1847,7 @@
           <a:p>
             <a:fld id="{3620BDAC-38D5-A048-8F27-0D0639CFFB27}" type="datetimeFigureOut">
               <a:rPr lang="en-US" smtClean="0"/>
-              <a:t>1/6/25</a:t>
+              <a:t>1/19/25</a:t>
             </a:fld>
             <a:endParaRPr lang="en-US"/>
           </a:p>
@@ -1957,7 +1965,7 @@
           <a:p>
             <a:fld id="{3620BDAC-38D5-A048-8F27-0D0639CFFB27}" type="datetimeFigureOut">
               <a:rPr lang="en-US" smtClean="0"/>
-              <a:t>1/6/25</a:t>
+              <a:t>1/19/25</a:t>
             </a:fld>
             <a:endParaRPr lang="en-US"/>
           </a:p>
@@ -2052,7 +2060,7 @@
           <a:p>
             <a:fld id="{3620BDAC-38D5-A048-8F27-0D0639CFFB27}" type="datetimeFigureOut">
               <a:rPr lang="en-US" smtClean="0"/>
-              <a:t>1/6/25</a:t>
+              <a:t>1/19/25</a:t>
             </a:fld>
             <a:endParaRPr lang="en-US"/>
           </a:p>
@@ -2329,7 +2337,7 @@
           <a:p>
             <a:fld id="{3620BDAC-38D5-A048-8F27-0D0639CFFB27}" type="datetimeFigureOut">
               <a:rPr lang="en-US" smtClean="0"/>
-              <a:t>1/6/25</a:t>
+              <a:t>1/19/25</a:t>
             </a:fld>
             <a:endParaRPr lang="en-US"/>
           </a:p>
@@ -2586,7 +2594,7 @@
           <a:p>
             <a:fld id="{3620BDAC-38D5-A048-8F27-0D0639CFFB27}" type="datetimeFigureOut">
               <a:rPr lang="en-US" smtClean="0"/>
-              <a:t>1/6/25</a:t>
+              <a:t>1/19/25</a:t>
             </a:fld>
             <a:endParaRPr lang="en-US"/>
           </a:p>
@@ -2799,7 +2807,7 @@
           <a:p>
             <a:fld id="{3620BDAC-38D5-A048-8F27-0D0639CFFB27}" type="datetimeFigureOut">
               <a:rPr lang="en-US" smtClean="0"/>
-              <a:t>1/6/25</a:t>
+              <a:t>1/19/25</a:t>
             </a:fld>
             <a:endParaRPr lang="en-US"/>
           </a:p>
@@ -3447,6 +3455,264 @@
         <p:cNvPr id="1" name="">
           <a:extLst>
             <a:ext uri="{FF2B5EF4-FFF2-40B4-BE49-F238E27FC236}">
+              <a16:creationId xmlns:a16="http://schemas.microsoft.com/office/drawing/2014/main" id="{CBB8E8D1-18F9-23D2-C2B2-0159AAC903F5}"/>
+            </a:ext>
+          </a:extLst>
+        </p:cNvPr>
+        <p:cNvGrpSpPr/>
+        <p:nvPr/>
+      </p:nvGrpSpPr>
+      <p:grpSpPr>
+        <a:xfrm>
+          <a:off x="0" y="0"/>
+          <a:ext cx="0" cy="0"/>
+          <a:chOff x="0" y="0"/>
+          <a:chExt cx="0" cy="0"/>
+        </a:xfrm>
+      </p:grpSpPr>
+      <p:sp>
+        <p:nvSpPr>
+          <p:cNvPr id="4" name="TextBox 3">
+            <a:extLst>
+              <a:ext uri="{FF2B5EF4-FFF2-40B4-BE49-F238E27FC236}">
+                <a16:creationId xmlns:a16="http://schemas.microsoft.com/office/drawing/2014/main" id="{78A7C49F-69FC-D9EC-56F0-9D25F042DC51}"/>
+              </a:ext>
+            </a:extLst>
+          </p:cNvPr>
+          <p:cNvSpPr txBox="1"/>
+          <p:nvPr/>
+        </p:nvSpPr>
+        <p:spPr>
+          <a:xfrm>
+            <a:off x="406945" y="3730079"/>
+            <a:ext cx="5817734" cy="769441"/>
+          </a:xfrm>
+          <a:prstGeom prst="rect">
+            <a:avLst/>
+          </a:prstGeom>
+          <a:noFill/>
+        </p:spPr>
+        <p:txBody>
+          <a:bodyPr wrap="square" rtlCol="0">
+            <a:spAutoFit/>
+          </a:bodyPr>
+          <a:lstStyle/>
+          <a:p>
+            <a:r>
+              <a:rPr lang="en-US" sz="1100" b="1" i="0" u="none" strike="noStrike" dirty="0">
+                <a:solidFill>
+                  <a:srgbClr val="000000"/>
+                </a:solidFill>
+                <a:effectLst/>
+                <a:latin typeface="Times New Roman" panose="02020603050405020304" pitchFamily="18" charset="0"/>
+              </a:rPr>
+              <a:t>Figure 1.</a:t>
+            </a:r>
+            <a:r>
+              <a:rPr lang="en-US" sz="1100" b="0" i="0" u="none" strike="noStrike" dirty="0">
+                <a:solidFill>
+                  <a:srgbClr val="000000"/>
+                </a:solidFill>
+                <a:effectLst/>
+                <a:latin typeface="Times New Roman" panose="02020603050405020304" pitchFamily="18" charset="0"/>
+              </a:rPr>
+              <a:t> Study region and wildfire events. (A) Map of the SRM showing the locations of wildfire events with &gt;1% pre-fire aspen cover. Point size represents the burned area (ha), color scale represents the percentage of aspen forest cover; (B) annual burned area (ha); (C) distribution of fire size (or other statistics ??).</a:t>
+            </a:r>
+            <a:endParaRPr lang="en-US" sz="1100" dirty="0"/>
+          </a:p>
+        </p:txBody>
+      </p:sp>
+      <p:pic>
+        <p:nvPicPr>
+          <p:cNvPr id="6" name="Picture 5">
+            <a:extLst>
+              <a:ext uri="{FF2B5EF4-FFF2-40B4-BE49-F238E27FC236}">
+                <a16:creationId xmlns:a16="http://schemas.microsoft.com/office/drawing/2014/main" id="{1E4567D6-2F22-D6B5-AE87-2BAD7EF9136B}"/>
+              </a:ext>
+            </a:extLst>
+          </p:cNvPr>
+          <p:cNvPicPr>
+            <a:picLocks noChangeAspect="1"/>
+          </p:cNvPicPr>
+          <p:nvPr/>
+        </p:nvPicPr>
+        <p:blipFill>
+          <a:blip r:embed="rId2"/>
+          <a:srcRect/>
+          <a:stretch/>
+        </p:blipFill>
+        <p:spPr>
+          <a:xfrm>
+            <a:off x="406945" y="89516"/>
+            <a:ext cx="2894533" cy="3566140"/>
+          </a:xfrm>
+          <a:prstGeom prst="rect">
+            <a:avLst/>
+          </a:prstGeom>
+        </p:spPr>
+      </p:pic>
+      <p:pic>
+        <p:nvPicPr>
+          <p:cNvPr id="8" name="Picture 7" descr="A graph of a number of years&#10;&#10;Description automatically generated">
+            <a:extLst>
+              <a:ext uri="{FF2B5EF4-FFF2-40B4-BE49-F238E27FC236}">
+                <a16:creationId xmlns:a16="http://schemas.microsoft.com/office/drawing/2014/main" id="{9DD81EB0-9794-BFBB-6162-BCF8A274D99F}"/>
+              </a:ext>
+            </a:extLst>
+          </p:cNvPr>
+          <p:cNvPicPr>
+            <a:picLocks noChangeAspect="1"/>
+          </p:cNvPicPr>
+          <p:nvPr/>
+        </p:nvPicPr>
+        <p:blipFill>
+          <a:blip r:embed="rId3"/>
+          <a:stretch>
+            <a:fillRect/>
+          </a:stretch>
+        </p:blipFill>
+        <p:spPr>
+          <a:xfrm>
+            <a:off x="3301478" y="70470"/>
+            <a:ext cx="2923201" cy="1802117"/>
+          </a:xfrm>
+          <a:prstGeom prst="rect">
+            <a:avLst/>
+          </a:prstGeom>
+        </p:spPr>
+      </p:pic>
+      <p:pic>
+        <p:nvPicPr>
+          <p:cNvPr id="10" name="Picture 9">
+            <a:extLst>
+              <a:ext uri="{FF2B5EF4-FFF2-40B4-BE49-F238E27FC236}">
+                <a16:creationId xmlns:a16="http://schemas.microsoft.com/office/drawing/2014/main" id="{CB8A8B3C-1CCC-DA65-5019-1C708B4CE1F8}"/>
+              </a:ext>
+            </a:extLst>
+          </p:cNvPr>
+          <p:cNvPicPr>
+            <a:picLocks noChangeAspect="1"/>
+          </p:cNvPicPr>
+          <p:nvPr/>
+        </p:nvPicPr>
+        <p:blipFill>
+          <a:blip r:embed="rId4"/>
+          <a:srcRect/>
+          <a:stretch/>
+        </p:blipFill>
+        <p:spPr>
+          <a:xfrm>
+            <a:off x="3435738" y="1872587"/>
+            <a:ext cx="2788941" cy="1709350"/>
+          </a:xfrm>
+          <a:prstGeom prst="rect">
+            <a:avLst/>
+          </a:prstGeom>
+        </p:spPr>
+      </p:pic>
+      <p:sp>
+        <p:nvSpPr>
+          <p:cNvPr id="2" name="TextBox 1">
+            <a:extLst>
+              <a:ext uri="{FF2B5EF4-FFF2-40B4-BE49-F238E27FC236}">
+                <a16:creationId xmlns:a16="http://schemas.microsoft.com/office/drawing/2014/main" id="{C8BB12CF-A2C1-5F29-C2F6-E598F382A1FC}"/>
+              </a:ext>
+            </a:extLst>
+          </p:cNvPr>
+          <p:cNvSpPr txBox="1"/>
+          <p:nvPr/>
+        </p:nvSpPr>
+        <p:spPr>
+          <a:xfrm>
+            <a:off x="400206" y="6967655"/>
+            <a:ext cx="6057587" cy="600164"/>
+          </a:xfrm>
+          <a:prstGeom prst="rect">
+            <a:avLst/>
+          </a:prstGeom>
+          <a:noFill/>
+        </p:spPr>
+        <p:txBody>
+          <a:bodyPr wrap="square" rtlCol="0">
+            <a:spAutoFit/>
+          </a:bodyPr>
+          <a:lstStyle/>
+          <a:p>
+            <a:r>
+              <a:rPr lang="en-US" sz="1100" b="1" i="0" u="none" strike="noStrike" dirty="0">
+                <a:solidFill>
+                  <a:srgbClr val="000000"/>
+                </a:solidFill>
+                <a:effectLst/>
+                <a:latin typeface="Times New Roman" panose="02020603050405020304" pitchFamily="18" charset="0"/>
+              </a:rPr>
+              <a:t>Figure 2.</a:t>
+            </a:r>
+            <a:r>
+              <a:rPr lang="en-US" sz="1100" b="0" i="0" u="none" strike="noStrike" dirty="0">
+                <a:solidFill>
+                  <a:srgbClr val="000000"/>
+                </a:solidFill>
+                <a:effectLst/>
+                <a:latin typeface="Times New Roman" panose="02020603050405020304" pitchFamily="18" charset="0"/>
+              </a:rPr>
+              <a:t> Aggregation of VIIRS FRP retrievals onto a regular grid. (A) Pixel centers of AFD from both satellites (S-NPP and JPSS-1); (B) Pixel ground area based on swath position (relative nadir position); (C) Cumulative FRP based on fractional assignment.</a:t>
+            </a:r>
+            <a:endParaRPr lang="en-US" sz="1100" dirty="0"/>
+          </a:p>
+        </p:txBody>
+      </p:sp>
+      <p:pic>
+        <p:nvPicPr>
+          <p:cNvPr id="7" name="Picture 6" descr="A map of the united states&#10;&#10;Description automatically generated">
+            <a:extLst>
+              <a:ext uri="{FF2B5EF4-FFF2-40B4-BE49-F238E27FC236}">
+                <a16:creationId xmlns:a16="http://schemas.microsoft.com/office/drawing/2014/main" id="{94544B35-09A2-C23D-71F4-E2FB08F9C7CD}"/>
+              </a:ext>
+            </a:extLst>
+          </p:cNvPr>
+          <p:cNvPicPr>
+            <a:picLocks noChangeAspect="1"/>
+          </p:cNvPicPr>
+          <p:nvPr/>
+        </p:nvPicPr>
+        <p:blipFill>
+          <a:blip r:embed="rId5"/>
+          <a:stretch>
+            <a:fillRect/>
+          </a:stretch>
+        </p:blipFill>
+        <p:spPr>
+          <a:xfrm>
+            <a:off x="266940" y="4940886"/>
+            <a:ext cx="6337595" cy="1967441"/>
+          </a:xfrm>
+          <a:prstGeom prst="rect">
+            <a:avLst/>
+          </a:prstGeom>
+        </p:spPr>
+      </p:pic>
+    </p:spTree>
+    <p:extLst>
+      <p:ext uri="{BB962C8B-B14F-4D97-AF65-F5344CB8AC3E}">
+        <p14:creationId xmlns:p14="http://schemas.microsoft.com/office/powerpoint/2010/main" val="319057114"/>
+      </p:ext>
+    </p:extLst>
+  </p:cSld>
+  <p:clrMapOvr>
+    <a:masterClrMapping/>
+  </p:clrMapOvr>
+</p:sld>
+</file>
+
+<file path=ppt/slides/slide3.xml><?xml version="1.0" encoding="utf-8"?>
+<p:sld xmlns:a="http://schemas.openxmlformats.org/drawingml/2006/main" xmlns:r="http://schemas.openxmlformats.org/officeDocument/2006/relationships" xmlns:p="http://schemas.openxmlformats.org/presentationml/2006/main">
+  <p:cSld>
+    <p:spTree>
+      <p:nvGrpSpPr>
+        <p:cNvPr id="1" name="">
+          <a:extLst>
+            <a:ext uri="{FF2B5EF4-FFF2-40B4-BE49-F238E27FC236}">
               <a16:creationId xmlns:a16="http://schemas.microsoft.com/office/drawing/2014/main" id="{9CB071C8-23FB-8A90-70A7-98B1B70E9CC0}"/>
             </a:ext>
           </a:extLst>
@@ -3689,7 +3955,7 @@
 </p:sld>
 </file>
 
-<file path=ppt/slides/slide3.xml><?xml version="1.0" encoding="utf-8"?>
+<file path=ppt/slides/slide4.xml><?xml version="1.0" encoding="utf-8"?>
 <p:sld xmlns:a="http://schemas.openxmlformats.org/drawingml/2006/main" xmlns:r="http://schemas.openxmlformats.org/officeDocument/2006/relationships" xmlns:p="http://schemas.openxmlformats.org/presentationml/2006/main">
   <p:cSld>
     <p:spTree>
@@ -3887,7 +4153,7 @@
 </p:sld>
 </file>
 
-<file path=ppt/slides/slide4.xml><?xml version="1.0" encoding="utf-8"?>
+<file path=ppt/slides/slide5.xml><?xml version="1.0" encoding="utf-8"?>
 <p:sld xmlns:a="http://schemas.openxmlformats.org/drawingml/2006/main" xmlns:r="http://schemas.openxmlformats.org/officeDocument/2006/relationships" xmlns:p="http://schemas.openxmlformats.org/presentationml/2006/main">
   <p:cSld>
     <p:spTree>
@@ -4005,7 +4271,7 @@
 </p:sld>
 </file>
 
-<file path=ppt/slides/slide5.xml><?xml version="1.0" encoding="utf-8"?>
+<file path=ppt/slides/slide6.xml><?xml version="1.0" encoding="utf-8"?>
 <p:sld xmlns:a="http://schemas.openxmlformats.org/drawingml/2006/main" xmlns:r="http://schemas.openxmlformats.org/officeDocument/2006/relationships" xmlns:p="http://schemas.openxmlformats.org/presentationml/2006/main">
   <p:cSld>
     <p:spTree>

</xml_diff>

<commit_message>
Finalizing the predominant forest type model
</commit_message>
<xml_diff>
--- a/Aim2/figures/figure_arrangement.pptx
+++ b/Aim2/figures/figure_arrangement.pptx
@@ -6,11 +6,12 @@
   </p:sldMasterIdLst>
   <p:sldIdLst>
     <p:sldId id="256" r:id="rId2"/>
-    <p:sldId id="261" r:id="rId3"/>
-    <p:sldId id="258" r:id="rId4"/>
-    <p:sldId id="260" r:id="rId5"/>
-    <p:sldId id="259" r:id="rId6"/>
-    <p:sldId id="257" r:id="rId7"/>
+    <p:sldId id="262" r:id="rId3"/>
+    <p:sldId id="261" r:id="rId4"/>
+    <p:sldId id="258" r:id="rId5"/>
+    <p:sldId id="260" r:id="rId6"/>
+    <p:sldId id="259" r:id="rId7"/>
+    <p:sldId id="257" r:id="rId8"/>
   </p:sldIdLst>
   <p:sldSz cx="6858000" cy="8229600"/>
   <p:notesSz cx="6858000" cy="9144000"/>
@@ -131,7 +132,7 @@
 <file path=ppt/revisionInfo.xml><?xml version="1.0" encoding="utf-8"?>
 <p1510:revInfo xmlns:a="http://schemas.openxmlformats.org/drawingml/2006/main" xmlns:r="http://schemas.openxmlformats.org/officeDocument/2006/relationships" xmlns:p1510="http://schemas.microsoft.com/office/powerpoint/2015/10/main">
   <p1510:revLst>
-    <p1510:client id="{BCBC0136-5FDE-594F-9CAA-94B144D64D8A}" v="74" dt="2025-01-06T18:50:15.290"/>
+    <p1510:client id="{BCBC0136-5FDE-594F-9CAA-94B144D64D8A}" v="76" dt="2025-01-31T18:26:32.364"/>
   </p1510:revLst>
 </p1510:revInfo>
 </file>
@@ -141,7 +142,7 @@
   <pc:docChgLst>
     <pc:chgData name="Maxwell Cook" userId="6270a8f4b8f62cae" providerId="LiveId" clId="{BCBC0136-5FDE-594F-9CAA-94B144D64D8A}"/>
     <pc:docChg chg="undo custSel addSld delSld modSld">
-      <pc:chgData name="Maxwell Cook" userId="6270a8f4b8f62cae" providerId="LiveId" clId="{BCBC0136-5FDE-594F-9CAA-94B144D64D8A}" dt="2025-01-19T17:07:40.526" v="304" actId="2890"/>
+      <pc:chgData name="Maxwell Cook" userId="6270a8f4b8f62cae" providerId="LiveId" clId="{BCBC0136-5FDE-594F-9CAA-94B144D64D8A}" dt="2025-01-31T18:26:34.659" v="315" actId="478"/>
       <pc:docMkLst>
         <pc:docMk/>
       </pc:docMkLst>
@@ -346,6 +347,45 @@
           <pc:sldMk cId="319057114" sldId="261"/>
         </pc:sldMkLst>
       </pc:sldChg>
+      <pc:sldChg chg="addSp delSp modSp new mod">
+        <pc:chgData name="Maxwell Cook" userId="6270a8f4b8f62cae" providerId="LiveId" clId="{BCBC0136-5FDE-594F-9CAA-94B144D64D8A}" dt="2025-01-31T18:26:34.659" v="315" actId="478"/>
+        <pc:sldMkLst>
+          <pc:docMk/>
+          <pc:sldMk cId="4207029184" sldId="262"/>
+        </pc:sldMkLst>
+        <pc:spChg chg="del">
+          <ac:chgData name="Maxwell Cook" userId="6270a8f4b8f62cae" providerId="LiveId" clId="{BCBC0136-5FDE-594F-9CAA-94B144D64D8A}" dt="2025-01-31T17:53:26.268" v="306" actId="478"/>
+          <ac:spMkLst>
+            <pc:docMk/>
+            <pc:sldMk cId="4207029184" sldId="262"/>
+            <ac:spMk id="2" creationId="{C3B0C081-673A-F77C-690E-D52D72445901}"/>
+          </ac:spMkLst>
+        </pc:spChg>
+        <pc:spChg chg="del">
+          <ac:chgData name="Maxwell Cook" userId="6270a8f4b8f62cae" providerId="LiveId" clId="{BCBC0136-5FDE-594F-9CAA-94B144D64D8A}" dt="2025-01-31T17:53:27.873" v="307" actId="478"/>
+          <ac:spMkLst>
+            <pc:docMk/>
+            <pc:sldMk cId="4207029184" sldId="262"/>
+            <ac:spMk id="3" creationId="{D3C3F862-C780-6468-33F4-3C9AC49DD5F0}"/>
+          </ac:spMkLst>
+        </pc:spChg>
+        <pc:picChg chg="add del mod">
+          <ac:chgData name="Maxwell Cook" userId="6270a8f4b8f62cae" providerId="LiveId" clId="{BCBC0136-5FDE-594F-9CAA-94B144D64D8A}" dt="2025-01-31T17:54:02.961" v="311" actId="478"/>
+          <ac:picMkLst>
+            <pc:docMk/>
+            <pc:sldMk cId="4207029184" sldId="262"/>
+            <ac:picMk id="5" creationId="{B9DF48EE-BDE4-95B3-3581-AE7E283FCCC6}"/>
+          </ac:picMkLst>
+        </pc:picChg>
+        <pc:picChg chg="add del mod">
+          <ac:chgData name="Maxwell Cook" userId="6270a8f4b8f62cae" providerId="LiveId" clId="{BCBC0136-5FDE-594F-9CAA-94B144D64D8A}" dt="2025-01-31T18:26:34.659" v="315" actId="478"/>
+          <ac:picMkLst>
+            <pc:docMk/>
+            <pc:sldMk cId="4207029184" sldId="262"/>
+            <ac:picMk id="7" creationId="{528D58B3-56FA-038B-9A1C-812F823417E8}"/>
+          </ac:picMkLst>
+        </pc:picChg>
+      </pc:sldChg>
     </pc:docChg>
   </pc:docChgLst>
 </pc:chgInfo>
@@ -482,7 +522,7 @@
           <a:p>
             <a:fld id="{3620BDAC-38D5-A048-8F27-0D0639CFFB27}" type="datetimeFigureOut">
               <a:rPr lang="en-US" smtClean="0"/>
-              <a:t>1/19/25</a:t>
+              <a:t>1/31/25</a:t>
             </a:fld>
             <a:endParaRPr lang="en-US"/>
           </a:p>
@@ -652,7 +692,7 @@
           <a:p>
             <a:fld id="{3620BDAC-38D5-A048-8F27-0D0639CFFB27}" type="datetimeFigureOut">
               <a:rPr lang="en-US" smtClean="0"/>
-              <a:t>1/19/25</a:t>
+              <a:t>1/31/25</a:t>
             </a:fld>
             <a:endParaRPr lang="en-US"/>
           </a:p>
@@ -832,7 +872,7 @@
           <a:p>
             <a:fld id="{3620BDAC-38D5-A048-8F27-0D0639CFFB27}" type="datetimeFigureOut">
               <a:rPr lang="en-US" smtClean="0"/>
-              <a:t>1/19/25</a:t>
+              <a:t>1/31/25</a:t>
             </a:fld>
             <a:endParaRPr lang="en-US"/>
           </a:p>
@@ -1002,7 +1042,7 @@
           <a:p>
             <a:fld id="{3620BDAC-38D5-A048-8F27-0D0639CFFB27}" type="datetimeFigureOut">
               <a:rPr lang="en-US" smtClean="0"/>
-              <a:t>1/19/25</a:t>
+              <a:t>1/31/25</a:t>
             </a:fld>
             <a:endParaRPr lang="en-US"/>
           </a:p>
@@ -1248,7 +1288,7 @@
           <a:p>
             <a:fld id="{3620BDAC-38D5-A048-8F27-0D0639CFFB27}" type="datetimeFigureOut">
               <a:rPr lang="en-US" smtClean="0"/>
-              <a:t>1/19/25</a:t>
+              <a:t>1/31/25</a:t>
             </a:fld>
             <a:endParaRPr lang="en-US"/>
           </a:p>
@@ -1480,7 +1520,7 @@
           <a:p>
             <a:fld id="{3620BDAC-38D5-A048-8F27-0D0639CFFB27}" type="datetimeFigureOut">
               <a:rPr lang="en-US" smtClean="0"/>
-              <a:t>1/19/25</a:t>
+              <a:t>1/31/25</a:t>
             </a:fld>
             <a:endParaRPr lang="en-US"/>
           </a:p>
@@ -1847,7 +1887,7 @@
           <a:p>
             <a:fld id="{3620BDAC-38D5-A048-8F27-0D0639CFFB27}" type="datetimeFigureOut">
               <a:rPr lang="en-US" smtClean="0"/>
-              <a:t>1/19/25</a:t>
+              <a:t>1/31/25</a:t>
             </a:fld>
             <a:endParaRPr lang="en-US"/>
           </a:p>
@@ -1965,7 +2005,7 @@
           <a:p>
             <a:fld id="{3620BDAC-38D5-A048-8F27-0D0639CFFB27}" type="datetimeFigureOut">
               <a:rPr lang="en-US" smtClean="0"/>
-              <a:t>1/19/25</a:t>
+              <a:t>1/31/25</a:t>
             </a:fld>
             <a:endParaRPr lang="en-US"/>
           </a:p>
@@ -2060,7 +2100,7 @@
           <a:p>
             <a:fld id="{3620BDAC-38D5-A048-8F27-0D0639CFFB27}" type="datetimeFigureOut">
               <a:rPr lang="en-US" smtClean="0"/>
-              <a:t>1/19/25</a:t>
+              <a:t>1/31/25</a:t>
             </a:fld>
             <a:endParaRPr lang="en-US"/>
           </a:p>
@@ -2337,7 +2377,7 @@
           <a:p>
             <a:fld id="{3620BDAC-38D5-A048-8F27-0D0639CFFB27}" type="datetimeFigureOut">
               <a:rPr lang="en-US" smtClean="0"/>
-              <a:t>1/19/25</a:t>
+              <a:t>1/31/25</a:t>
             </a:fld>
             <a:endParaRPr lang="en-US"/>
           </a:p>
@@ -2594,7 +2634,7 @@
           <a:p>
             <a:fld id="{3620BDAC-38D5-A048-8F27-0D0639CFFB27}" type="datetimeFigureOut">
               <a:rPr lang="en-US" smtClean="0"/>
-              <a:t>1/19/25</a:t>
+              <a:t>1/31/25</a:t>
             </a:fld>
             <a:endParaRPr lang="en-US"/>
           </a:p>
@@ -2807,7 +2847,7 @@
           <a:p>
             <a:fld id="{3620BDAC-38D5-A048-8F27-0D0639CFFB27}" type="datetimeFigureOut">
               <a:rPr lang="en-US" smtClean="0"/>
-              <a:t>1/19/25</a:t>
+              <a:t>1/31/25</a:t>
             </a:fld>
             <a:endParaRPr lang="en-US"/>
           </a:p>
@@ -3452,6 +3492,36 @@
   <p:cSld>
     <p:spTree>
       <p:nvGrpSpPr>
+        <p:cNvPr id="1" name=""/>
+        <p:cNvGrpSpPr/>
+        <p:nvPr/>
+      </p:nvGrpSpPr>
+      <p:grpSpPr>
+        <a:xfrm>
+          <a:off x="0" y="0"/>
+          <a:ext cx="0" cy="0"/>
+          <a:chOff x="0" y="0"/>
+          <a:chExt cx="0" cy="0"/>
+        </a:xfrm>
+      </p:grpSpPr>
+    </p:spTree>
+    <p:extLst>
+      <p:ext uri="{BB962C8B-B14F-4D97-AF65-F5344CB8AC3E}">
+        <p14:creationId xmlns:p14="http://schemas.microsoft.com/office/powerpoint/2010/main" val="4207029184"/>
+      </p:ext>
+    </p:extLst>
+  </p:cSld>
+  <p:clrMapOvr>
+    <a:masterClrMapping/>
+  </p:clrMapOvr>
+</p:sld>
+</file>
+
+<file path=ppt/slides/slide3.xml><?xml version="1.0" encoding="utf-8"?>
+<p:sld xmlns:a="http://schemas.openxmlformats.org/drawingml/2006/main" xmlns:r="http://schemas.openxmlformats.org/officeDocument/2006/relationships" xmlns:p="http://schemas.openxmlformats.org/presentationml/2006/main">
+  <p:cSld>
+    <p:spTree>
+      <p:nvGrpSpPr>
         <p:cNvPr id="1" name="">
           <a:extLst>
             <a:ext uri="{FF2B5EF4-FFF2-40B4-BE49-F238E27FC236}">
@@ -3705,7 +3775,7 @@
 </p:sld>
 </file>
 
-<file path=ppt/slides/slide3.xml><?xml version="1.0" encoding="utf-8"?>
+<file path=ppt/slides/slide4.xml><?xml version="1.0" encoding="utf-8"?>
 <p:sld xmlns:a="http://schemas.openxmlformats.org/drawingml/2006/main" xmlns:r="http://schemas.openxmlformats.org/officeDocument/2006/relationships" xmlns:p="http://schemas.openxmlformats.org/presentationml/2006/main">
   <p:cSld>
     <p:spTree>
@@ -3955,7 +4025,7 @@
 </p:sld>
 </file>
 
-<file path=ppt/slides/slide4.xml><?xml version="1.0" encoding="utf-8"?>
+<file path=ppt/slides/slide5.xml><?xml version="1.0" encoding="utf-8"?>
 <p:sld xmlns:a="http://schemas.openxmlformats.org/drawingml/2006/main" xmlns:r="http://schemas.openxmlformats.org/officeDocument/2006/relationships" xmlns:p="http://schemas.openxmlformats.org/presentationml/2006/main">
   <p:cSld>
     <p:spTree>
@@ -4153,7 +4223,7 @@
 </p:sld>
 </file>
 
-<file path=ppt/slides/slide5.xml><?xml version="1.0" encoding="utf-8"?>
+<file path=ppt/slides/slide6.xml><?xml version="1.0" encoding="utf-8"?>
 <p:sld xmlns:a="http://schemas.openxmlformats.org/drawingml/2006/main" xmlns:r="http://schemas.openxmlformats.org/officeDocument/2006/relationships" xmlns:p="http://schemas.openxmlformats.org/presentationml/2006/main">
   <p:cSld>
     <p:spTree>
@@ -4271,7 +4341,7 @@
 </p:sld>
 </file>
 
-<file path=ppt/slides/slide6.xml><?xml version="1.0" encoding="utf-8"?>
+<file path=ppt/slides/slide7.xml><?xml version="1.0" encoding="utf-8"?>
 <p:sld xmlns:a="http://schemas.openxmlformats.org/drawingml/2006/main" xmlns:r="http://schemas.openxmlformats.org/officeDocument/2006/relationships" xmlns:p="http://schemas.openxmlformats.org/presentationml/2006/main">
   <p:cSld>
     <p:spTree>

</xml_diff>

<commit_message>
Finalizing INLA models and figures
</commit_message>
<xml_diff>
--- a/Aim2/figures/figure_arrangement.pptx
+++ b/Aim2/figures/figure_arrangement.pptx
@@ -132,7 +132,7 @@
 <file path=ppt/revisionInfo.xml><?xml version="1.0" encoding="utf-8"?>
 <p1510:revInfo xmlns:a="http://schemas.openxmlformats.org/drawingml/2006/main" xmlns:r="http://schemas.openxmlformats.org/officeDocument/2006/relationships" xmlns:p1510="http://schemas.microsoft.com/office/powerpoint/2015/10/main">
   <p1510:revLst>
-    <p1510:client id="{BCBC0136-5FDE-594F-9CAA-94B144D64D8A}" v="76" dt="2025-01-31T18:26:32.364"/>
+    <p1510:client id="{BCBC0136-5FDE-594F-9CAA-94B144D64D8A}" v="77" dt="2025-02-02T18:27:35.981"/>
   </p1510:revLst>
 </p1510:revInfo>
 </file>
@@ -142,7 +142,7 @@
   <pc:docChgLst>
     <pc:chgData name="Maxwell Cook" userId="6270a8f4b8f62cae" providerId="LiveId" clId="{BCBC0136-5FDE-594F-9CAA-94B144D64D8A}"/>
     <pc:docChg chg="undo custSel addSld delSld modSld">
-      <pc:chgData name="Maxwell Cook" userId="6270a8f4b8f62cae" providerId="LiveId" clId="{BCBC0136-5FDE-594F-9CAA-94B144D64D8A}" dt="2025-01-31T18:26:34.659" v="315" actId="478"/>
+      <pc:chgData name="Maxwell Cook" userId="6270a8f4b8f62cae" providerId="LiveId" clId="{BCBC0136-5FDE-594F-9CAA-94B144D64D8A}" dt="2025-02-02T18:28:29.259" v="327" actId="1076"/>
       <pc:docMkLst>
         <pc:docMk/>
       </pc:docMkLst>
@@ -348,41 +348,25 @@
         </pc:sldMkLst>
       </pc:sldChg>
       <pc:sldChg chg="addSp delSp modSp new mod">
-        <pc:chgData name="Maxwell Cook" userId="6270a8f4b8f62cae" providerId="LiveId" clId="{BCBC0136-5FDE-594F-9CAA-94B144D64D8A}" dt="2025-01-31T18:26:34.659" v="315" actId="478"/>
+        <pc:chgData name="Maxwell Cook" userId="6270a8f4b8f62cae" providerId="LiveId" clId="{BCBC0136-5FDE-594F-9CAA-94B144D64D8A}" dt="2025-02-02T18:28:29.259" v="327" actId="1076"/>
         <pc:sldMkLst>
           <pc:docMk/>
           <pc:sldMk cId="4207029184" sldId="262"/>
         </pc:sldMkLst>
-        <pc:spChg chg="del">
-          <ac:chgData name="Maxwell Cook" userId="6270a8f4b8f62cae" providerId="LiveId" clId="{BCBC0136-5FDE-594F-9CAA-94B144D64D8A}" dt="2025-01-31T17:53:26.268" v="306" actId="478"/>
-          <ac:spMkLst>
-            <pc:docMk/>
-            <pc:sldMk cId="4207029184" sldId="262"/>
-            <ac:spMk id="2" creationId="{C3B0C081-673A-F77C-690E-D52D72445901}"/>
-          </ac:spMkLst>
-        </pc:spChg>
-        <pc:spChg chg="del">
-          <ac:chgData name="Maxwell Cook" userId="6270a8f4b8f62cae" providerId="LiveId" clId="{BCBC0136-5FDE-594F-9CAA-94B144D64D8A}" dt="2025-01-31T17:53:27.873" v="307" actId="478"/>
-          <ac:spMkLst>
-            <pc:docMk/>
-            <pc:sldMk cId="4207029184" sldId="262"/>
-            <ac:spMk id="3" creationId="{D3C3F862-C780-6468-33F4-3C9AC49DD5F0}"/>
-          </ac:spMkLst>
-        </pc:spChg>
-        <pc:picChg chg="add del mod">
-          <ac:chgData name="Maxwell Cook" userId="6270a8f4b8f62cae" providerId="LiveId" clId="{BCBC0136-5FDE-594F-9CAA-94B144D64D8A}" dt="2025-01-31T17:54:02.961" v="311" actId="478"/>
+        <pc:picChg chg="add mod">
+          <ac:chgData name="Maxwell Cook" userId="6270a8f4b8f62cae" providerId="LiveId" clId="{BCBC0136-5FDE-594F-9CAA-94B144D64D8A}" dt="2025-02-02T18:28:29.259" v="327" actId="1076"/>
           <ac:picMkLst>
             <pc:docMk/>
             <pc:sldMk cId="4207029184" sldId="262"/>
-            <ac:picMk id="5" creationId="{B9DF48EE-BDE4-95B3-3581-AE7E283FCCC6}"/>
+            <ac:picMk id="3" creationId="{7FCDC6C3-9BC1-B734-63C1-531A4825354C}"/>
           </ac:picMkLst>
         </pc:picChg>
-        <pc:picChg chg="add del mod">
-          <ac:chgData name="Maxwell Cook" userId="6270a8f4b8f62cae" providerId="LiveId" clId="{BCBC0136-5FDE-594F-9CAA-94B144D64D8A}" dt="2025-01-31T18:26:34.659" v="315" actId="478"/>
+        <pc:picChg chg="add mod">
+          <ac:chgData name="Maxwell Cook" userId="6270a8f4b8f62cae" providerId="LiveId" clId="{BCBC0136-5FDE-594F-9CAA-94B144D64D8A}" dt="2025-02-02T18:27:50.403" v="323" actId="1076"/>
           <ac:picMkLst>
             <pc:docMk/>
             <pc:sldMk cId="4207029184" sldId="262"/>
-            <ac:picMk id="7" creationId="{528D58B3-56FA-038B-9A1C-812F823417E8}"/>
+            <ac:picMk id="5" creationId="{00470C1D-B98D-C672-5B56-09089D0F3F18}"/>
           </ac:picMkLst>
         </pc:picChg>
       </pc:sldChg>
@@ -522,7 +506,7 @@
           <a:p>
             <a:fld id="{3620BDAC-38D5-A048-8F27-0D0639CFFB27}" type="datetimeFigureOut">
               <a:rPr lang="en-US" smtClean="0"/>
-              <a:t>1/31/25</a:t>
+              <a:t>2/2/25</a:t>
             </a:fld>
             <a:endParaRPr lang="en-US"/>
           </a:p>
@@ -692,7 +676,7 @@
           <a:p>
             <a:fld id="{3620BDAC-38D5-A048-8F27-0D0639CFFB27}" type="datetimeFigureOut">
               <a:rPr lang="en-US" smtClean="0"/>
-              <a:t>1/31/25</a:t>
+              <a:t>2/2/25</a:t>
             </a:fld>
             <a:endParaRPr lang="en-US"/>
           </a:p>
@@ -872,7 +856,7 @@
           <a:p>
             <a:fld id="{3620BDAC-38D5-A048-8F27-0D0639CFFB27}" type="datetimeFigureOut">
               <a:rPr lang="en-US" smtClean="0"/>
-              <a:t>1/31/25</a:t>
+              <a:t>2/2/25</a:t>
             </a:fld>
             <a:endParaRPr lang="en-US"/>
           </a:p>
@@ -1042,7 +1026,7 @@
           <a:p>
             <a:fld id="{3620BDAC-38D5-A048-8F27-0D0639CFFB27}" type="datetimeFigureOut">
               <a:rPr lang="en-US" smtClean="0"/>
-              <a:t>1/31/25</a:t>
+              <a:t>2/2/25</a:t>
             </a:fld>
             <a:endParaRPr lang="en-US"/>
           </a:p>
@@ -1288,7 +1272,7 @@
           <a:p>
             <a:fld id="{3620BDAC-38D5-A048-8F27-0D0639CFFB27}" type="datetimeFigureOut">
               <a:rPr lang="en-US" smtClean="0"/>
-              <a:t>1/31/25</a:t>
+              <a:t>2/2/25</a:t>
             </a:fld>
             <a:endParaRPr lang="en-US"/>
           </a:p>
@@ -1520,7 +1504,7 @@
           <a:p>
             <a:fld id="{3620BDAC-38D5-A048-8F27-0D0639CFFB27}" type="datetimeFigureOut">
               <a:rPr lang="en-US" smtClean="0"/>
-              <a:t>1/31/25</a:t>
+              <a:t>2/2/25</a:t>
             </a:fld>
             <a:endParaRPr lang="en-US"/>
           </a:p>
@@ -1887,7 +1871,7 @@
           <a:p>
             <a:fld id="{3620BDAC-38D5-A048-8F27-0D0639CFFB27}" type="datetimeFigureOut">
               <a:rPr lang="en-US" smtClean="0"/>
-              <a:t>1/31/25</a:t>
+              <a:t>2/2/25</a:t>
             </a:fld>
             <a:endParaRPr lang="en-US"/>
           </a:p>
@@ -2005,7 +1989,7 @@
           <a:p>
             <a:fld id="{3620BDAC-38D5-A048-8F27-0D0639CFFB27}" type="datetimeFigureOut">
               <a:rPr lang="en-US" smtClean="0"/>
-              <a:t>1/31/25</a:t>
+              <a:t>2/2/25</a:t>
             </a:fld>
             <a:endParaRPr lang="en-US"/>
           </a:p>
@@ -2100,7 +2084,7 @@
           <a:p>
             <a:fld id="{3620BDAC-38D5-A048-8F27-0D0639CFFB27}" type="datetimeFigureOut">
               <a:rPr lang="en-US" smtClean="0"/>
-              <a:t>1/31/25</a:t>
+              <a:t>2/2/25</a:t>
             </a:fld>
             <a:endParaRPr lang="en-US"/>
           </a:p>
@@ -2377,7 +2361,7 @@
           <a:p>
             <a:fld id="{3620BDAC-38D5-A048-8F27-0D0639CFFB27}" type="datetimeFigureOut">
               <a:rPr lang="en-US" smtClean="0"/>
-              <a:t>1/31/25</a:t>
+              <a:t>2/2/25</a:t>
             </a:fld>
             <a:endParaRPr lang="en-US"/>
           </a:p>
@@ -2634,7 +2618,7 @@
           <a:p>
             <a:fld id="{3620BDAC-38D5-A048-8F27-0D0639CFFB27}" type="datetimeFigureOut">
               <a:rPr lang="en-US" smtClean="0"/>
-              <a:t>1/31/25</a:t>
+              <a:t>2/2/25</a:t>
             </a:fld>
             <a:endParaRPr lang="en-US"/>
           </a:p>
@@ -2847,7 +2831,7 @@
           <a:p>
             <a:fld id="{3620BDAC-38D5-A048-8F27-0D0639CFFB27}" type="datetimeFigureOut">
               <a:rPr lang="en-US" smtClean="0"/>
-              <a:t>1/31/25</a:t>
+              <a:t>2/2/25</a:t>
             </a:fld>
             <a:endParaRPr lang="en-US"/>
           </a:p>
@@ -3504,6 +3488,66 @@
           <a:chExt cx="0" cy="0"/>
         </a:xfrm>
       </p:grpSpPr>
+      <p:pic>
+        <p:nvPicPr>
+          <p:cNvPr id="3" name="Picture 2" descr="A diagram of different colored lines&#10;&#10;AI-generated content may be incorrect.">
+            <a:extLst>
+              <a:ext uri="{FF2B5EF4-FFF2-40B4-BE49-F238E27FC236}">
+                <a16:creationId xmlns:a16="http://schemas.microsoft.com/office/drawing/2014/main" id="{7FCDC6C3-9BC1-B734-63C1-531A4825354C}"/>
+              </a:ext>
+            </a:extLst>
+          </p:cNvPr>
+          <p:cNvPicPr>
+            <a:picLocks noChangeAspect="1"/>
+          </p:cNvPicPr>
+          <p:nvPr/>
+        </p:nvPicPr>
+        <p:blipFill>
+          <a:blip r:embed="rId2"/>
+          <a:stretch>
+            <a:fillRect/>
+          </a:stretch>
+        </p:blipFill>
+        <p:spPr>
+          <a:xfrm>
+            <a:off x="636372" y="4104364"/>
+            <a:ext cx="5585255" cy="3536918"/>
+          </a:xfrm>
+          <a:prstGeom prst="rect">
+            <a:avLst/>
+          </a:prstGeom>
+        </p:spPr>
+      </p:pic>
+      <p:pic>
+        <p:nvPicPr>
+          <p:cNvPr id="5" name="Picture 4" descr="A graph of different colored lines&#10;&#10;AI-generated content may be incorrect.">
+            <a:extLst>
+              <a:ext uri="{FF2B5EF4-FFF2-40B4-BE49-F238E27FC236}">
+                <a16:creationId xmlns:a16="http://schemas.microsoft.com/office/drawing/2014/main" id="{00470C1D-B98D-C672-5B56-09089D0F3F18}"/>
+              </a:ext>
+            </a:extLst>
+          </p:cNvPr>
+          <p:cNvPicPr>
+            <a:picLocks noChangeAspect="1"/>
+          </p:cNvPicPr>
+          <p:nvPr/>
+        </p:nvPicPr>
+        <p:blipFill>
+          <a:blip r:embed="rId3"/>
+          <a:stretch>
+            <a:fillRect/>
+          </a:stretch>
+        </p:blipFill>
+        <p:spPr>
+          <a:xfrm>
+            <a:off x="840260" y="0"/>
+            <a:ext cx="5585254" cy="3530767"/>
+          </a:xfrm>
+          <a:prstGeom prst="rect">
+            <a:avLst/>
+          </a:prstGeom>
+        </p:spPr>
+      </p:pic>
     </p:spTree>
     <p:extLst>
       <p:ext uri="{BB962C8B-B14F-4D97-AF65-F5344CB8AC3E}">

</xml_diff>

<commit_message>
Minor tweaks to Aim2, adding code and files for Aim3
</commit_message>
<xml_diff>
--- a/Aim2/figures/figure_arrangement.pptx
+++ b/Aim2/figures/figure_arrangement.pptx
@@ -5,13 +5,12 @@
     <p:sldMasterId id="2147483672" r:id="rId1"/>
   </p:sldMasterIdLst>
   <p:sldIdLst>
-    <p:sldId id="256" r:id="rId2"/>
-    <p:sldId id="262" r:id="rId3"/>
-    <p:sldId id="261" r:id="rId4"/>
-    <p:sldId id="258" r:id="rId5"/>
-    <p:sldId id="260" r:id="rId6"/>
-    <p:sldId id="259" r:id="rId7"/>
-    <p:sldId id="257" r:id="rId8"/>
+    <p:sldId id="263" r:id="rId2"/>
+    <p:sldId id="264" r:id="rId3"/>
+    <p:sldId id="258" r:id="rId4"/>
+    <p:sldId id="260" r:id="rId5"/>
+    <p:sldId id="259" r:id="rId6"/>
+    <p:sldId id="257" r:id="rId7"/>
   </p:sldIdLst>
   <p:sldSz cx="6858000" cy="8229600"/>
   <p:notesSz cx="6858000" cy="9144000"/>
@@ -113,7 +112,7 @@
   <p:extLst>
     <p:ext uri="{EFAFB233-063F-42B5-8137-9DF3F51BA10A}">
       <p15:sldGuideLst xmlns:p15="http://schemas.microsoft.com/office/powerpoint/2012/main">
-        <p15:guide id="1" orient="horz" pos="2592" userDrawn="1">
+        <p15:guide id="1" orient="horz" pos="2568" userDrawn="1">
           <p15:clr>
             <a:srgbClr val="A4A3A4"/>
           </p15:clr>
@@ -132,7 +131,7 @@
 <file path=ppt/revisionInfo.xml><?xml version="1.0" encoding="utf-8"?>
 <p1510:revInfo xmlns:a="http://schemas.openxmlformats.org/drawingml/2006/main" xmlns:r="http://schemas.openxmlformats.org/officeDocument/2006/relationships" xmlns:p1510="http://schemas.microsoft.com/office/powerpoint/2015/10/main">
   <p1510:revLst>
-    <p1510:client id="{BCBC0136-5FDE-594F-9CAA-94B144D64D8A}" v="77" dt="2025-02-02T18:27:35.981"/>
+    <p1510:client id="{BCBC0136-5FDE-594F-9CAA-94B144D64D8A}" v="82" dt="2025-02-05T03:32:18.460"/>
   </p1510:revLst>
 </p1510:revInfo>
 </file>
@@ -142,64 +141,16 @@
   <pc:docChgLst>
     <pc:chgData name="Maxwell Cook" userId="6270a8f4b8f62cae" providerId="LiveId" clId="{BCBC0136-5FDE-594F-9CAA-94B144D64D8A}"/>
     <pc:docChg chg="undo custSel addSld delSld modSld">
-      <pc:chgData name="Maxwell Cook" userId="6270a8f4b8f62cae" providerId="LiveId" clId="{BCBC0136-5FDE-594F-9CAA-94B144D64D8A}" dt="2025-02-02T18:28:29.259" v="327" actId="1076"/>
+      <pc:chgData name="Maxwell Cook" userId="6270a8f4b8f62cae" providerId="LiveId" clId="{BCBC0136-5FDE-594F-9CAA-94B144D64D8A}" dt="2025-02-05T03:32:32.167" v="352" actId="14100"/>
       <pc:docMkLst>
         <pc:docMk/>
       </pc:docMkLst>
-      <pc:sldChg chg="addSp delSp modSp mod">
-        <pc:chgData name="Maxwell Cook" userId="6270a8f4b8f62cae" providerId="LiveId" clId="{BCBC0136-5FDE-594F-9CAA-94B144D64D8A}" dt="2024-12-09T02:15:40.251" v="121" actId="1076"/>
+      <pc:sldChg chg="addSp delSp modSp del mod">
+        <pc:chgData name="Maxwell Cook" userId="6270a8f4b8f62cae" providerId="LiveId" clId="{BCBC0136-5FDE-594F-9CAA-94B144D64D8A}" dt="2025-02-05T03:31:39.150" v="335" actId="2696"/>
         <pc:sldMkLst>
           <pc:docMk/>
           <pc:sldMk cId="3693775636" sldId="256"/>
         </pc:sldMkLst>
-        <pc:spChg chg="add mod">
-          <ac:chgData name="Maxwell Cook" userId="6270a8f4b8f62cae" providerId="LiveId" clId="{BCBC0136-5FDE-594F-9CAA-94B144D64D8A}" dt="2024-12-09T02:15:40.251" v="121" actId="1076"/>
-          <ac:spMkLst>
-            <pc:docMk/>
-            <pc:sldMk cId="3693775636" sldId="256"/>
-            <ac:spMk id="2" creationId="{97DB9CA4-0CDC-E44C-830B-06FB23CF1F21}"/>
-          </ac:spMkLst>
-        </pc:spChg>
-        <pc:spChg chg="mod">
-          <ac:chgData name="Maxwell Cook" userId="6270a8f4b8f62cae" providerId="LiveId" clId="{BCBC0136-5FDE-594F-9CAA-94B144D64D8A}" dt="2024-12-09T00:46:16.724" v="97" actId="1076"/>
-          <ac:spMkLst>
-            <pc:docMk/>
-            <pc:sldMk cId="3693775636" sldId="256"/>
-            <ac:spMk id="4" creationId="{8F36A069-3398-2F21-F20D-6DE2C885920E}"/>
-          </ac:spMkLst>
-        </pc:spChg>
-        <pc:picChg chg="add mod">
-          <ac:chgData name="Maxwell Cook" userId="6270a8f4b8f62cae" providerId="LiveId" clId="{BCBC0136-5FDE-594F-9CAA-94B144D64D8A}" dt="2024-12-09T00:46:16.724" v="97" actId="1076"/>
-          <ac:picMkLst>
-            <pc:docMk/>
-            <pc:sldMk cId="3693775636" sldId="256"/>
-            <ac:picMk id="6" creationId="{EA3BD154-FF54-8B34-43E4-92747AB1AB0E}"/>
-          </ac:picMkLst>
-        </pc:picChg>
-        <pc:picChg chg="add mod">
-          <ac:chgData name="Maxwell Cook" userId="6270a8f4b8f62cae" providerId="LiveId" clId="{BCBC0136-5FDE-594F-9CAA-94B144D64D8A}" dt="2024-12-09T02:15:37.673" v="120" actId="1076"/>
-          <ac:picMkLst>
-            <pc:docMk/>
-            <pc:sldMk cId="3693775636" sldId="256"/>
-            <ac:picMk id="7" creationId="{ED8A69DC-B15E-D82F-FCA4-DCABC91944BD}"/>
-          </ac:picMkLst>
-        </pc:picChg>
-        <pc:picChg chg="add mod">
-          <ac:chgData name="Maxwell Cook" userId="6270a8f4b8f62cae" providerId="LiveId" clId="{BCBC0136-5FDE-594F-9CAA-94B144D64D8A}" dt="2024-12-09T00:46:16.724" v="97" actId="1076"/>
-          <ac:picMkLst>
-            <pc:docMk/>
-            <pc:sldMk cId="3693775636" sldId="256"/>
-            <ac:picMk id="8" creationId="{54D88B57-6429-025D-4D45-BDAD577B3D11}"/>
-          </ac:picMkLst>
-        </pc:picChg>
-        <pc:picChg chg="add mod">
-          <ac:chgData name="Maxwell Cook" userId="6270a8f4b8f62cae" providerId="LiveId" clId="{BCBC0136-5FDE-594F-9CAA-94B144D64D8A}" dt="2024-12-09T00:46:16.724" v="97" actId="1076"/>
-          <ac:picMkLst>
-            <pc:docMk/>
-            <pc:sldMk cId="3693775636" sldId="256"/>
-            <ac:picMk id="10" creationId="{D5F1398E-B953-1F59-F217-7FDD62C30D1D}"/>
-          </ac:picMkLst>
-        </pc:picChg>
       </pc:sldChg>
       <pc:sldChg chg="addSp modSp mod">
         <pc:chgData name="Maxwell Cook" userId="6270a8f4b8f62cae" providerId="LiveId" clId="{BCBC0136-5FDE-594F-9CAA-94B144D64D8A}" dt="2024-12-07T03:00:23.908" v="74" actId="14100"/>
@@ -340,33 +291,111 @@
           </ac:picMkLst>
         </pc:picChg>
       </pc:sldChg>
-      <pc:sldChg chg="add">
-        <pc:chgData name="Maxwell Cook" userId="6270a8f4b8f62cae" providerId="LiveId" clId="{BCBC0136-5FDE-594F-9CAA-94B144D64D8A}" dt="2025-01-19T17:07:40.526" v="304" actId="2890"/>
+      <pc:sldChg chg="add del">
+        <pc:chgData name="Maxwell Cook" userId="6270a8f4b8f62cae" providerId="LiveId" clId="{BCBC0136-5FDE-594F-9CAA-94B144D64D8A}" dt="2025-02-05T03:14:59.557" v="329" actId="2696"/>
         <pc:sldMkLst>
           <pc:docMk/>
           <pc:sldMk cId="319057114" sldId="261"/>
         </pc:sldMkLst>
       </pc:sldChg>
-      <pc:sldChg chg="addSp delSp modSp new mod">
-        <pc:chgData name="Maxwell Cook" userId="6270a8f4b8f62cae" providerId="LiveId" clId="{BCBC0136-5FDE-594F-9CAA-94B144D64D8A}" dt="2025-02-02T18:28:29.259" v="327" actId="1076"/>
+      <pc:sldChg chg="addSp delSp modSp new del mod">
+        <pc:chgData name="Maxwell Cook" userId="6270a8f4b8f62cae" providerId="LiveId" clId="{BCBC0136-5FDE-594F-9CAA-94B144D64D8A}" dt="2025-02-05T03:15:04.359" v="330" actId="2696"/>
         <pc:sldMkLst>
           <pc:docMk/>
           <pc:sldMk cId="4207029184" sldId="262"/>
         </pc:sldMkLst>
-        <pc:picChg chg="add mod">
-          <ac:chgData name="Maxwell Cook" userId="6270a8f4b8f62cae" providerId="LiveId" clId="{BCBC0136-5FDE-594F-9CAA-94B144D64D8A}" dt="2025-02-02T18:28:29.259" v="327" actId="1076"/>
+      </pc:sldChg>
+      <pc:sldChg chg="modSp add">
+        <pc:chgData name="Maxwell Cook" userId="6270a8f4b8f62cae" providerId="LiveId" clId="{BCBC0136-5FDE-594F-9CAA-94B144D64D8A}" dt="2025-02-05T03:26:50.870" v="334" actId="14826"/>
+        <pc:sldMkLst>
+          <pc:docMk/>
+          <pc:sldMk cId="2033406883" sldId="263"/>
+        </pc:sldMkLst>
+        <pc:picChg chg="mod">
+          <ac:chgData name="Maxwell Cook" userId="6270a8f4b8f62cae" providerId="LiveId" clId="{BCBC0136-5FDE-594F-9CAA-94B144D64D8A}" dt="2025-02-05T03:16:05.644" v="333" actId="14826"/>
           <ac:picMkLst>
             <pc:docMk/>
-            <pc:sldMk cId="4207029184" sldId="262"/>
-            <ac:picMk id="3" creationId="{7FCDC6C3-9BC1-B734-63C1-531A4825354C}"/>
+            <pc:sldMk cId="2033406883" sldId="263"/>
+            <ac:picMk id="6" creationId="{5E001FE1-47DC-8A2C-B9A2-D6FAE5D75DBE}"/>
           </ac:picMkLst>
         </pc:picChg>
-        <pc:picChg chg="add mod">
-          <ac:chgData name="Maxwell Cook" userId="6270a8f4b8f62cae" providerId="LiveId" clId="{BCBC0136-5FDE-594F-9CAA-94B144D64D8A}" dt="2025-02-02T18:27:50.403" v="323" actId="1076"/>
+        <pc:picChg chg="mod">
+          <ac:chgData name="Maxwell Cook" userId="6270a8f4b8f62cae" providerId="LiveId" clId="{BCBC0136-5FDE-594F-9CAA-94B144D64D8A}" dt="2025-02-05T03:26:50.870" v="334" actId="14826"/>
           <ac:picMkLst>
             <pc:docMk/>
-            <pc:sldMk cId="4207029184" sldId="262"/>
-            <ac:picMk id="5" creationId="{00470C1D-B98D-C672-5B56-09089D0F3F18}"/>
+            <pc:sldMk cId="2033406883" sldId="263"/>
+            <ac:picMk id="8" creationId="{27E3D4B1-2115-69DB-8BDF-10BCC6CDE4A1}"/>
+          </ac:picMkLst>
+        </pc:picChg>
+        <pc:picChg chg="mod">
+          <ac:chgData name="Maxwell Cook" userId="6270a8f4b8f62cae" providerId="LiveId" clId="{BCBC0136-5FDE-594F-9CAA-94B144D64D8A}" dt="2025-02-05T03:15:26.124" v="331" actId="14826"/>
+          <ac:picMkLst>
+            <pc:docMk/>
+            <pc:sldMk cId="2033406883" sldId="263"/>
+            <ac:picMk id="10" creationId="{3019B0E9-B011-47FE-6146-46291B2903BD}"/>
+          </ac:picMkLst>
+        </pc:picChg>
+      </pc:sldChg>
+      <pc:sldChg chg="addSp delSp modSp add mod">
+        <pc:chgData name="Maxwell Cook" userId="6270a8f4b8f62cae" providerId="LiveId" clId="{BCBC0136-5FDE-594F-9CAA-94B144D64D8A}" dt="2025-02-05T03:32:32.167" v="352" actId="14100"/>
+        <pc:sldMkLst>
+          <pc:docMk/>
+          <pc:sldMk cId="660672776" sldId="264"/>
+        </pc:sldMkLst>
+        <pc:spChg chg="del">
+          <ac:chgData name="Maxwell Cook" userId="6270a8f4b8f62cae" providerId="LiveId" clId="{BCBC0136-5FDE-594F-9CAA-94B144D64D8A}" dt="2025-02-05T03:31:45.677" v="338" actId="478"/>
+          <ac:spMkLst>
+            <pc:docMk/>
+            <pc:sldMk cId="660672776" sldId="264"/>
+            <ac:spMk id="2" creationId="{AD95CDE0-9A31-42C5-2596-48DE8B6EF73C}"/>
+          </ac:spMkLst>
+        </pc:spChg>
+        <pc:spChg chg="del">
+          <ac:chgData name="Maxwell Cook" userId="6270a8f4b8f62cae" providerId="LiveId" clId="{BCBC0136-5FDE-594F-9CAA-94B144D64D8A}" dt="2025-02-05T03:31:47.012" v="339" actId="478"/>
+          <ac:spMkLst>
+            <pc:docMk/>
+            <pc:sldMk cId="660672776" sldId="264"/>
+            <ac:spMk id="4" creationId="{432AC716-AACB-4807-0536-689606EC7974}"/>
+          </ac:spMkLst>
+        </pc:spChg>
+        <pc:picChg chg="add mod">
+          <ac:chgData name="Maxwell Cook" userId="6270a8f4b8f62cae" providerId="LiveId" clId="{BCBC0136-5FDE-594F-9CAA-94B144D64D8A}" dt="2025-02-05T03:32:32.167" v="352" actId="14100"/>
+          <ac:picMkLst>
+            <pc:docMk/>
+            <pc:sldMk cId="660672776" sldId="264"/>
+            <ac:picMk id="5" creationId="{15A35474-20F1-F94B-0230-7D66758C20CD}"/>
+          </ac:picMkLst>
+        </pc:picChg>
+        <pc:picChg chg="mod">
+          <ac:chgData name="Maxwell Cook" userId="6270a8f4b8f62cae" providerId="LiveId" clId="{BCBC0136-5FDE-594F-9CAA-94B144D64D8A}" dt="2025-02-05T03:32:28.678" v="350" actId="1076"/>
+          <ac:picMkLst>
+            <pc:docMk/>
+            <pc:sldMk cId="660672776" sldId="264"/>
+            <ac:picMk id="6" creationId="{9F9BB720-A725-36B5-69DD-7778AE856E63}"/>
+          </ac:picMkLst>
+        </pc:picChg>
+        <pc:picChg chg="del">
+          <ac:chgData name="Maxwell Cook" userId="6270a8f4b8f62cae" providerId="LiveId" clId="{BCBC0136-5FDE-594F-9CAA-94B144D64D8A}" dt="2025-02-05T03:31:44.337" v="337" actId="478"/>
+          <ac:picMkLst>
+            <pc:docMk/>
+            <pc:sldMk cId="660672776" sldId="264"/>
+            <ac:picMk id="7" creationId="{E7D3D9F9-AA13-4F4F-99B6-1C1B1EE77892}"/>
+          </ac:picMkLst>
+        </pc:picChg>
+        <pc:picChg chg="del">
+          <ac:chgData name="Maxwell Cook" userId="6270a8f4b8f62cae" providerId="LiveId" clId="{BCBC0136-5FDE-594F-9CAA-94B144D64D8A}" dt="2025-02-05T03:31:48.793" v="341" actId="478"/>
+          <ac:picMkLst>
+            <pc:docMk/>
+            <pc:sldMk cId="660672776" sldId="264"/>
+            <ac:picMk id="8" creationId="{8C09E414-B190-C80A-FE9A-10BFE6A466D0}"/>
+          </ac:picMkLst>
+        </pc:picChg>
+        <pc:picChg chg="del">
+          <ac:chgData name="Maxwell Cook" userId="6270a8f4b8f62cae" providerId="LiveId" clId="{BCBC0136-5FDE-594F-9CAA-94B144D64D8A}" dt="2025-02-05T03:31:48.454" v="340" actId="478"/>
+          <ac:picMkLst>
+            <pc:docMk/>
+            <pc:sldMk cId="660672776" sldId="264"/>
+            <ac:picMk id="10" creationId="{00FDAF46-A2F7-D83A-54FC-4BAD416D8B0E}"/>
           </ac:picMkLst>
         </pc:picChg>
       </pc:sldChg>
@@ -506,7 +535,7 @@
           <a:p>
             <a:fld id="{3620BDAC-38D5-A048-8F27-0D0639CFFB27}" type="datetimeFigureOut">
               <a:rPr lang="en-US" smtClean="0"/>
-              <a:t>2/2/25</a:t>
+              <a:t>2/4/25</a:t>
             </a:fld>
             <a:endParaRPr lang="en-US"/>
           </a:p>
@@ -676,7 +705,7 @@
           <a:p>
             <a:fld id="{3620BDAC-38D5-A048-8F27-0D0639CFFB27}" type="datetimeFigureOut">
               <a:rPr lang="en-US" smtClean="0"/>
-              <a:t>2/2/25</a:t>
+              <a:t>2/4/25</a:t>
             </a:fld>
             <a:endParaRPr lang="en-US"/>
           </a:p>
@@ -856,7 +885,7 @@
           <a:p>
             <a:fld id="{3620BDAC-38D5-A048-8F27-0D0639CFFB27}" type="datetimeFigureOut">
               <a:rPr lang="en-US" smtClean="0"/>
-              <a:t>2/2/25</a:t>
+              <a:t>2/4/25</a:t>
             </a:fld>
             <a:endParaRPr lang="en-US"/>
           </a:p>
@@ -1026,7 +1055,7 @@
           <a:p>
             <a:fld id="{3620BDAC-38D5-A048-8F27-0D0639CFFB27}" type="datetimeFigureOut">
               <a:rPr lang="en-US" smtClean="0"/>
-              <a:t>2/2/25</a:t>
+              <a:t>2/4/25</a:t>
             </a:fld>
             <a:endParaRPr lang="en-US"/>
           </a:p>
@@ -1272,7 +1301,7 @@
           <a:p>
             <a:fld id="{3620BDAC-38D5-A048-8F27-0D0639CFFB27}" type="datetimeFigureOut">
               <a:rPr lang="en-US" smtClean="0"/>
-              <a:t>2/2/25</a:t>
+              <a:t>2/4/25</a:t>
             </a:fld>
             <a:endParaRPr lang="en-US"/>
           </a:p>
@@ -1504,7 +1533,7 @@
           <a:p>
             <a:fld id="{3620BDAC-38D5-A048-8F27-0D0639CFFB27}" type="datetimeFigureOut">
               <a:rPr lang="en-US" smtClean="0"/>
-              <a:t>2/2/25</a:t>
+              <a:t>2/4/25</a:t>
             </a:fld>
             <a:endParaRPr lang="en-US"/>
           </a:p>
@@ -1871,7 +1900,7 @@
           <a:p>
             <a:fld id="{3620BDAC-38D5-A048-8F27-0D0639CFFB27}" type="datetimeFigureOut">
               <a:rPr lang="en-US" smtClean="0"/>
-              <a:t>2/2/25</a:t>
+              <a:t>2/4/25</a:t>
             </a:fld>
             <a:endParaRPr lang="en-US"/>
           </a:p>
@@ -1989,7 +2018,7 @@
           <a:p>
             <a:fld id="{3620BDAC-38D5-A048-8F27-0D0639CFFB27}" type="datetimeFigureOut">
               <a:rPr lang="en-US" smtClean="0"/>
-              <a:t>2/2/25</a:t>
+              <a:t>2/4/25</a:t>
             </a:fld>
             <a:endParaRPr lang="en-US"/>
           </a:p>
@@ -2084,7 +2113,7 @@
           <a:p>
             <a:fld id="{3620BDAC-38D5-A048-8F27-0D0639CFFB27}" type="datetimeFigureOut">
               <a:rPr lang="en-US" smtClean="0"/>
-              <a:t>2/2/25</a:t>
+              <a:t>2/4/25</a:t>
             </a:fld>
             <a:endParaRPr lang="en-US"/>
           </a:p>
@@ -2361,7 +2390,7 @@
           <a:p>
             <a:fld id="{3620BDAC-38D5-A048-8F27-0D0639CFFB27}" type="datetimeFigureOut">
               <a:rPr lang="en-US" smtClean="0"/>
-              <a:t>2/2/25</a:t>
+              <a:t>2/4/25</a:t>
             </a:fld>
             <a:endParaRPr lang="en-US"/>
           </a:p>
@@ -2618,7 +2647,7 @@
           <a:p>
             <a:fld id="{3620BDAC-38D5-A048-8F27-0D0639CFFB27}" type="datetimeFigureOut">
               <a:rPr lang="en-US" smtClean="0"/>
-              <a:t>2/2/25</a:t>
+              <a:t>2/4/25</a:t>
             </a:fld>
             <a:endParaRPr lang="en-US"/>
           </a:p>
@@ -2831,7 +2860,7 @@
           <a:p>
             <a:fld id="{3620BDAC-38D5-A048-8F27-0D0639CFFB27}" type="datetimeFigureOut">
               <a:rPr lang="en-US" smtClean="0"/>
-              <a:t>2/2/25</a:t>
+              <a:t>2/4/25</a:t>
             </a:fld>
             <a:endParaRPr lang="en-US"/>
           </a:p>
@@ -3224,7 +3253,13 @@
   <p:cSld>
     <p:spTree>
       <p:nvGrpSpPr>
-        <p:cNvPr id="1" name=""/>
+        <p:cNvPr id="1" name="">
+          <a:extLst>
+            <a:ext uri="{FF2B5EF4-FFF2-40B4-BE49-F238E27FC236}">
+              <a16:creationId xmlns:a16="http://schemas.microsoft.com/office/drawing/2014/main" id="{CADABA4F-8F41-E872-5866-81D2C28A6733}"/>
+            </a:ext>
+          </a:extLst>
+        </p:cNvPr>
         <p:cNvGrpSpPr/>
         <p:nvPr/>
       </p:nvGrpSpPr>
@@ -3241,7 +3276,7 @@
           <p:cNvPr id="4" name="TextBox 3">
             <a:extLst>
               <a:ext uri="{FF2B5EF4-FFF2-40B4-BE49-F238E27FC236}">
-                <a16:creationId xmlns:a16="http://schemas.microsoft.com/office/drawing/2014/main" id="{8F36A069-3398-2F21-F20D-6DE2C885920E}"/>
+                <a16:creationId xmlns:a16="http://schemas.microsoft.com/office/drawing/2014/main" id="{C3C7D46A-6329-C480-8925-FC44F71CA798}"/>
               </a:ext>
             </a:extLst>
           </p:cNvPr>
@@ -3293,7 +3328,7 @@
           <p:cNvPr id="6" name="Picture 5">
             <a:extLst>
               <a:ext uri="{FF2B5EF4-FFF2-40B4-BE49-F238E27FC236}">
-                <a16:creationId xmlns:a16="http://schemas.microsoft.com/office/drawing/2014/main" id="{EA3BD154-FF54-8B34-43E4-92747AB1AB0E}"/>
+                <a16:creationId xmlns:a16="http://schemas.microsoft.com/office/drawing/2014/main" id="{5E001FE1-47DC-8A2C-B9A2-D6FAE5D75DBE}"/>
               </a:ext>
             </a:extLst>
           </p:cNvPr>
@@ -3309,8 +3344,8 @@
         </p:blipFill>
         <p:spPr>
           <a:xfrm>
-            <a:off x="406945" y="89516"/>
-            <a:ext cx="2894533" cy="3566140"/>
+            <a:off x="411675" y="89516"/>
+            <a:ext cx="2885073" cy="3566140"/>
           </a:xfrm>
           <a:prstGeom prst="rect">
             <a:avLst/>
@@ -3319,10 +3354,10 @@
       </p:pic>
       <p:pic>
         <p:nvPicPr>
-          <p:cNvPr id="8" name="Picture 7" descr="A graph of a number of years&#10;&#10;Description automatically generated">
+          <p:cNvPr id="8" name="Picture 7">
             <a:extLst>
               <a:ext uri="{FF2B5EF4-FFF2-40B4-BE49-F238E27FC236}">
-                <a16:creationId xmlns:a16="http://schemas.microsoft.com/office/drawing/2014/main" id="{54D88B57-6429-025D-4D45-BDAD577B3D11}"/>
+                <a16:creationId xmlns:a16="http://schemas.microsoft.com/office/drawing/2014/main" id="{27E3D4B1-2115-69DB-8BDF-10BCC6CDE4A1}"/>
               </a:ext>
             </a:extLst>
           </p:cNvPr>
@@ -3333,14 +3368,13 @@
         </p:nvPicPr>
         <p:blipFill>
           <a:blip r:embed="rId3"/>
-          <a:stretch>
-            <a:fillRect/>
-          </a:stretch>
+          <a:srcRect/>
+          <a:stretch/>
         </p:blipFill>
         <p:spPr>
           <a:xfrm>
             <a:off x="3301478" y="70470"/>
-            <a:ext cx="2923201" cy="1802117"/>
+            <a:ext cx="2923201" cy="1802116"/>
           </a:xfrm>
           <a:prstGeom prst="rect">
             <a:avLst/>
@@ -3352,7 +3386,7 @@
           <p:cNvPr id="10" name="Picture 9">
             <a:extLst>
               <a:ext uri="{FF2B5EF4-FFF2-40B4-BE49-F238E27FC236}">
-                <a16:creationId xmlns:a16="http://schemas.microsoft.com/office/drawing/2014/main" id="{D5F1398E-B953-1F59-F217-7FDD62C30D1D}"/>
+                <a16:creationId xmlns:a16="http://schemas.microsoft.com/office/drawing/2014/main" id="{3019B0E9-B011-47FE-6146-46291B2903BD}"/>
               </a:ext>
             </a:extLst>
           </p:cNvPr>
@@ -3368,8 +3402,8 @@
         </p:blipFill>
         <p:spPr>
           <a:xfrm>
-            <a:off x="3435738" y="1872587"/>
-            <a:ext cx="2788941" cy="1709350"/>
+            <a:off x="3435739" y="1872587"/>
+            <a:ext cx="2788939" cy="1709350"/>
           </a:xfrm>
           <a:prstGeom prst="rect">
             <a:avLst/>
@@ -3381,7 +3415,7 @@
           <p:cNvPr id="2" name="TextBox 1">
             <a:extLst>
               <a:ext uri="{FF2B5EF4-FFF2-40B4-BE49-F238E27FC236}">
-                <a16:creationId xmlns:a16="http://schemas.microsoft.com/office/drawing/2014/main" id="{97DB9CA4-0CDC-E44C-830B-06FB23CF1F21}"/>
+                <a16:creationId xmlns:a16="http://schemas.microsoft.com/office/drawing/2014/main" id="{D29C28B3-F394-BB01-DEC7-9EF71D489551}"/>
               </a:ext>
             </a:extLst>
           </p:cNvPr>
@@ -3433,7 +3467,7 @@
           <p:cNvPr id="7" name="Picture 6" descr="A map of the united states&#10;&#10;Description automatically generated">
             <a:extLst>
               <a:ext uri="{FF2B5EF4-FFF2-40B4-BE49-F238E27FC236}">
-                <a16:creationId xmlns:a16="http://schemas.microsoft.com/office/drawing/2014/main" id="{ED8A69DC-B15E-D82F-FCA4-DCABC91944BD}"/>
+                <a16:creationId xmlns:a16="http://schemas.microsoft.com/office/drawing/2014/main" id="{6852F306-284A-C007-F7C0-811947BE3F90}"/>
               </a:ext>
             </a:extLst>
           </p:cNvPr>
@@ -3461,7 +3495,7 @@
     </p:spTree>
     <p:extLst>
       <p:ext uri="{BB962C8B-B14F-4D97-AF65-F5344CB8AC3E}">
-        <p14:creationId xmlns:p14="http://schemas.microsoft.com/office/powerpoint/2010/main" val="3693775636"/>
+        <p14:creationId xmlns:p14="http://schemas.microsoft.com/office/powerpoint/2010/main" val="2033406883"/>
       </p:ext>
     </p:extLst>
   </p:cSld>
@@ -3476,7 +3510,13 @@
   <p:cSld>
     <p:spTree>
       <p:nvGrpSpPr>
-        <p:cNvPr id="1" name=""/>
+        <p:cNvPr id="1" name="">
+          <a:extLst>
+            <a:ext uri="{FF2B5EF4-FFF2-40B4-BE49-F238E27FC236}">
+              <a16:creationId xmlns:a16="http://schemas.microsoft.com/office/drawing/2014/main" id="{1E0E701E-31E7-39C2-CBAF-55477EF8D588}"/>
+            </a:ext>
+          </a:extLst>
+        </p:cNvPr>
         <p:cNvGrpSpPr/>
         <p:nvPr/>
       </p:nvGrpSpPr>
@@ -3490,10 +3530,10 @@
       </p:grpSpPr>
       <p:pic>
         <p:nvPicPr>
-          <p:cNvPr id="3" name="Picture 2" descr="A diagram of different colored lines&#10;&#10;AI-generated content may be incorrect.">
+          <p:cNvPr id="6" name="Picture 5">
             <a:extLst>
               <a:ext uri="{FF2B5EF4-FFF2-40B4-BE49-F238E27FC236}">
-                <a16:creationId xmlns:a16="http://schemas.microsoft.com/office/drawing/2014/main" id="{7FCDC6C3-9BC1-B734-63C1-531A4825354C}"/>
+                <a16:creationId xmlns:a16="http://schemas.microsoft.com/office/drawing/2014/main" id="{9F9BB720-A725-36B5-69DD-7778AE856E63}"/>
               </a:ext>
             </a:extLst>
           </p:cNvPr>
@@ -3504,14 +3544,13 @@
         </p:nvPicPr>
         <p:blipFill>
           <a:blip r:embed="rId2"/>
-          <a:stretch>
-            <a:fillRect/>
-          </a:stretch>
+          <a:srcRect/>
+          <a:stretch/>
         </p:blipFill>
         <p:spPr>
           <a:xfrm>
-            <a:off x="636372" y="4104364"/>
-            <a:ext cx="5585255" cy="3536918"/>
+            <a:off x="32516" y="89516"/>
+            <a:ext cx="3396484" cy="4198278"/>
           </a:xfrm>
           <a:prstGeom prst="rect">
             <a:avLst/>
@@ -3520,10 +3559,10 @@
       </p:pic>
       <p:pic>
         <p:nvPicPr>
-          <p:cNvPr id="5" name="Picture 4" descr="A graph of different colored lines&#10;&#10;AI-generated content may be incorrect.">
+          <p:cNvPr id="5" name="Picture 4" descr="A map of the country&#10;&#10;AI-generated content may be incorrect.">
             <a:extLst>
               <a:ext uri="{FF2B5EF4-FFF2-40B4-BE49-F238E27FC236}">
-                <a16:creationId xmlns:a16="http://schemas.microsoft.com/office/drawing/2014/main" id="{00470C1D-B98D-C672-5B56-09089D0F3F18}"/>
+                <a16:creationId xmlns:a16="http://schemas.microsoft.com/office/drawing/2014/main" id="{15A35474-20F1-F94B-0230-7D66758C20CD}"/>
               </a:ext>
             </a:extLst>
           </p:cNvPr>
@@ -3540,8 +3579,8 @@
         </p:blipFill>
         <p:spPr>
           <a:xfrm>
-            <a:off x="840260" y="0"/>
-            <a:ext cx="5585254" cy="3530767"/>
+            <a:off x="4312508" y="0"/>
+            <a:ext cx="1809462" cy="4215558"/>
           </a:xfrm>
           <a:prstGeom prst="rect">
             <a:avLst/>
@@ -3551,7 +3590,7 @@
     </p:spTree>
     <p:extLst>
       <p:ext uri="{BB962C8B-B14F-4D97-AF65-F5344CB8AC3E}">
-        <p14:creationId xmlns:p14="http://schemas.microsoft.com/office/powerpoint/2010/main" val="4207029184"/>
+        <p14:creationId xmlns:p14="http://schemas.microsoft.com/office/powerpoint/2010/main" val="660672776"/>
       </p:ext>
     </p:extLst>
   </p:cSld>
@@ -3562,264 +3601,6 @@
 </file>
 
 <file path=ppt/slides/slide3.xml><?xml version="1.0" encoding="utf-8"?>
-<p:sld xmlns:a="http://schemas.openxmlformats.org/drawingml/2006/main" xmlns:r="http://schemas.openxmlformats.org/officeDocument/2006/relationships" xmlns:p="http://schemas.openxmlformats.org/presentationml/2006/main">
-  <p:cSld>
-    <p:spTree>
-      <p:nvGrpSpPr>
-        <p:cNvPr id="1" name="">
-          <a:extLst>
-            <a:ext uri="{FF2B5EF4-FFF2-40B4-BE49-F238E27FC236}">
-              <a16:creationId xmlns:a16="http://schemas.microsoft.com/office/drawing/2014/main" id="{CBB8E8D1-18F9-23D2-C2B2-0159AAC903F5}"/>
-            </a:ext>
-          </a:extLst>
-        </p:cNvPr>
-        <p:cNvGrpSpPr/>
-        <p:nvPr/>
-      </p:nvGrpSpPr>
-      <p:grpSpPr>
-        <a:xfrm>
-          <a:off x="0" y="0"/>
-          <a:ext cx="0" cy="0"/>
-          <a:chOff x="0" y="0"/>
-          <a:chExt cx="0" cy="0"/>
-        </a:xfrm>
-      </p:grpSpPr>
-      <p:sp>
-        <p:nvSpPr>
-          <p:cNvPr id="4" name="TextBox 3">
-            <a:extLst>
-              <a:ext uri="{FF2B5EF4-FFF2-40B4-BE49-F238E27FC236}">
-                <a16:creationId xmlns:a16="http://schemas.microsoft.com/office/drawing/2014/main" id="{78A7C49F-69FC-D9EC-56F0-9D25F042DC51}"/>
-              </a:ext>
-            </a:extLst>
-          </p:cNvPr>
-          <p:cNvSpPr txBox="1"/>
-          <p:nvPr/>
-        </p:nvSpPr>
-        <p:spPr>
-          <a:xfrm>
-            <a:off x="406945" y="3730079"/>
-            <a:ext cx="5817734" cy="769441"/>
-          </a:xfrm>
-          <a:prstGeom prst="rect">
-            <a:avLst/>
-          </a:prstGeom>
-          <a:noFill/>
-        </p:spPr>
-        <p:txBody>
-          <a:bodyPr wrap="square" rtlCol="0">
-            <a:spAutoFit/>
-          </a:bodyPr>
-          <a:lstStyle/>
-          <a:p>
-            <a:r>
-              <a:rPr lang="en-US" sz="1100" b="1" i="0" u="none" strike="noStrike" dirty="0">
-                <a:solidFill>
-                  <a:srgbClr val="000000"/>
-                </a:solidFill>
-                <a:effectLst/>
-                <a:latin typeface="Times New Roman" panose="02020603050405020304" pitchFamily="18" charset="0"/>
-              </a:rPr>
-              <a:t>Figure 1.</a:t>
-            </a:r>
-            <a:r>
-              <a:rPr lang="en-US" sz="1100" b="0" i="0" u="none" strike="noStrike" dirty="0">
-                <a:solidFill>
-                  <a:srgbClr val="000000"/>
-                </a:solidFill>
-                <a:effectLst/>
-                <a:latin typeface="Times New Roman" panose="02020603050405020304" pitchFamily="18" charset="0"/>
-              </a:rPr>
-              <a:t> Study region and wildfire events. (A) Map of the SRM showing the locations of wildfire events with &gt;1% pre-fire aspen cover. Point size represents the burned area (ha), color scale represents the percentage of aspen forest cover; (B) annual burned area (ha); (C) distribution of fire size (or other statistics ??).</a:t>
-            </a:r>
-            <a:endParaRPr lang="en-US" sz="1100" dirty="0"/>
-          </a:p>
-        </p:txBody>
-      </p:sp>
-      <p:pic>
-        <p:nvPicPr>
-          <p:cNvPr id="6" name="Picture 5">
-            <a:extLst>
-              <a:ext uri="{FF2B5EF4-FFF2-40B4-BE49-F238E27FC236}">
-                <a16:creationId xmlns:a16="http://schemas.microsoft.com/office/drawing/2014/main" id="{1E4567D6-2F22-D6B5-AE87-2BAD7EF9136B}"/>
-              </a:ext>
-            </a:extLst>
-          </p:cNvPr>
-          <p:cNvPicPr>
-            <a:picLocks noChangeAspect="1"/>
-          </p:cNvPicPr>
-          <p:nvPr/>
-        </p:nvPicPr>
-        <p:blipFill>
-          <a:blip r:embed="rId2"/>
-          <a:srcRect/>
-          <a:stretch/>
-        </p:blipFill>
-        <p:spPr>
-          <a:xfrm>
-            <a:off x="406945" y="89516"/>
-            <a:ext cx="2894533" cy="3566140"/>
-          </a:xfrm>
-          <a:prstGeom prst="rect">
-            <a:avLst/>
-          </a:prstGeom>
-        </p:spPr>
-      </p:pic>
-      <p:pic>
-        <p:nvPicPr>
-          <p:cNvPr id="8" name="Picture 7" descr="A graph of a number of years&#10;&#10;Description automatically generated">
-            <a:extLst>
-              <a:ext uri="{FF2B5EF4-FFF2-40B4-BE49-F238E27FC236}">
-                <a16:creationId xmlns:a16="http://schemas.microsoft.com/office/drawing/2014/main" id="{9DD81EB0-9794-BFBB-6162-BCF8A274D99F}"/>
-              </a:ext>
-            </a:extLst>
-          </p:cNvPr>
-          <p:cNvPicPr>
-            <a:picLocks noChangeAspect="1"/>
-          </p:cNvPicPr>
-          <p:nvPr/>
-        </p:nvPicPr>
-        <p:blipFill>
-          <a:blip r:embed="rId3"/>
-          <a:stretch>
-            <a:fillRect/>
-          </a:stretch>
-        </p:blipFill>
-        <p:spPr>
-          <a:xfrm>
-            <a:off x="3301478" y="70470"/>
-            <a:ext cx="2923201" cy="1802117"/>
-          </a:xfrm>
-          <a:prstGeom prst="rect">
-            <a:avLst/>
-          </a:prstGeom>
-        </p:spPr>
-      </p:pic>
-      <p:pic>
-        <p:nvPicPr>
-          <p:cNvPr id="10" name="Picture 9">
-            <a:extLst>
-              <a:ext uri="{FF2B5EF4-FFF2-40B4-BE49-F238E27FC236}">
-                <a16:creationId xmlns:a16="http://schemas.microsoft.com/office/drawing/2014/main" id="{CB8A8B3C-1CCC-DA65-5019-1C708B4CE1F8}"/>
-              </a:ext>
-            </a:extLst>
-          </p:cNvPr>
-          <p:cNvPicPr>
-            <a:picLocks noChangeAspect="1"/>
-          </p:cNvPicPr>
-          <p:nvPr/>
-        </p:nvPicPr>
-        <p:blipFill>
-          <a:blip r:embed="rId4"/>
-          <a:srcRect/>
-          <a:stretch/>
-        </p:blipFill>
-        <p:spPr>
-          <a:xfrm>
-            <a:off x="3435738" y="1872587"/>
-            <a:ext cx="2788941" cy="1709350"/>
-          </a:xfrm>
-          <a:prstGeom prst="rect">
-            <a:avLst/>
-          </a:prstGeom>
-        </p:spPr>
-      </p:pic>
-      <p:sp>
-        <p:nvSpPr>
-          <p:cNvPr id="2" name="TextBox 1">
-            <a:extLst>
-              <a:ext uri="{FF2B5EF4-FFF2-40B4-BE49-F238E27FC236}">
-                <a16:creationId xmlns:a16="http://schemas.microsoft.com/office/drawing/2014/main" id="{C8BB12CF-A2C1-5F29-C2F6-E598F382A1FC}"/>
-              </a:ext>
-            </a:extLst>
-          </p:cNvPr>
-          <p:cNvSpPr txBox="1"/>
-          <p:nvPr/>
-        </p:nvSpPr>
-        <p:spPr>
-          <a:xfrm>
-            <a:off x="400206" y="6967655"/>
-            <a:ext cx="6057587" cy="600164"/>
-          </a:xfrm>
-          <a:prstGeom prst="rect">
-            <a:avLst/>
-          </a:prstGeom>
-          <a:noFill/>
-        </p:spPr>
-        <p:txBody>
-          <a:bodyPr wrap="square" rtlCol="0">
-            <a:spAutoFit/>
-          </a:bodyPr>
-          <a:lstStyle/>
-          <a:p>
-            <a:r>
-              <a:rPr lang="en-US" sz="1100" b="1" i="0" u="none" strike="noStrike" dirty="0">
-                <a:solidFill>
-                  <a:srgbClr val="000000"/>
-                </a:solidFill>
-                <a:effectLst/>
-                <a:latin typeface="Times New Roman" panose="02020603050405020304" pitchFamily="18" charset="0"/>
-              </a:rPr>
-              <a:t>Figure 2.</a:t>
-            </a:r>
-            <a:r>
-              <a:rPr lang="en-US" sz="1100" b="0" i="0" u="none" strike="noStrike" dirty="0">
-                <a:solidFill>
-                  <a:srgbClr val="000000"/>
-                </a:solidFill>
-                <a:effectLst/>
-                <a:latin typeface="Times New Roman" panose="02020603050405020304" pitchFamily="18" charset="0"/>
-              </a:rPr>
-              <a:t> Aggregation of VIIRS FRP retrievals onto a regular grid. (A) Pixel centers of AFD from both satellites (S-NPP and JPSS-1); (B) Pixel ground area based on swath position (relative nadir position); (C) Cumulative FRP based on fractional assignment.</a:t>
-            </a:r>
-            <a:endParaRPr lang="en-US" sz="1100" dirty="0"/>
-          </a:p>
-        </p:txBody>
-      </p:sp>
-      <p:pic>
-        <p:nvPicPr>
-          <p:cNvPr id="7" name="Picture 6" descr="A map of the united states&#10;&#10;Description automatically generated">
-            <a:extLst>
-              <a:ext uri="{FF2B5EF4-FFF2-40B4-BE49-F238E27FC236}">
-                <a16:creationId xmlns:a16="http://schemas.microsoft.com/office/drawing/2014/main" id="{94544B35-09A2-C23D-71F4-E2FB08F9C7CD}"/>
-              </a:ext>
-            </a:extLst>
-          </p:cNvPr>
-          <p:cNvPicPr>
-            <a:picLocks noChangeAspect="1"/>
-          </p:cNvPicPr>
-          <p:nvPr/>
-        </p:nvPicPr>
-        <p:blipFill>
-          <a:blip r:embed="rId5"/>
-          <a:stretch>
-            <a:fillRect/>
-          </a:stretch>
-        </p:blipFill>
-        <p:spPr>
-          <a:xfrm>
-            <a:off x="266940" y="4940886"/>
-            <a:ext cx="6337595" cy="1967441"/>
-          </a:xfrm>
-          <a:prstGeom prst="rect">
-            <a:avLst/>
-          </a:prstGeom>
-        </p:spPr>
-      </p:pic>
-    </p:spTree>
-    <p:extLst>
-      <p:ext uri="{BB962C8B-B14F-4D97-AF65-F5344CB8AC3E}">
-        <p14:creationId xmlns:p14="http://schemas.microsoft.com/office/powerpoint/2010/main" val="319057114"/>
-      </p:ext>
-    </p:extLst>
-  </p:cSld>
-  <p:clrMapOvr>
-    <a:masterClrMapping/>
-  </p:clrMapOvr>
-</p:sld>
-</file>
-
-<file path=ppt/slides/slide4.xml><?xml version="1.0" encoding="utf-8"?>
 <p:sld xmlns:a="http://schemas.openxmlformats.org/drawingml/2006/main" xmlns:r="http://schemas.openxmlformats.org/officeDocument/2006/relationships" xmlns:p="http://schemas.openxmlformats.org/presentationml/2006/main">
   <p:cSld>
     <p:spTree>
@@ -4069,7 +3850,7 @@
 </p:sld>
 </file>
 
-<file path=ppt/slides/slide5.xml><?xml version="1.0" encoding="utf-8"?>
+<file path=ppt/slides/slide4.xml><?xml version="1.0" encoding="utf-8"?>
 <p:sld xmlns:a="http://schemas.openxmlformats.org/drawingml/2006/main" xmlns:r="http://schemas.openxmlformats.org/officeDocument/2006/relationships" xmlns:p="http://schemas.openxmlformats.org/presentationml/2006/main">
   <p:cSld>
     <p:spTree>
@@ -4267,7 +4048,7 @@
 </p:sld>
 </file>
 
-<file path=ppt/slides/slide6.xml><?xml version="1.0" encoding="utf-8"?>
+<file path=ppt/slides/slide5.xml><?xml version="1.0" encoding="utf-8"?>
 <p:sld xmlns:a="http://schemas.openxmlformats.org/drawingml/2006/main" xmlns:r="http://schemas.openxmlformats.org/officeDocument/2006/relationships" xmlns:p="http://schemas.openxmlformats.org/presentationml/2006/main">
   <p:cSld>
     <p:spTree>
@@ -4385,7 +4166,7 @@
 </p:sld>
 </file>
 
-<file path=ppt/slides/slide7.xml><?xml version="1.0" encoding="utf-8"?>
+<file path=ppt/slides/slide6.xml><?xml version="1.0" encoding="utf-8"?>
 <p:sld xmlns:a="http://schemas.openxmlformats.org/drawingml/2006/main" xmlns:r="http://schemas.openxmlformats.org/officeDocument/2006/relationships" xmlns:p="http://schemas.openxmlformats.org/presentationml/2006/main">
   <p:cSld>
     <p:spTree>

</xml_diff>